<commit_message>
cm03 - Physical ERD completed
</commit_message>
<xml_diff>
--- a/HR_Dataset_Assignment.pptx
+++ b/HR_Dataset_Assignment.pptx
@@ -8,78 +8,79 @@
     <p:sldMasterId id="2147483697" r:id="rId4"/>
   </p:sldMasterIdLst>
   <p:notesMasterIdLst>
-    <p:notesMasterId r:id="rId36"/>
+    <p:notesMasterId r:id="rId37"/>
   </p:notesMasterIdLst>
   <p:sldIdLst>
     <p:sldId id="256" r:id="rId5"/>
     <p:sldId id="259" r:id="rId6"/>
     <p:sldId id="260" r:id="rId7"/>
-    <p:sldId id="261" r:id="rId8"/>
-    <p:sldId id="262" r:id="rId9"/>
-    <p:sldId id="263" r:id="rId10"/>
-    <p:sldId id="264" r:id="rId11"/>
-    <p:sldId id="265" r:id="rId12"/>
-    <p:sldId id="266" r:id="rId13"/>
-    <p:sldId id="267" r:id="rId14"/>
-    <p:sldId id="268" r:id="rId15"/>
-    <p:sldId id="287" r:id="rId16"/>
-    <p:sldId id="269" r:id="rId17"/>
-    <p:sldId id="288" r:id="rId18"/>
-    <p:sldId id="270" r:id="rId19"/>
-    <p:sldId id="271" r:id="rId20"/>
-    <p:sldId id="272" r:id="rId21"/>
-    <p:sldId id="273" r:id="rId22"/>
-    <p:sldId id="274" r:id="rId23"/>
-    <p:sldId id="275" r:id="rId24"/>
-    <p:sldId id="276" r:id="rId25"/>
-    <p:sldId id="277" r:id="rId26"/>
-    <p:sldId id="278" r:id="rId27"/>
-    <p:sldId id="279" r:id="rId28"/>
-    <p:sldId id="280" r:id="rId29"/>
-    <p:sldId id="281" r:id="rId30"/>
-    <p:sldId id="282" r:id="rId31"/>
-    <p:sldId id="283" r:id="rId32"/>
-    <p:sldId id="284" r:id="rId33"/>
-    <p:sldId id="285" r:id="rId34"/>
-    <p:sldId id="286" r:id="rId35"/>
+    <p:sldId id="289" r:id="rId8"/>
+    <p:sldId id="261" r:id="rId9"/>
+    <p:sldId id="262" r:id="rId10"/>
+    <p:sldId id="263" r:id="rId11"/>
+    <p:sldId id="264" r:id="rId12"/>
+    <p:sldId id="265" r:id="rId13"/>
+    <p:sldId id="266" r:id="rId14"/>
+    <p:sldId id="267" r:id="rId15"/>
+    <p:sldId id="268" r:id="rId16"/>
+    <p:sldId id="287" r:id="rId17"/>
+    <p:sldId id="269" r:id="rId18"/>
+    <p:sldId id="288" r:id="rId19"/>
+    <p:sldId id="270" r:id="rId20"/>
+    <p:sldId id="271" r:id="rId21"/>
+    <p:sldId id="272" r:id="rId22"/>
+    <p:sldId id="273" r:id="rId23"/>
+    <p:sldId id="274" r:id="rId24"/>
+    <p:sldId id="275" r:id="rId25"/>
+    <p:sldId id="276" r:id="rId26"/>
+    <p:sldId id="277" r:id="rId27"/>
+    <p:sldId id="278" r:id="rId28"/>
+    <p:sldId id="279" r:id="rId29"/>
+    <p:sldId id="280" r:id="rId30"/>
+    <p:sldId id="281" r:id="rId31"/>
+    <p:sldId id="282" r:id="rId32"/>
+    <p:sldId id="283" r:id="rId33"/>
+    <p:sldId id="284" r:id="rId34"/>
+    <p:sldId id="285" r:id="rId35"/>
+    <p:sldId id="286" r:id="rId36"/>
   </p:sldIdLst>
   <p:sldSz cx="7772400" cy="10058400"/>
   <p:notesSz cx="6858000" cy="9144000"/>
   <p:embeddedFontLst>
     <p:embeddedFont>
       <p:font typeface="Calibri" panose="020F0502020204030204" pitchFamily="34" charset="0"/>
-      <p:regular r:id="rId37"/>
-      <p:bold r:id="rId38"/>
-      <p:italic r:id="rId39"/>
-      <p:boldItalic r:id="rId40"/>
+      <p:regular r:id="rId38"/>
+      <p:bold r:id="rId39"/>
+      <p:italic r:id="rId40"/>
+      <p:boldItalic r:id="rId41"/>
     </p:embeddedFont>
     <p:embeddedFont>
       <p:font typeface="Helvetica Neue" panose="02000503000000020004" pitchFamily="2" charset="0"/>
-      <p:regular r:id="rId41"/>
-      <p:bold r:id="rId42"/>
-      <p:italic r:id="rId43"/>
-      <p:boldItalic r:id="rId44"/>
+      <p:regular r:id="rId42"/>
+      <p:bold r:id="rId43"/>
+      <p:italic r:id="rId44"/>
+      <p:boldItalic r:id="rId45"/>
     </p:embeddedFont>
     <p:embeddedFont>
       <p:font typeface="Open Sans" panose="020B0606030504020204" pitchFamily="34" charset="0"/>
-      <p:regular r:id="rId45"/>
-      <p:bold r:id="rId46"/>
-      <p:italic r:id="rId47"/>
-      <p:boldItalic r:id="rId48"/>
+      <p:regular r:id="rId46"/>
+      <p:bold r:id="rId47"/>
+      <p:italic r:id="rId48"/>
+      <p:boldItalic r:id="rId49"/>
     </p:embeddedFont>
     <p:embeddedFont>
       <p:font typeface="Open Sans Light" panose="020F0302020204030204" pitchFamily="34" charset="0"/>
-      <p:regular r:id="rId49"/>
-      <p:bold r:id="rId50"/>
-      <p:italic r:id="rId51"/>
-      <p:boldItalic r:id="rId52"/>
+      <p:regular r:id="rId50"/>
+      <p:bold r:id="rId51"/>
+      <p:italic r:id="rId52"/>
+      <p:boldItalic r:id="rId53"/>
     </p:embeddedFont>
     <p:embeddedFont>
       <p:font typeface="Source Code Pro" panose="020B0509030403020204" pitchFamily="49" charset="0"/>
-      <p:regular r:id="rId53"/>
-      <p:bold r:id="rId54"/>
-      <p:italic r:id="rId55"/>
-      <p:boldItalic r:id="rId56"/>
+      <p:regular r:id="rId54"/>
+      <p:bold r:id="rId55"/>
+      <p:italic r:id="rId56"/>
+      <p:boldItalic r:id="rId57"/>
     </p:embeddedFont>
   </p:embeddedFontLst>
   <p:defaultTextStyle>
@@ -869,6 +870,110 @@
   <p:cSld>
     <p:spTree>
       <p:nvGrpSpPr>
+        <p:cNvPr id="1" name="Shape 238"/>
+        <p:cNvGrpSpPr/>
+        <p:nvPr/>
+      </p:nvGrpSpPr>
+      <p:grpSpPr>
+        <a:xfrm>
+          <a:off x="0" y="0"/>
+          <a:ext cx="0" cy="0"/>
+          <a:chOff x="0" y="0"/>
+          <a:chExt cx="0" cy="0"/>
+        </a:xfrm>
+      </p:grpSpPr>
+      <p:sp>
+        <p:nvSpPr>
+          <p:cNvPr id="239" name="Google Shape;239;g8d8c850c25_0_92:notes"/>
+          <p:cNvSpPr>
+            <a:spLocks noGrp="1" noRot="1" noChangeAspect="1"/>
+          </p:cNvSpPr>
+          <p:nvPr>
+            <p:ph type="sldImg" idx="2"/>
+          </p:nvPr>
+        </p:nvSpPr>
+        <p:spPr>
+          <a:xfrm>
+            <a:off x="2104459" y="685800"/>
+            <a:ext cx="2649600" cy="3429000"/>
+          </a:xfrm>
+          <a:custGeom>
+            <a:avLst/>
+            <a:gdLst/>
+            <a:ahLst/>
+            <a:cxnLst/>
+            <a:rect l="l" t="t" r="r" b="b"/>
+            <a:pathLst>
+              <a:path w="120000" h="120000" extrusionOk="0">
+                <a:moveTo>
+                  <a:pt x="0" y="0"/>
+                </a:moveTo>
+                <a:lnTo>
+                  <a:pt x="120000" y="0"/>
+                </a:lnTo>
+                <a:lnTo>
+                  <a:pt x="120000" y="120000"/>
+                </a:lnTo>
+                <a:lnTo>
+                  <a:pt x="0" y="120000"/>
+                </a:lnTo>
+                <a:close/>
+              </a:path>
+            </a:pathLst>
+          </a:custGeom>
+        </p:spPr>
+      </p:sp>
+      <p:sp>
+        <p:nvSpPr>
+          <p:cNvPr id="240" name="Google Shape;240;g8d8c850c25_0_92:notes"/>
+          <p:cNvSpPr txBox="1">
+            <a:spLocks noGrp="1"/>
+          </p:cNvSpPr>
+          <p:nvPr>
+            <p:ph type="body" idx="1"/>
+          </p:nvPr>
+        </p:nvSpPr>
+        <p:spPr>
+          <a:xfrm>
+            <a:off x="685800" y="4343400"/>
+            <a:ext cx="5486400" cy="4114800"/>
+          </a:xfrm>
+          <a:prstGeom prst="rect">
+            <a:avLst/>
+          </a:prstGeom>
+        </p:spPr>
+        <p:txBody>
+          <a:bodyPr spcFirstLastPara="1" wrap="square" lIns="91425" tIns="91425" rIns="91425" bIns="91425" anchor="t" anchorCtr="0">
+            <a:noAutofit/>
+          </a:bodyPr>
+          <a:lstStyle/>
+          <a:p>
+            <a:pPr marL="0" lvl="0" indent="0" algn="l" rtl="0">
+              <a:spcBef>
+                <a:spcPts val="0"/>
+              </a:spcBef>
+              <a:spcAft>
+                <a:spcPts val="0"/>
+              </a:spcAft>
+              <a:buNone/>
+            </a:pPr>
+            <a:endParaRPr/>
+          </a:p>
+        </p:txBody>
+      </p:sp>
+    </p:spTree>
+  </p:cSld>
+  <p:clrMapOvr>
+    <a:masterClrMapping/>
+  </p:clrMapOvr>
+</p:notes>
+</file>
+
+<file path=ppt/notesSlides/notesSlide11.xml><?xml version="1.0" encoding="utf-8"?>
+<p:notes xmlns:a="http://schemas.openxmlformats.org/drawingml/2006/main" xmlns:r="http://schemas.openxmlformats.org/officeDocument/2006/relationships" xmlns:p="http://schemas.openxmlformats.org/presentationml/2006/main" showMasterSp="0" showMasterPhAnim="0">
+  <p:cSld>
+    <p:spTree>
+      <p:nvGrpSpPr>
         <p:cNvPr id="1" name="Shape 244"/>
         <p:cNvGrpSpPr/>
         <p:nvPr/>
@@ -957,110 +1062,6 @@
               <a:buNone/>
             </a:pPr>
             <a:endParaRPr/>
-          </a:p>
-        </p:txBody>
-      </p:sp>
-    </p:spTree>
-  </p:cSld>
-  <p:clrMapOvr>
-    <a:masterClrMapping/>
-  </p:clrMapOvr>
-</p:notes>
-</file>
-
-<file path=ppt/notesSlides/notesSlide11.xml><?xml version="1.0" encoding="utf-8"?>
-<p:notes xmlns:a="http://schemas.openxmlformats.org/drawingml/2006/main" xmlns:r="http://schemas.openxmlformats.org/officeDocument/2006/relationships" xmlns:p="http://schemas.openxmlformats.org/presentationml/2006/main" showMasterSp="0" showMasterPhAnim="0">
-  <p:cSld>
-    <p:spTree>
-      <p:nvGrpSpPr>
-        <p:cNvPr id="1" name="Shape 251"/>
-        <p:cNvGrpSpPr/>
-        <p:nvPr/>
-      </p:nvGrpSpPr>
-      <p:grpSpPr>
-        <a:xfrm>
-          <a:off x="0" y="0"/>
-          <a:ext cx="0" cy="0"/>
-          <a:chOff x="0" y="0"/>
-          <a:chExt cx="0" cy="0"/>
-        </a:xfrm>
-      </p:grpSpPr>
-      <p:sp>
-        <p:nvSpPr>
-          <p:cNvPr id="252" name="Google Shape;252;g8d8c850c25_0_103:notes"/>
-          <p:cNvSpPr>
-            <a:spLocks noGrp="1" noRot="1" noChangeAspect="1"/>
-          </p:cNvSpPr>
-          <p:nvPr>
-            <p:ph type="sldImg" idx="2"/>
-          </p:nvPr>
-        </p:nvSpPr>
-        <p:spPr>
-          <a:xfrm>
-            <a:off x="2105025" y="685800"/>
-            <a:ext cx="2649538" cy="3429000"/>
-          </a:xfrm>
-          <a:custGeom>
-            <a:avLst/>
-            <a:gdLst/>
-            <a:ahLst/>
-            <a:cxnLst/>
-            <a:rect l="l" t="t" r="r" b="b"/>
-            <a:pathLst>
-              <a:path w="120000" h="120000" extrusionOk="0">
-                <a:moveTo>
-                  <a:pt x="0" y="0"/>
-                </a:moveTo>
-                <a:lnTo>
-                  <a:pt x="120000" y="0"/>
-                </a:lnTo>
-                <a:lnTo>
-                  <a:pt x="120000" y="120000"/>
-                </a:lnTo>
-                <a:lnTo>
-                  <a:pt x="0" y="120000"/>
-                </a:lnTo>
-                <a:close/>
-              </a:path>
-            </a:pathLst>
-          </a:custGeom>
-        </p:spPr>
-      </p:sp>
-      <p:sp>
-        <p:nvSpPr>
-          <p:cNvPr id="253" name="Google Shape;253;g8d8c850c25_0_103:notes"/>
-          <p:cNvSpPr txBox="1">
-            <a:spLocks noGrp="1"/>
-          </p:cNvSpPr>
-          <p:nvPr>
-            <p:ph type="body" idx="1"/>
-          </p:nvPr>
-        </p:nvSpPr>
-        <p:spPr>
-          <a:xfrm>
-            <a:off x="685800" y="4343400"/>
-            <a:ext cx="5486400" cy="4114800"/>
-          </a:xfrm>
-          <a:prstGeom prst="rect">
-            <a:avLst/>
-          </a:prstGeom>
-        </p:spPr>
-        <p:txBody>
-          <a:bodyPr spcFirstLastPara="1" wrap="square" lIns="91425" tIns="91425" rIns="91425" bIns="91425" anchor="t" anchorCtr="0">
-            <a:noAutofit/>
-          </a:bodyPr>
-          <a:lstStyle/>
-          <a:p>
-            <a:pPr marL="0" lvl="0" indent="0" algn="l" rtl="0">
-              <a:spcBef>
-                <a:spcPts val="0"/>
-              </a:spcBef>
-              <a:spcAft>
-                <a:spcPts val="0"/>
-              </a:spcAft>
-              <a:buNone/>
-            </a:pPr>
-            <a:endParaRPr dirty="0"/>
           </a:p>
         </p:txBody>
       </p:sp>
@@ -1164,16 +1165,11 @@
               </a:spcAft>
               <a:buNone/>
             </a:pPr>
-            <a:endParaRPr/>
+            <a:endParaRPr dirty="0"/>
           </a:p>
         </p:txBody>
       </p:sp>
     </p:spTree>
-    <p:extLst>
-      <p:ext uri="{BB962C8B-B14F-4D97-AF65-F5344CB8AC3E}">
-        <p14:creationId xmlns:p14="http://schemas.microsoft.com/office/powerpoint/2010/main" val="3855889293"/>
-      </p:ext>
-    </p:extLst>
   </p:cSld>
   <p:clrMapOvr>
     <a:masterClrMapping/>
@@ -1186,7 +1182,7 @@
   <p:cSld>
     <p:spTree>
       <p:nvGrpSpPr>
-        <p:cNvPr id="1" name="Shape 258"/>
+        <p:cNvPr id="1" name="Shape 251"/>
         <p:cNvGrpSpPr/>
         <p:nvPr/>
       </p:nvGrpSpPr>
@@ -1200,7 +1196,7 @@
       </p:grpSpPr>
       <p:sp>
         <p:nvSpPr>
-          <p:cNvPr id="259" name="Google Shape;259;g8d8c850c25_0_108:notes"/>
+          <p:cNvPr id="252" name="Google Shape;252;g8d8c850c25_0_103:notes"/>
           <p:cNvSpPr>
             <a:spLocks noGrp="1" noRot="1" noChangeAspect="1"/>
           </p:cNvSpPr>
@@ -1241,7 +1237,7 @@
       </p:sp>
       <p:sp>
         <p:nvSpPr>
-          <p:cNvPr id="260" name="Google Shape;260;g8d8c850c25_0_108:notes"/>
+          <p:cNvPr id="253" name="Google Shape;253;g8d8c850c25_0_103:notes"/>
           <p:cNvSpPr txBox="1">
             <a:spLocks noGrp="1"/>
           </p:cNvSpPr>
@@ -1278,6 +1274,11 @@
         </p:txBody>
       </p:sp>
     </p:spTree>
+    <p:extLst>
+      <p:ext uri="{BB962C8B-B14F-4D97-AF65-F5344CB8AC3E}">
+        <p14:creationId xmlns:p14="http://schemas.microsoft.com/office/powerpoint/2010/main" val="3855889293"/>
+      </p:ext>
+    </p:extLst>
   </p:cSld>
   <p:clrMapOvr>
     <a:masterClrMapping/>
@@ -1382,6 +1383,110 @@
         </p:txBody>
       </p:sp>
     </p:spTree>
+  </p:cSld>
+  <p:clrMapOvr>
+    <a:masterClrMapping/>
+  </p:clrMapOvr>
+</p:notes>
+</file>
+
+<file path=ppt/notesSlides/notesSlide15.xml><?xml version="1.0" encoding="utf-8"?>
+<p:notes xmlns:a="http://schemas.openxmlformats.org/drawingml/2006/main" xmlns:r="http://schemas.openxmlformats.org/officeDocument/2006/relationships" xmlns:p="http://schemas.openxmlformats.org/presentationml/2006/main" showMasterSp="0" showMasterPhAnim="0">
+  <p:cSld>
+    <p:spTree>
+      <p:nvGrpSpPr>
+        <p:cNvPr id="1" name="Shape 258"/>
+        <p:cNvGrpSpPr/>
+        <p:nvPr/>
+      </p:nvGrpSpPr>
+      <p:grpSpPr>
+        <a:xfrm>
+          <a:off x="0" y="0"/>
+          <a:ext cx="0" cy="0"/>
+          <a:chOff x="0" y="0"/>
+          <a:chExt cx="0" cy="0"/>
+        </a:xfrm>
+      </p:grpSpPr>
+      <p:sp>
+        <p:nvSpPr>
+          <p:cNvPr id="259" name="Google Shape;259;g8d8c850c25_0_108:notes"/>
+          <p:cNvSpPr>
+            <a:spLocks noGrp="1" noRot="1" noChangeAspect="1"/>
+          </p:cNvSpPr>
+          <p:nvPr>
+            <p:ph type="sldImg" idx="2"/>
+          </p:nvPr>
+        </p:nvSpPr>
+        <p:spPr>
+          <a:xfrm>
+            <a:off x="2105025" y="685800"/>
+            <a:ext cx="2649538" cy="3429000"/>
+          </a:xfrm>
+          <a:custGeom>
+            <a:avLst/>
+            <a:gdLst/>
+            <a:ahLst/>
+            <a:cxnLst/>
+            <a:rect l="l" t="t" r="r" b="b"/>
+            <a:pathLst>
+              <a:path w="120000" h="120000" extrusionOk="0">
+                <a:moveTo>
+                  <a:pt x="0" y="0"/>
+                </a:moveTo>
+                <a:lnTo>
+                  <a:pt x="120000" y="0"/>
+                </a:lnTo>
+                <a:lnTo>
+                  <a:pt x="120000" y="120000"/>
+                </a:lnTo>
+                <a:lnTo>
+                  <a:pt x="0" y="120000"/>
+                </a:lnTo>
+                <a:close/>
+              </a:path>
+            </a:pathLst>
+          </a:custGeom>
+        </p:spPr>
+      </p:sp>
+      <p:sp>
+        <p:nvSpPr>
+          <p:cNvPr id="260" name="Google Shape;260;g8d8c850c25_0_108:notes"/>
+          <p:cNvSpPr txBox="1">
+            <a:spLocks noGrp="1"/>
+          </p:cNvSpPr>
+          <p:nvPr>
+            <p:ph type="body" idx="1"/>
+          </p:nvPr>
+        </p:nvSpPr>
+        <p:spPr>
+          <a:xfrm>
+            <a:off x="685800" y="4343400"/>
+            <a:ext cx="5486400" cy="4114800"/>
+          </a:xfrm>
+          <a:prstGeom prst="rect">
+            <a:avLst/>
+          </a:prstGeom>
+        </p:spPr>
+        <p:txBody>
+          <a:bodyPr spcFirstLastPara="1" wrap="square" lIns="91425" tIns="91425" rIns="91425" bIns="91425" anchor="t" anchorCtr="0">
+            <a:noAutofit/>
+          </a:bodyPr>
+          <a:lstStyle/>
+          <a:p>
+            <a:pPr marL="0" lvl="0" indent="0" algn="l" rtl="0">
+              <a:spcBef>
+                <a:spcPts val="0"/>
+              </a:spcBef>
+              <a:spcAft>
+                <a:spcPts val="0"/>
+              </a:spcAft>
+              <a:buNone/>
+            </a:pPr>
+            <a:endParaRPr/>
+          </a:p>
+        </p:txBody>
+      </p:sp>
+    </p:spTree>
     <p:extLst>
       <p:ext uri="{BB962C8B-B14F-4D97-AF65-F5344CB8AC3E}">
         <p14:creationId xmlns:p14="http://schemas.microsoft.com/office/powerpoint/2010/main" val="3781836248"/>
@@ -1394,7 +1499,7 @@
 </p:notes>
 </file>
 
-<file path=ppt/notesSlides/notesSlide15.xml><?xml version="1.0" encoding="utf-8"?>
+<file path=ppt/notesSlides/notesSlide16.xml><?xml version="1.0" encoding="utf-8"?>
 <p:notes xmlns:a="http://schemas.openxmlformats.org/drawingml/2006/main" xmlns:r="http://schemas.openxmlformats.org/officeDocument/2006/relationships" xmlns:p="http://schemas.openxmlformats.org/presentationml/2006/main" showMasterSp="0" showMasterPhAnim="0">
   <p:cSld>
     <p:spTree>
@@ -1502,7 +1607,7 @@
 </p:notes>
 </file>
 
-<file path=ppt/notesSlides/notesSlide16.xml><?xml version="1.0" encoding="utf-8"?>
+<file path=ppt/notesSlides/notesSlide17.xml><?xml version="1.0" encoding="utf-8"?>
 <p:notes xmlns:a="http://schemas.openxmlformats.org/drawingml/2006/main" xmlns:r="http://schemas.openxmlformats.org/officeDocument/2006/relationships" xmlns:p="http://schemas.openxmlformats.org/presentationml/2006/main" showMasterSp="0" showMasterPhAnim="0">
   <p:cSld>
     <p:spTree>
@@ -1606,7 +1711,7 @@
 </p:notes>
 </file>
 
-<file path=ppt/notesSlides/notesSlide17.xml><?xml version="1.0" encoding="utf-8"?>
+<file path=ppt/notesSlides/notesSlide18.xml><?xml version="1.0" encoding="utf-8"?>
 <p:notes xmlns:a="http://schemas.openxmlformats.org/drawingml/2006/main" xmlns:r="http://schemas.openxmlformats.org/officeDocument/2006/relationships" xmlns:p="http://schemas.openxmlformats.org/presentationml/2006/main" showMasterSp="0" showMasterPhAnim="0">
   <p:cSld>
     <p:spTree>
@@ -1710,7 +1815,7 @@
 </p:notes>
 </file>
 
-<file path=ppt/notesSlides/notesSlide18.xml><?xml version="1.0" encoding="utf-8"?>
+<file path=ppt/notesSlides/notesSlide19.xml><?xml version="1.0" encoding="utf-8"?>
 <p:notes xmlns:a="http://schemas.openxmlformats.org/drawingml/2006/main" xmlns:r="http://schemas.openxmlformats.org/officeDocument/2006/relationships" xmlns:p="http://schemas.openxmlformats.org/presentationml/2006/main" showMasterSp="0" showMasterPhAnim="0">
   <p:cSld>
     <p:spTree>
@@ -1814,7 +1919,115 @@
 </p:notes>
 </file>
 
-<file path=ppt/notesSlides/notesSlide19.xml><?xml version="1.0" encoding="utf-8"?>
+<file path=ppt/notesSlides/notesSlide2.xml><?xml version="1.0" encoding="utf-8"?>
+<p:notes xmlns:a="http://schemas.openxmlformats.org/drawingml/2006/main" xmlns:r="http://schemas.openxmlformats.org/officeDocument/2006/relationships" xmlns:p="http://schemas.openxmlformats.org/presentationml/2006/main" showMasterSp="0" showMasterPhAnim="0">
+  <p:cSld>
+    <p:spTree>
+      <p:nvGrpSpPr>
+        <p:cNvPr id="1" name="Shape 195"/>
+        <p:cNvGrpSpPr/>
+        <p:nvPr/>
+      </p:nvGrpSpPr>
+      <p:grpSpPr>
+        <a:xfrm>
+          <a:off x="0" y="0"/>
+          <a:ext cx="0" cy="0"/>
+          <a:chOff x="0" y="0"/>
+          <a:chExt cx="0" cy="0"/>
+        </a:xfrm>
+      </p:grpSpPr>
+      <p:sp>
+        <p:nvSpPr>
+          <p:cNvPr id="196" name="Google Shape;196;g8d8c850c25_0_33:notes"/>
+          <p:cNvSpPr txBox="1">
+            <a:spLocks noGrp="1"/>
+          </p:cNvSpPr>
+          <p:nvPr>
+            <p:ph type="body" idx="1"/>
+          </p:nvPr>
+        </p:nvSpPr>
+        <p:spPr>
+          <a:xfrm>
+            <a:off x="914400" y="4343400"/>
+            <a:ext cx="5029200" cy="4114800"/>
+          </a:xfrm>
+          <a:prstGeom prst="rect">
+            <a:avLst/>
+          </a:prstGeom>
+          <a:noFill/>
+          <a:ln>
+            <a:noFill/>
+          </a:ln>
+        </p:spPr>
+        <p:txBody>
+          <a:bodyPr spcFirstLastPara="1" wrap="square" lIns="91425" tIns="91425" rIns="91425" bIns="91425" anchor="ctr" anchorCtr="0">
+            <a:noAutofit/>
+          </a:bodyPr>
+          <a:lstStyle/>
+          <a:p>
+            <a:pPr marL="0" lvl="0" indent="0" algn="l" rtl="0">
+              <a:spcBef>
+                <a:spcPts val="0"/>
+              </a:spcBef>
+              <a:spcAft>
+                <a:spcPts val="0"/>
+              </a:spcAft>
+              <a:buNone/>
+            </a:pPr>
+            <a:endParaRPr/>
+          </a:p>
+        </p:txBody>
+      </p:sp>
+      <p:sp>
+        <p:nvSpPr>
+          <p:cNvPr id="197" name="Google Shape;197;g8d8c850c25_0_33:notes"/>
+          <p:cNvSpPr>
+            <a:spLocks noGrp="1" noRot="1" noChangeAspect="1"/>
+          </p:cNvSpPr>
+          <p:nvPr>
+            <p:ph type="sldImg" idx="2"/>
+          </p:nvPr>
+        </p:nvSpPr>
+        <p:spPr>
+          <a:xfrm>
+            <a:off x="2435369" y="685800"/>
+            <a:ext cx="1987200" cy="3429000"/>
+          </a:xfrm>
+          <a:custGeom>
+            <a:avLst/>
+            <a:gdLst/>
+            <a:ahLst/>
+            <a:cxnLst/>
+            <a:rect l="l" t="t" r="r" b="b"/>
+            <a:pathLst>
+              <a:path w="120000" h="120000" extrusionOk="0">
+                <a:moveTo>
+                  <a:pt x="0" y="0"/>
+                </a:moveTo>
+                <a:lnTo>
+                  <a:pt x="120000" y="0"/>
+                </a:lnTo>
+                <a:lnTo>
+                  <a:pt x="120000" y="120000"/>
+                </a:lnTo>
+                <a:lnTo>
+                  <a:pt x="0" y="120000"/>
+                </a:lnTo>
+                <a:close/>
+              </a:path>
+            </a:pathLst>
+          </a:custGeom>
+        </p:spPr>
+      </p:sp>
+    </p:spTree>
+  </p:cSld>
+  <p:clrMapOvr>
+    <a:masterClrMapping/>
+  </p:clrMapOvr>
+</p:notes>
+</file>
+
+<file path=ppt/notesSlides/notesSlide20.xml><?xml version="1.0" encoding="utf-8"?>
 <p:notes xmlns:a="http://schemas.openxmlformats.org/drawingml/2006/main" xmlns:r="http://schemas.openxmlformats.org/officeDocument/2006/relationships" xmlns:p="http://schemas.openxmlformats.org/presentationml/2006/main" showMasterSp="0" showMasterPhAnim="0">
   <p:cSld>
     <p:spTree>
@@ -1918,115 +2131,7 @@
 </p:notes>
 </file>
 
-<file path=ppt/notesSlides/notesSlide2.xml><?xml version="1.0" encoding="utf-8"?>
-<p:notes xmlns:a="http://schemas.openxmlformats.org/drawingml/2006/main" xmlns:r="http://schemas.openxmlformats.org/officeDocument/2006/relationships" xmlns:p="http://schemas.openxmlformats.org/presentationml/2006/main" showMasterSp="0" showMasterPhAnim="0">
-  <p:cSld>
-    <p:spTree>
-      <p:nvGrpSpPr>
-        <p:cNvPr id="1" name="Shape 195"/>
-        <p:cNvGrpSpPr/>
-        <p:nvPr/>
-      </p:nvGrpSpPr>
-      <p:grpSpPr>
-        <a:xfrm>
-          <a:off x="0" y="0"/>
-          <a:ext cx="0" cy="0"/>
-          <a:chOff x="0" y="0"/>
-          <a:chExt cx="0" cy="0"/>
-        </a:xfrm>
-      </p:grpSpPr>
-      <p:sp>
-        <p:nvSpPr>
-          <p:cNvPr id="196" name="Google Shape;196;g8d8c850c25_0_33:notes"/>
-          <p:cNvSpPr txBox="1">
-            <a:spLocks noGrp="1"/>
-          </p:cNvSpPr>
-          <p:nvPr>
-            <p:ph type="body" idx="1"/>
-          </p:nvPr>
-        </p:nvSpPr>
-        <p:spPr>
-          <a:xfrm>
-            <a:off x="914400" y="4343400"/>
-            <a:ext cx="5029200" cy="4114800"/>
-          </a:xfrm>
-          <a:prstGeom prst="rect">
-            <a:avLst/>
-          </a:prstGeom>
-          <a:noFill/>
-          <a:ln>
-            <a:noFill/>
-          </a:ln>
-        </p:spPr>
-        <p:txBody>
-          <a:bodyPr spcFirstLastPara="1" wrap="square" lIns="91425" tIns="91425" rIns="91425" bIns="91425" anchor="ctr" anchorCtr="0">
-            <a:noAutofit/>
-          </a:bodyPr>
-          <a:lstStyle/>
-          <a:p>
-            <a:pPr marL="0" lvl="0" indent="0" algn="l" rtl="0">
-              <a:spcBef>
-                <a:spcPts val="0"/>
-              </a:spcBef>
-              <a:spcAft>
-                <a:spcPts val="0"/>
-              </a:spcAft>
-              <a:buNone/>
-            </a:pPr>
-            <a:endParaRPr/>
-          </a:p>
-        </p:txBody>
-      </p:sp>
-      <p:sp>
-        <p:nvSpPr>
-          <p:cNvPr id="197" name="Google Shape;197;g8d8c850c25_0_33:notes"/>
-          <p:cNvSpPr>
-            <a:spLocks noGrp="1" noRot="1" noChangeAspect="1"/>
-          </p:cNvSpPr>
-          <p:nvPr>
-            <p:ph type="sldImg" idx="2"/>
-          </p:nvPr>
-        </p:nvSpPr>
-        <p:spPr>
-          <a:xfrm>
-            <a:off x="2435369" y="685800"/>
-            <a:ext cx="1987200" cy="3429000"/>
-          </a:xfrm>
-          <a:custGeom>
-            <a:avLst/>
-            <a:gdLst/>
-            <a:ahLst/>
-            <a:cxnLst/>
-            <a:rect l="l" t="t" r="r" b="b"/>
-            <a:pathLst>
-              <a:path w="120000" h="120000" extrusionOk="0">
-                <a:moveTo>
-                  <a:pt x="0" y="0"/>
-                </a:moveTo>
-                <a:lnTo>
-                  <a:pt x="120000" y="0"/>
-                </a:lnTo>
-                <a:lnTo>
-                  <a:pt x="120000" y="120000"/>
-                </a:lnTo>
-                <a:lnTo>
-                  <a:pt x="0" y="120000"/>
-                </a:lnTo>
-                <a:close/>
-              </a:path>
-            </a:pathLst>
-          </a:custGeom>
-        </p:spPr>
-      </p:sp>
-    </p:spTree>
-  </p:cSld>
-  <p:clrMapOvr>
-    <a:masterClrMapping/>
-  </p:clrMapOvr>
-</p:notes>
-</file>
-
-<file path=ppt/notesSlides/notesSlide20.xml><?xml version="1.0" encoding="utf-8"?>
+<file path=ppt/notesSlides/notesSlide21.xml><?xml version="1.0" encoding="utf-8"?>
 <p:notes xmlns:a="http://schemas.openxmlformats.org/drawingml/2006/main" xmlns:r="http://schemas.openxmlformats.org/officeDocument/2006/relationships" xmlns:p="http://schemas.openxmlformats.org/presentationml/2006/main" showMasterSp="0" showMasterPhAnim="0">
   <p:cSld>
     <p:spTree>
@@ -2130,7 +2235,7 @@
 </p:notes>
 </file>
 
-<file path=ppt/notesSlides/notesSlide21.xml><?xml version="1.0" encoding="utf-8"?>
+<file path=ppt/notesSlides/notesSlide22.xml><?xml version="1.0" encoding="utf-8"?>
 <p:notes xmlns:a="http://schemas.openxmlformats.org/drawingml/2006/main" xmlns:r="http://schemas.openxmlformats.org/officeDocument/2006/relationships" xmlns:p="http://schemas.openxmlformats.org/presentationml/2006/main" showMasterSp="0" showMasterPhAnim="0">
   <p:cSld>
     <p:spTree>
@@ -2234,7 +2339,7 @@
 </p:notes>
 </file>
 
-<file path=ppt/notesSlides/notesSlide22.xml><?xml version="1.0" encoding="utf-8"?>
+<file path=ppt/notesSlides/notesSlide23.xml><?xml version="1.0" encoding="utf-8"?>
 <p:notes xmlns:a="http://schemas.openxmlformats.org/drawingml/2006/main" xmlns:r="http://schemas.openxmlformats.org/officeDocument/2006/relationships" xmlns:p="http://schemas.openxmlformats.org/presentationml/2006/main" showMasterSp="0" showMasterPhAnim="0">
   <p:cSld>
     <p:spTree>
@@ -2338,7 +2443,7 @@
 </p:notes>
 </file>
 
-<file path=ppt/notesSlides/notesSlide23.xml><?xml version="1.0" encoding="utf-8"?>
+<file path=ppt/notesSlides/notesSlide24.xml><?xml version="1.0" encoding="utf-8"?>
 <p:notes xmlns:a="http://schemas.openxmlformats.org/drawingml/2006/main" xmlns:r="http://schemas.openxmlformats.org/officeDocument/2006/relationships" xmlns:p="http://schemas.openxmlformats.org/presentationml/2006/main" showMasterSp="0" showMasterPhAnim="0">
   <p:cSld>
     <p:spTree>
@@ -2442,7 +2547,7 @@
 </p:notes>
 </file>
 
-<file path=ppt/notesSlides/notesSlide24.xml><?xml version="1.0" encoding="utf-8"?>
+<file path=ppt/notesSlides/notesSlide25.xml><?xml version="1.0" encoding="utf-8"?>
 <p:notes xmlns:a="http://schemas.openxmlformats.org/drawingml/2006/main" xmlns:r="http://schemas.openxmlformats.org/officeDocument/2006/relationships" xmlns:p="http://schemas.openxmlformats.org/presentationml/2006/main" showMasterSp="0" showMasterPhAnim="0">
   <p:cSld>
     <p:spTree>
@@ -2546,7 +2651,7 @@
 </p:notes>
 </file>
 
-<file path=ppt/notesSlides/notesSlide25.xml><?xml version="1.0" encoding="utf-8"?>
+<file path=ppt/notesSlides/notesSlide26.xml><?xml version="1.0" encoding="utf-8"?>
 <p:notes xmlns:a="http://schemas.openxmlformats.org/drawingml/2006/main" xmlns:r="http://schemas.openxmlformats.org/officeDocument/2006/relationships" xmlns:p="http://schemas.openxmlformats.org/presentationml/2006/main" showMasterSp="0" showMasterPhAnim="0">
   <p:cSld>
     <p:spTree>
@@ -2654,7 +2759,7 @@
 </p:notes>
 </file>
 
-<file path=ppt/notesSlides/notesSlide26.xml><?xml version="1.0" encoding="utf-8"?>
+<file path=ppt/notesSlides/notesSlide27.xml><?xml version="1.0" encoding="utf-8"?>
 <p:notes xmlns:a="http://schemas.openxmlformats.org/drawingml/2006/main" xmlns:r="http://schemas.openxmlformats.org/officeDocument/2006/relationships" xmlns:p="http://schemas.openxmlformats.org/presentationml/2006/main" showMasterSp="0" showMasterPhAnim="0">
   <p:cSld>
     <p:spTree>
@@ -2758,7 +2863,7 @@
 </p:notes>
 </file>
 
-<file path=ppt/notesSlides/notesSlide27.xml><?xml version="1.0" encoding="utf-8"?>
+<file path=ppt/notesSlides/notesSlide28.xml><?xml version="1.0" encoding="utf-8"?>
 <p:notes xmlns:a="http://schemas.openxmlformats.org/drawingml/2006/main" xmlns:r="http://schemas.openxmlformats.org/officeDocument/2006/relationships" xmlns:p="http://schemas.openxmlformats.org/presentationml/2006/main" showMasterSp="0" showMasterPhAnim="0">
   <p:cSld>
     <p:spTree>
@@ -2862,7 +2967,7 @@
 </p:notes>
 </file>
 
-<file path=ppt/notesSlides/notesSlide28.xml><?xml version="1.0" encoding="utf-8"?>
+<file path=ppt/notesSlides/notesSlide29.xml><?xml version="1.0" encoding="utf-8"?>
 <p:notes xmlns:a="http://schemas.openxmlformats.org/drawingml/2006/main" xmlns:r="http://schemas.openxmlformats.org/officeDocument/2006/relationships" xmlns:p="http://schemas.openxmlformats.org/presentationml/2006/main" showMasterSp="0" showMasterPhAnim="0">
   <p:cSld>
     <p:spTree>
@@ -2923,110 +3028,6 @@
       <p:sp>
         <p:nvSpPr>
           <p:cNvPr id="352" name="Google Shape;352;g8c49221f98_6_21:notes"/>
-          <p:cNvSpPr txBox="1">
-            <a:spLocks noGrp="1"/>
-          </p:cNvSpPr>
-          <p:nvPr>
-            <p:ph type="body" idx="1"/>
-          </p:nvPr>
-        </p:nvSpPr>
-        <p:spPr>
-          <a:xfrm>
-            <a:off x="685800" y="4343400"/>
-            <a:ext cx="5486400" cy="4114800"/>
-          </a:xfrm>
-          <a:prstGeom prst="rect">
-            <a:avLst/>
-          </a:prstGeom>
-        </p:spPr>
-        <p:txBody>
-          <a:bodyPr spcFirstLastPara="1" wrap="square" lIns="91425" tIns="91425" rIns="91425" bIns="91425" anchor="t" anchorCtr="0">
-            <a:noAutofit/>
-          </a:bodyPr>
-          <a:lstStyle/>
-          <a:p>
-            <a:pPr marL="0" lvl="0" indent="0" algn="l" rtl="0">
-              <a:spcBef>
-                <a:spcPts val="0"/>
-              </a:spcBef>
-              <a:spcAft>
-                <a:spcPts val="0"/>
-              </a:spcAft>
-              <a:buNone/>
-            </a:pPr>
-            <a:endParaRPr/>
-          </a:p>
-        </p:txBody>
-      </p:sp>
-    </p:spTree>
-  </p:cSld>
-  <p:clrMapOvr>
-    <a:masterClrMapping/>
-  </p:clrMapOvr>
-</p:notes>
-</file>
-
-<file path=ppt/notesSlides/notesSlide29.xml><?xml version="1.0" encoding="utf-8"?>
-<p:notes xmlns:a="http://schemas.openxmlformats.org/drawingml/2006/main" xmlns:r="http://schemas.openxmlformats.org/officeDocument/2006/relationships" xmlns:p="http://schemas.openxmlformats.org/presentationml/2006/main" showMasterSp="0" showMasterPhAnim="0">
-  <p:cSld>
-    <p:spTree>
-      <p:nvGrpSpPr>
-        <p:cNvPr id="1" name="Shape 356"/>
-        <p:cNvGrpSpPr/>
-        <p:nvPr/>
-      </p:nvGrpSpPr>
-      <p:grpSpPr>
-        <a:xfrm>
-          <a:off x="0" y="0"/>
-          <a:ext cx="0" cy="0"/>
-          <a:chOff x="0" y="0"/>
-          <a:chExt cx="0" cy="0"/>
-        </a:xfrm>
-      </p:grpSpPr>
-      <p:sp>
-        <p:nvSpPr>
-          <p:cNvPr id="357" name="Google Shape;357;g8c49221f98_6_26:notes"/>
-          <p:cNvSpPr>
-            <a:spLocks noGrp="1" noRot="1" noChangeAspect="1"/>
-          </p:cNvSpPr>
-          <p:nvPr>
-            <p:ph type="sldImg" idx="2"/>
-          </p:nvPr>
-        </p:nvSpPr>
-        <p:spPr>
-          <a:xfrm>
-            <a:off x="2104459" y="685800"/>
-            <a:ext cx="2649600" cy="3429000"/>
-          </a:xfrm>
-          <a:custGeom>
-            <a:avLst/>
-            <a:gdLst/>
-            <a:ahLst/>
-            <a:cxnLst/>
-            <a:rect l="l" t="t" r="r" b="b"/>
-            <a:pathLst>
-              <a:path w="120000" h="120000" extrusionOk="0">
-                <a:moveTo>
-                  <a:pt x="0" y="0"/>
-                </a:moveTo>
-                <a:lnTo>
-                  <a:pt x="120000" y="0"/>
-                </a:lnTo>
-                <a:lnTo>
-                  <a:pt x="120000" y="120000"/>
-                </a:lnTo>
-                <a:lnTo>
-                  <a:pt x="0" y="120000"/>
-                </a:lnTo>
-                <a:close/>
-              </a:path>
-            </a:pathLst>
-          </a:custGeom>
-        </p:spPr>
-      </p:sp>
-      <p:sp>
-        <p:nvSpPr>
-          <p:cNvPr id="358" name="Google Shape;358;g8c49221f98_6_26:notes"/>
           <p:cNvSpPr txBox="1">
             <a:spLocks noGrp="1"/>
           </p:cNvSpPr>
@@ -3179,6 +3180,110 @@
   <p:cSld>
     <p:spTree>
       <p:nvGrpSpPr>
+        <p:cNvPr id="1" name="Shape 356"/>
+        <p:cNvGrpSpPr/>
+        <p:nvPr/>
+      </p:nvGrpSpPr>
+      <p:grpSpPr>
+        <a:xfrm>
+          <a:off x="0" y="0"/>
+          <a:ext cx="0" cy="0"/>
+          <a:chOff x="0" y="0"/>
+          <a:chExt cx="0" cy="0"/>
+        </a:xfrm>
+      </p:grpSpPr>
+      <p:sp>
+        <p:nvSpPr>
+          <p:cNvPr id="357" name="Google Shape;357;g8c49221f98_6_26:notes"/>
+          <p:cNvSpPr>
+            <a:spLocks noGrp="1" noRot="1" noChangeAspect="1"/>
+          </p:cNvSpPr>
+          <p:nvPr>
+            <p:ph type="sldImg" idx="2"/>
+          </p:nvPr>
+        </p:nvSpPr>
+        <p:spPr>
+          <a:xfrm>
+            <a:off x="2104459" y="685800"/>
+            <a:ext cx="2649600" cy="3429000"/>
+          </a:xfrm>
+          <a:custGeom>
+            <a:avLst/>
+            <a:gdLst/>
+            <a:ahLst/>
+            <a:cxnLst/>
+            <a:rect l="l" t="t" r="r" b="b"/>
+            <a:pathLst>
+              <a:path w="120000" h="120000" extrusionOk="0">
+                <a:moveTo>
+                  <a:pt x="0" y="0"/>
+                </a:moveTo>
+                <a:lnTo>
+                  <a:pt x="120000" y="0"/>
+                </a:lnTo>
+                <a:lnTo>
+                  <a:pt x="120000" y="120000"/>
+                </a:lnTo>
+                <a:lnTo>
+                  <a:pt x="0" y="120000"/>
+                </a:lnTo>
+                <a:close/>
+              </a:path>
+            </a:pathLst>
+          </a:custGeom>
+        </p:spPr>
+      </p:sp>
+      <p:sp>
+        <p:nvSpPr>
+          <p:cNvPr id="358" name="Google Shape;358;g8c49221f98_6_26:notes"/>
+          <p:cNvSpPr txBox="1">
+            <a:spLocks noGrp="1"/>
+          </p:cNvSpPr>
+          <p:nvPr>
+            <p:ph type="body" idx="1"/>
+          </p:nvPr>
+        </p:nvSpPr>
+        <p:spPr>
+          <a:xfrm>
+            <a:off x="685800" y="4343400"/>
+            <a:ext cx="5486400" cy="4114800"/>
+          </a:xfrm>
+          <a:prstGeom prst="rect">
+            <a:avLst/>
+          </a:prstGeom>
+        </p:spPr>
+        <p:txBody>
+          <a:bodyPr spcFirstLastPara="1" wrap="square" lIns="91425" tIns="91425" rIns="91425" bIns="91425" anchor="t" anchorCtr="0">
+            <a:noAutofit/>
+          </a:bodyPr>
+          <a:lstStyle/>
+          <a:p>
+            <a:pPr marL="0" lvl="0" indent="0" algn="l" rtl="0">
+              <a:spcBef>
+                <a:spcPts val="0"/>
+              </a:spcBef>
+              <a:spcAft>
+                <a:spcPts val="0"/>
+              </a:spcAft>
+              <a:buNone/>
+            </a:pPr>
+            <a:endParaRPr/>
+          </a:p>
+        </p:txBody>
+      </p:sp>
+    </p:spTree>
+  </p:cSld>
+  <p:clrMapOvr>
+    <a:masterClrMapping/>
+  </p:clrMapOvr>
+</p:notes>
+</file>
+
+<file path=ppt/notesSlides/notesSlide31.xml><?xml version="1.0" encoding="utf-8"?>
+<p:notes xmlns:a="http://schemas.openxmlformats.org/drawingml/2006/main" xmlns:r="http://schemas.openxmlformats.org/officeDocument/2006/relationships" xmlns:p="http://schemas.openxmlformats.org/presentationml/2006/main" showMasterSp="0" showMasterPhAnim="0">
+  <p:cSld>
+    <p:spTree>
+      <p:nvGrpSpPr>
         <p:cNvPr id="1" name="Shape 362"/>
         <p:cNvGrpSpPr/>
         <p:nvPr/>
@@ -3282,7 +3387,7 @@
 </p:notes>
 </file>
 
-<file path=ppt/notesSlides/notesSlide31.xml><?xml version="1.0" encoding="utf-8"?>
+<file path=ppt/notesSlides/notesSlide32.xml><?xml version="1.0" encoding="utf-8"?>
 <p:notes xmlns:a="http://schemas.openxmlformats.org/drawingml/2006/main" xmlns:r="http://schemas.openxmlformats.org/officeDocument/2006/relationships" xmlns:p="http://schemas.openxmlformats.org/presentationml/2006/main" showMasterSp="0" showMasterPhAnim="0">
   <p:cSld>
     <p:spTree>
@@ -3415,8 +3520,8 @@
         </p:nvSpPr>
         <p:spPr>
           <a:xfrm>
-            <a:off x="2104459" y="685800"/>
-            <a:ext cx="2649600" cy="3429000"/>
+            <a:off x="2105025" y="685800"/>
+            <a:ext cx="2649538" cy="3429000"/>
           </a:xfrm>
           <a:custGeom>
             <a:avLst/>
@@ -3483,6 +3588,11 @@
         </p:txBody>
       </p:sp>
     </p:spTree>
+    <p:extLst>
+      <p:ext uri="{BB962C8B-B14F-4D97-AF65-F5344CB8AC3E}">
+        <p14:creationId xmlns:p14="http://schemas.microsoft.com/office/powerpoint/2010/main" val="4140992862"/>
+      </p:ext>
+    </p:extLst>
   </p:cSld>
   <p:clrMapOvr>
     <a:masterClrMapping/>
@@ -3491,6 +3601,110 @@
 </file>
 
 <file path=ppt/notesSlides/notesSlide5.xml><?xml version="1.0" encoding="utf-8"?>
+<p:notes xmlns:a="http://schemas.openxmlformats.org/drawingml/2006/main" xmlns:r="http://schemas.openxmlformats.org/officeDocument/2006/relationships" xmlns:p="http://schemas.openxmlformats.org/presentationml/2006/main" showMasterSp="0" showMasterPhAnim="0">
+  <p:cSld>
+    <p:spTree>
+      <p:nvGrpSpPr>
+        <p:cNvPr id="1" name="Shape 208"/>
+        <p:cNvGrpSpPr/>
+        <p:nvPr/>
+      </p:nvGrpSpPr>
+      <p:grpSpPr>
+        <a:xfrm>
+          <a:off x="0" y="0"/>
+          <a:ext cx="0" cy="0"/>
+          <a:chOff x="0" y="0"/>
+          <a:chExt cx="0" cy="0"/>
+        </a:xfrm>
+      </p:grpSpPr>
+      <p:sp>
+        <p:nvSpPr>
+          <p:cNvPr id="209" name="Google Shape;209;g8d8c850c25_0_51:notes"/>
+          <p:cNvSpPr>
+            <a:spLocks noGrp="1" noRot="1" noChangeAspect="1"/>
+          </p:cNvSpPr>
+          <p:nvPr>
+            <p:ph type="sldImg" idx="2"/>
+          </p:nvPr>
+        </p:nvSpPr>
+        <p:spPr>
+          <a:xfrm>
+            <a:off x="2105025" y="685800"/>
+            <a:ext cx="2649538" cy="3429000"/>
+          </a:xfrm>
+          <a:custGeom>
+            <a:avLst/>
+            <a:gdLst/>
+            <a:ahLst/>
+            <a:cxnLst/>
+            <a:rect l="l" t="t" r="r" b="b"/>
+            <a:pathLst>
+              <a:path w="120000" h="120000" extrusionOk="0">
+                <a:moveTo>
+                  <a:pt x="0" y="0"/>
+                </a:moveTo>
+                <a:lnTo>
+                  <a:pt x="120000" y="0"/>
+                </a:lnTo>
+                <a:lnTo>
+                  <a:pt x="120000" y="120000"/>
+                </a:lnTo>
+                <a:lnTo>
+                  <a:pt x="0" y="120000"/>
+                </a:lnTo>
+                <a:close/>
+              </a:path>
+            </a:pathLst>
+          </a:custGeom>
+        </p:spPr>
+      </p:sp>
+      <p:sp>
+        <p:nvSpPr>
+          <p:cNvPr id="210" name="Google Shape;210;g8d8c850c25_0_51:notes"/>
+          <p:cNvSpPr txBox="1">
+            <a:spLocks noGrp="1"/>
+          </p:cNvSpPr>
+          <p:nvPr>
+            <p:ph type="body" idx="1"/>
+          </p:nvPr>
+        </p:nvSpPr>
+        <p:spPr>
+          <a:xfrm>
+            <a:off x="685800" y="4343400"/>
+            <a:ext cx="5486400" cy="4114800"/>
+          </a:xfrm>
+          <a:prstGeom prst="rect">
+            <a:avLst/>
+          </a:prstGeom>
+        </p:spPr>
+        <p:txBody>
+          <a:bodyPr spcFirstLastPara="1" wrap="square" lIns="91425" tIns="91425" rIns="91425" bIns="91425" anchor="t" anchorCtr="0">
+            <a:noAutofit/>
+          </a:bodyPr>
+          <a:lstStyle/>
+          <a:p>
+            <a:pPr marL="0" lvl="0" indent="0" algn="l" rtl="0">
+              <a:spcBef>
+                <a:spcPts val="0"/>
+              </a:spcBef>
+              <a:spcAft>
+                <a:spcPts val="0"/>
+              </a:spcAft>
+              <a:buNone/>
+            </a:pPr>
+            <a:endParaRPr/>
+          </a:p>
+        </p:txBody>
+      </p:sp>
+    </p:spTree>
+  </p:cSld>
+  <p:clrMapOvr>
+    <a:masterClrMapping/>
+  </p:clrMapOvr>
+</p:notes>
+</file>
+
+<file path=ppt/notesSlides/notesSlide6.xml><?xml version="1.0" encoding="utf-8"?>
 <p:notes xmlns:a="http://schemas.openxmlformats.org/drawingml/2006/main" xmlns:r="http://schemas.openxmlformats.org/officeDocument/2006/relationships" xmlns:p="http://schemas.openxmlformats.org/presentationml/2006/main" showMasterSp="0" showMasterPhAnim="0">
   <p:cSld>
     <p:spTree>
@@ -3519,8 +3733,8 @@
         </p:nvSpPr>
         <p:spPr>
           <a:xfrm>
-            <a:off x="2104459" y="685800"/>
-            <a:ext cx="2649600" cy="3429000"/>
+            <a:off x="2105025" y="685800"/>
+            <a:ext cx="2649538" cy="3429000"/>
           </a:xfrm>
           <a:custGeom>
             <a:avLst/>
@@ -3594,7 +3808,7 @@
 </p:notes>
 </file>
 
-<file path=ppt/notesSlides/notesSlide6.xml><?xml version="1.0" encoding="utf-8"?>
+<file path=ppt/notesSlides/notesSlide7.xml><?xml version="1.0" encoding="utf-8"?>
 <p:notes xmlns:a="http://schemas.openxmlformats.org/drawingml/2006/main" xmlns:r="http://schemas.openxmlformats.org/officeDocument/2006/relationships" xmlns:p="http://schemas.openxmlformats.org/presentationml/2006/main" showMasterSp="0" showMasterPhAnim="0">
   <p:cSld>
     <p:spTree>
@@ -3623,8 +3837,8 @@
         </p:nvSpPr>
         <p:spPr>
           <a:xfrm>
-            <a:off x="2104459" y="685800"/>
-            <a:ext cx="2649600" cy="3429000"/>
+            <a:off x="2105025" y="685800"/>
+            <a:ext cx="2649538" cy="3429000"/>
           </a:xfrm>
           <a:custGeom>
             <a:avLst/>
@@ -3698,7 +3912,7 @@
 </p:notes>
 </file>
 
-<file path=ppt/notesSlides/notesSlide7.xml><?xml version="1.0" encoding="utf-8"?>
+<file path=ppt/notesSlides/notesSlide8.xml><?xml version="1.0" encoding="utf-8"?>
 <p:notes xmlns:a="http://schemas.openxmlformats.org/drawingml/2006/main" xmlns:r="http://schemas.openxmlformats.org/officeDocument/2006/relationships" xmlns:p="http://schemas.openxmlformats.org/presentationml/2006/main" showMasterSp="0" showMasterPhAnim="0">
   <p:cSld>
     <p:spTree>
@@ -3802,7 +4016,7 @@
 </p:notes>
 </file>
 
-<file path=ppt/notesSlides/notesSlide8.xml><?xml version="1.0" encoding="utf-8"?>
+<file path=ppt/notesSlides/notesSlide9.xml><?xml version="1.0" encoding="utf-8"?>
 <p:notes xmlns:a="http://schemas.openxmlformats.org/drawingml/2006/main" xmlns:r="http://schemas.openxmlformats.org/officeDocument/2006/relationships" xmlns:p="http://schemas.openxmlformats.org/presentationml/2006/main" showMasterSp="0" showMasterPhAnim="0">
   <p:cSld>
     <p:spTree>
@@ -3901,110 +4115,6 @@
             </a:pathLst>
           </a:custGeom>
         </p:spPr>
-      </p:sp>
-    </p:spTree>
-  </p:cSld>
-  <p:clrMapOvr>
-    <a:masterClrMapping/>
-  </p:clrMapOvr>
-</p:notes>
-</file>
-
-<file path=ppt/notesSlides/notesSlide9.xml><?xml version="1.0" encoding="utf-8"?>
-<p:notes xmlns:a="http://schemas.openxmlformats.org/drawingml/2006/main" xmlns:r="http://schemas.openxmlformats.org/officeDocument/2006/relationships" xmlns:p="http://schemas.openxmlformats.org/presentationml/2006/main" showMasterSp="0" showMasterPhAnim="0">
-  <p:cSld>
-    <p:spTree>
-      <p:nvGrpSpPr>
-        <p:cNvPr id="1" name="Shape 238"/>
-        <p:cNvGrpSpPr/>
-        <p:nvPr/>
-      </p:nvGrpSpPr>
-      <p:grpSpPr>
-        <a:xfrm>
-          <a:off x="0" y="0"/>
-          <a:ext cx="0" cy="0"/>
-          <a:chOff x="0" y="0"/>
-          <a:chExt cx="0" cy="0"/>
-        </a:xfrm>
-      </p:grpSpPr>
-      <p:sp>
-        <p:nvSpPr>
-          <p:cNvPr id="239" name="Google Shape;239;g8d8c850c25_0_92:notes"/>
-          <p:cNvSpPr>
-            <a:spLocks noGrp="1" noRot="1" noChangeAspect="1"/>
-          </p:cNvSpPr>
-          <p:nvPr>
-            <p:ph type="sldImg" idx="2"/>
-          </p:nvPr>
-        </p:nvSpPr>
-        <p:spPr>
-          <a:xfrm>
-            <a:off x="2104459" y="685800"/>
-            <a:ext cx="2649600" cy="3429000"/>
-          </a:xfrm>
-          <a:custGeom>
-            <a:avLst/>
-            <a:gdLst/>
-            <a:ahLst/>
-            <a:cxnLst/>
-            <a:rect l="l" t="t" r="r" b="b"/>
-            <a:pathLst>
-              <a:path w="120000" h="120000" extrusionOk="0">
-                <a:moveTo>
-                  <a:pt x="0" y="0"/>
-                </a:moveTo>
-                <a:lnTo>
-                  <a:pt x="120000" y="0"/>
-                </a:lnTo>
-                <a:lnTo>
-                  <a:pt x="120000" y="120000"/>
-                </a:lnTo>
-                <a:lnTo>
-                  <a:pt x="0" y="120000"/>
-                </a:lnTo>
-                <a:close/>
-              </a:path>
-            </a:pathLst>
-          </a:custGeom>
-        </p:spPr>
-      </p:sp>
-      <p:sp>
-        <p:nvSpPr>
-          <p:cNvPr id="240" name="Google Shape;240;g8d8c850c25_0_92:notes"/>
-          <p:cNvSpPr txBox="1">
-            <a:spLocks noGrp="1"/>
-          </p:cNvSpPr>
-          <p:nvPr>
-            <p:ph type="body" idx="1"/>
-          </p:nvPr>
-        </p:nvSpPr>
-        <p:spPr>
-          <a:xfrm>
-            <a:off x="685800" y="4343400"/>
-            <a:ext cx="5486400" cy="4114800"/>
-          </a:xfrm>
-          <a:prstGeom prst="rect">
-            <a:avLst/>
-          </a:prstGeom>
-        </p:spPr>
-        <p:txBody>
-          <a:bodyPr spcFirstLastPara="1" wrap="square" lIns="91425" tIns="91425" rIns="91425" bIns="91425" anchor="t" anchorCtr="0">
-            <a:noAutofit/>
-          </a:bodyPr>
-          <a:lstStyle/>
-          <a:p>
-            <a:pPr marL="0" lvl="0" indent="0" algn="l" rtl="0">
-              <a:spcBef>
-                <a:spcPts val="0"/>
-              </a:spcBef>
-              <a:spcAft>
-                <a:spcPts val="0"/>
-              </a:spcAft>
-              <a:buNone/>
-            </a:pPr>
-            <a:endParaRPr/>
-          </a:p>
-        </p:txBody>
       </p:sp>
     </p:spTree>
   </p:cSld>
@@ -28101,6 +28211,322 @@
   <p:cSld>
     <p:spTree>
       <p:nvGrpSpPr>
+        <p:cNvPr id="1" name="Shape 241"/>
+        <p:cNvGrpSpPr/>
+        <p:nvPr/>
+      </p:nvGrpSpPr>
+      <p:grpSpPr>
+        <a:xfrm>
+          <a:off x="0" y="0"/>
+          <a:ext cx="0" cy="0"/>
+          <a:chOff x="0" y="0"/>
+          <a:chExt cx="0" cy="0"/>
+        </a:xfrm>
+      </p:grpSpPr>
+      <p:sp>
+        <p:nvSpPr>
+          <p:cNvPr id="242" name="Google Shape;242;p61"/>
+          <p:cNvSpPr txBox="1">
+            <a:spLocks noGrp="1"/>
+          </p:cNvSpPr>
+          <p:nvPr>
+            <p:ph type="title"/>
+          </p:nvPr>
+        </p:nvSpPr>
+        <p:spPr>
+          <a:xfrm>
+            <a:off x="264945" y="870271"/>
+            <a:ext cx="7242600" cy="1119900"/>
+          </a:xfrm>
+          <a:prstGeom prst="rect">
+            <a:avLst/>
+          </a:prstGeom>
+        </p:spPr>
+        <p:txBody>
+          <a:bodyPr spcFirstLastPara="1" wrap="square" lIns="91425" tIns="91425" rIns="91425" bIns="91425" anchor="ctr" anchorCtr="0">
+            <a:noAutofit/>
+          </a:bodyPr>
+          <a:lstStyle/>
+          <a:p>
+            <a:pPr marL="0" lvl="0" indent="0" algn="l" rtl="0">
+              <a:spcBef>
+                <a:spcPts val="0"/>
+              </a:spcBef>
+              <a:spcAft>
+                <a:spcPts val="0"/>
+              </a:spcAft>
+              <a:buNone/>
+            </a:pPr>
+            <a:r>
+              <a:rPr lang="en"/>
+              <a:t>Step 2: Relational Database Design</a:t>
+            </a:r>
+            <a:endParaRPr/>
+          </a:p>
+        </p:txBody>
+      </p:sp>
+      <p:sp>
+        <p:nvSpPr>
+          <p:cNvPr id="243" name="Google Shape;243;p61"/>
+          <p:cNvSpPr txBox="1">
+            <a:spLocks noGrp="1"/>
+          </p:cNvSpPr>
+          <p:nvPr>
+            <p:ph type="body" idx="1"/>
+          </p:nvPr>
+        </p:nvSpPr>
+        <p:spPr>
+          <a:xfrm>
+            <a:off x="264945" y="2253729"/>
+            <a:ext cx="7242600" cy="6239700"/>
+          </a:xfrm>
+          <a:prstGeom prst="rect">
+            <a:avLst/>
+          </a:prstGeom>
+        </p:spPr>
+        <p:txBody>
+          <a:bodyPr spcFirstLastPara="1" wrap="square" lIns="91425" tIns="91425" rIns="91425" bIns="91425" anchor="t" anchorCtr="0">
+            <a:noAutofit/>
+          </a:bodyPr>
+          <a:lstStyle/>
+          <a:p>
+            <a:pPr marL="0" lvl="0" indent="0" algn="l" rtl="0">
+              <a:lnSpc>
+                <a:spcPct val="170000"/>
+              </a:lnSpc>
+              <a:spcBef>
+                <a:spcPts val="0"/>
+              </a:spcBef>
+              <a:spcAft>
+                <a:spcPts val="0"/>
+              </a:spcAft>
+              <a:buNone/>
+            </a:pPr>
+            <a:r>
+              <a:rPr lang="en" sz="1500">
+                <a:solidFill>
+                  <a:srgbClr val="525C65"/>
+                </a:solidFill>
+                <a:highlight>
+                  <a:srgbClr val="FFFFFF"/>
+                </a:highlight>
+                <a:latin typeface="Open Sans"/>
+                <a:ea typeface="Open Sans"/>
+                <a:cs typeface="Open Sans"/>
+                <a:sym typeface="Open Sans"/>
+              </a:rPr>
+              <a:t>This step is where you will go through the process of designing a new database for Tech ABC Corp's HR department. Using the </a:t>
+            </a:r>
+            <a:r>
+              <a:rPr lang="en" sz="1500" u="sng">
+                <a:solidFill>
+                  <a:schemeClr val="hlink"/>
+                </a:solidFill>
+                <a:highlight>
+                  <a:srgbClr val="FFFFFF"/>
+                </a:highlight>
+                <a:latin typeface="Open Sans"/>
+                <a:ea typeface="Open Sans"/>
+                <a:cs typeface="Open Sans"/>
+                <a:sym typeface="Open Sans"/>
+                <a:hlinkClick r:id="rId3"/>
+              </a:rPr>
+              <a:t>dataset</a:t>
+            </a:r>
+            <a:r>
+              <a:rPr lang="en" sz="1500">
+                <a:solidFill>
+                  <a:srgbClr val="525C65"/>
+                </a:solidFill>
+                <a:highlight>
+                  <a:srgbClr val="FFFFFF"/>
+                </a:highlight>
+                <a:latin typeface="Open Sans"/>
+                <a:ea typeface="Open Sans"/>
+                <a:cs typeface="Open Sans"/>
+                <a:sym typeface="Open Sans"/>
+              </a:rPr>
+              <a:t> provided, along with the requirements gathered in step one, you are going to develop a relational database set to the 3NF.</a:t>
+            </a:r>
+            <a:endParaRPr sz="1500">
+              <a:solidFill>
+                <a:srgbClr val="525C65"/>
+              </a:solidFill>
+              <a:highlight>
+                <a:srgbClr val="FFFFFF"/>
+              </a:highlight>
+              <a:latin typeface="Open Sans"/>
+              <a:ea typeface="Open Sans"/>
+              <a:cs typeface="Open Sans"/>
+              <a:sym typeface="Open Sans"/>
+            </a:endParaRPr>
+          </a:p>
+          <a:p>
+            <a:pPr marL="0" lvl="0" indent="0" algn="l" rtl="0">
+              <a:lnSpc>
+                <a:spcPct val="170000"/>
+              </a:lnSpc>
+              <a:spcBef>
+                <a:spcPts val="1100"/>
+              </a:spcBef>
+              <a:spcAft>
+                <a:spcPts val="0"/>
+              </a:spcAft>
+              <a:buNone/>
+            </a:pPr>
+            <a:endParaRPr sz="500">
+              <a:solidFill>
+                <a:srgbClr val="525C65"/>
+              </a:solidFill>
+              <a:highlight>
+                <a:srgbClr val="FFFFFF"/>
+              </a:highlight>
+              <a:latin typeface="Open Sans"/>
+              <a:ea typeface="Open Sans"/>
+              <a:cs typeface="Open Sans"/>
+              <a:sym typeface="Open Sans"/>
+            </a:endParaRPr>
+          </a:p>
+          <a:p>
+            <a:pPr marL="0" lvl="0" indent="0" algn="l" rtl="0">
+              <a:lnSpc>
+                <a:spcPct val="170000"/>
+              </a:lnSpc>
+              <a:spcBef>
+                <a:spcPts val="1100"/>
+              </a:spcBef>
+              <a:spcAft>
+                <a:spcPts val="0"/>
+              </a:spcAft>
+              <a:buNone/>
+            </a:pPr>
+            <a:r>
+              <a:rPr lang="en" sz="1500">
+                <a:solidFill>
+                  <a:srgbClr val="525C65"/>
+                </a:solidFill>
+                <a:highlight>
+                  <a:srgbClr val="FFFFFF"/>
+                </a:highlight>
+                <a:latin typeface="Open Sans"/>
+                <a:ea typeface="Open Sans"/>
+                <a:cs typeface="Open Sans"/>
+                <a:sym typeface="Open Sans"/>
+              </a:rPr>
+              <a:t>Using Lucidchart, you will create 3 entity relationship diagrams (ERDs) to show how you developed the final design for your data.</a:t>
+            </a:r>
+            <a:endParaRPr sz="1500">
+              <a:solidFill>
+                <a:srgbClr val="525C65"/>
+              </a:solidFill>
+              <a:highlight>
+                <a:srgbClr val="FFFFFF"/>
+              </a:highlight>
+              <a:latin typeface="Open Sans"/>
+              <a:ea typeface="Open Sans"/>
+              <a:cs typeface="Open Sans"/>
+              <a:sym typeface="Open Sans"/>
+            </a:endParaRPr>
+          </a:p>
+          <a:p>
+            <a:pPr marL="0" lvl="0" indent="0" algn="l" rtl="0">
+              <a:lnSpc>
+                <a:spcPct val="170000"/>
+              </a:lnSpc>
+              <a:spcBef>
+                <a:spcPts val="1100"/>
+              </a:spcBef>
+              <a:spcAft>
+                <a:spcPts val="0"/>
+              </a:spcAft>
+              <a:buNone/>
+            </a:pPr>
+            <a:endParaRPr sz="500">
+              <a:solidFill>
+                <a:srgbClr val="525C65"/>
+              </a:solidFill>
+              <a:highlight>
+                <a:srgbClr val="FFFFFF"/>
+              </a:highlight>
+              <a:latin typeface="Open Sans"/>
+              <a:ea typeface="Open Sans"/>
+              <a:cs typeface="Open Sans"/>
+              <a:sym typeface="Open Sans"/>
+            </a:endParaRPr>
+          </a:p>
+          <a:p>
+            <a:pPr marL="0" lvl="0" indent="0" algn="l" rtl="0">
+              <a:lnSpc>
+                <a:spcPct val="170000"/>
+              </a:lnSpc>
+              <a:spcBef>
+                <a:spcPts val="1100"/>
+              </a:spcBef>
+              <a:spcAft>
+                <a:spcPts val="0"/>
+              </a:spcAft>
+              <a:buClr>
+                <a:schemeClr val="dk1"/>
+              </a:buClr>
+              <a:buSzPts val="1100"/>
+              <a:buFont typeface="Arial"/>
+              <a:buNone/>
+            </a:pPr>
+            <a:r>
+              <a:rPr lang="en" sz="1500">
+                <a:solidFill>
+                  <a:srgbClr val="525C65"/>
+                </a:solidFill>
+                <a:highlight>
+                  <a:srgbClr val="FFFFFF"/>
+                </a:highlight>
+                <a:latin typeface="Open Sans"/>
+                <a:ea typeface="Open Sans"/>
+                <a:cs typeface="Open Sans"/>
+                <a:sym typeface="Open Sans"/>
+              </a:rPr>
+              <a:t>You will submit a screenshot for each of the 3 ERDs you create. You will find detailed instructions for developing each of the ERDs over the next several pages.</a:t>
+            </a:r>
+            <a:endParaRPr sz="1500">
+              <a:solidFill>
+                <a:srgbClr val="525C65"/>
+              </a:solidFill>
+              <a:highlight>
+                <a:srgbClr val="FFFFFF"/>
+              </a:highlight>
+              <a:latin typeface="Open Sans"/>
+              <a:ea typeface="Open Sans"/>
+              <a:cs typeface="Open Sans"/>
+              <a:sym typeface="Open Sans"/>
+            </a:endParaRPr>
+          </a:p>
+          <a:p>
+            <a:pPr marL="0" lvl="0" indent="0" algn="l" rtl="0">
+              <a:spcBef>
+                <a:spcPts val="1100"/>
+              </a:spcBef>
+              <a:spcAft>
+                <a:spcPts val="1600"/>
+              </a:spcAft>
+              <a:buNone/>
+            </a:pPr>
+            <a:endParaRPr sz="2200"/>
+          </a:p>
+        </p:txBody>
+      </p:sp>
+    </p:spTree>
+  </p:cSld>
+  <p:clrMapOvr>
+    <a:masterClrMapping/>
+  </p:clrMapOvr>
+</p:sld>
+</file>
+
+<file path=ppt/slides/slide11.xml><?xml version="1.0" encoding="utf-8"?>
+<p:sld xmlns:a="http://schemas.openxmlformats.org/drawingml/2006/main" xmlns:r="http://schemas.openxmlformats.org/officeDocument/2006/relationships" xmlns:p="http://schemas.openxmlformats.org/presentationml/2006/main">
+  <p:cSld>
+    <p:spTree>
+      <p:nvGrpSpPr>
         <p:cNvPr id="1" name="Shape 247"/>
         <p:cNvGrpSpPr/>
         <p:nvPr/>
@@ -28400,7 +28826,7 @@
 </p:sld>
 </file>
 
-<file path=ppt/slides/slide11.xml><?xml version="1.0" encoding="utf-8"?>
+<file path=ppt/slides/slide12.xml><?xml version="1.0" encoding="utf-8"?>
 <p:sld xmlns:a="http://schemas.openxmlformats.org/drawingml/2006/main" xmlns:r="http://schemas.openxmlformats.org/officeDocument/2006/relationships" xmlns:p="http://schemas.openxmlformats.org/presentationml/2006/main">
   <p:cSld>
     <p:spTree>
@@ -30607,7 +31033,7 @@
 </p:sld>
 </file>
 
-<file path=ppt/slides/slide12.xml><?xml version="1.0" encoding="utf-8"?>
+<file path=ppt/slides/slide13.xml><?xml version="1.0" encoding="utf-8"?>
 <p:sld xmlns:a="http://schemas.openxmlformats.org/drawingml/2006/main" xmlns:r="http://schemas.openxmlformats.org/officeDocument/2006/relationships" xmlns:p="http://schemas.openxmlformats.org/presentationml/2006/main">
   <p:cSld>
     <p:spTree>
@@ -30762,7 +31188,7 @@
 </p:sld>
 </file>
 
-<file path=ppt/slides/slide13.xml><?xml version="1.0" encoding="utf-8"?>
+<file path=ppt/slides/slide14.xml><?xml version="1.0" encoding="utf-8"?>
 <p:sld xmlns:a="http://schemas.openxmlformats.org/drawingml/2006/main" xmlns:r="http://schemas.openxmlformats.org/officeDocument/2006/relationships" xmlns:p="http://schemas.openxmlformats.org/presentationml/2006/main">
   <p:cSld>
     <p:spTree>
@@ -30993,7 +31419,7 @@
 </p:sld>
 </file>
 
-<file path=ppt/slides/slide14.xml><?xml version="1.0" encoding="utf-8"?>
+<file path=ppt/slides/slide15.xml><?xml version="1.0" encoding="utf-8"?>
 <p:sld xmlns:a="http://schemas.openxmlformats.org/drawingml/2006/main" xmlns:r="http://schemas.openxmlformats.org/officeDocument/2006/relationships" xmlns:p="http://schemas.openxmlformats.org/presentationml/2006/main">
   <p:cSld>
     <p:spTree>
@@ -31110,7 +31536,7 @@
 </p:sld>
 </file>
 
-<file path=ppt/slides/slide15.xml><?xml version="1.0" encoding="utf-8"?>
+<file path=ppt/slides/slide16.xml><?xml version="1.0" encoding="utf-8"?>
 <p:sld xmlns:a="http://schemas.openxmlformats.org/drawingml/2006/main" xmlns:r="http://schemas.openxmlformats.org/officeDocument/2006/relationships" xmlns:p="http://schemas.openxmlformats.org/presentationml/2006/main">
   <p:cSld>
     <p:bg>
@@ -31302,7 +31728,7 @@
 </p:sld>
 </file>
 
-<file path=ppt/slides/slide16.xml><?xml version="1.0" encoding="utf-8"?>
+<file path=ppt/slides/slide17.xml><?xml version="1.0" encoding="utf-8"?>
 <p:sld xmlns:a="http://schemas.openxmlformats.org/drawingml/2006/main" xmlns:r="http://schemas.openxmlformats.org/officeDocument/2006/relationships" xmlns:p="http://schemas.openxmlformats.org/presentationml/2006/main">
   <p:cSld>
     <p:spTree>
@@ -32179,7 +32605,7 @@
 </p:sld>
 </file>
 
-<file path=ppt/slides/slide17.xml><?xml version="1.0" encoding="utf-8"?>
+<file path=ppt/slides/slide18.xml><?xml version="1.0" encoding="utf-8"?>
 <p:sld xmlns:a="http://schemas.openxmlformats.org/drawingml/2006/main" xmlns:r="http://schemas.openxmlformats.org/officeDocument/2006/relationships" xmlns:p="http://schemas.openxmlformats.org/presentationml/2006/main">
   <p:cSld>
     <p:spTree>
@@ -32605,7 +33031,7 @@
 </p:sld>
 </file>
 
-<file path=ppt/slides/slide18.xml><?xml version="1.0" encoding="utf-8"?>
+<file path=ppt/slides/slide19.xml><?xml version="1.0" encoding="utf-8"?>
 <p:sld xmlns:a="http://schemas.openxmlformats.org/drawingml/2006/main" xmlns:r="http://schemas.openxmlformats.org/officeDocument/2006/relationships" xmlns:p="http://schemas.openxmlformats.org/presentationml/2006/main">
   <p:cSld>
     <p:spTree>
@@ -32938,412 +33364,6 @@
       <p:pic>
         <p:nvPicPr>
           <p:cNvPr id="290" name="Google Shape;290;p68"/>
-          <p:cNvPicPr preferRelativeResize="0"/>
-          <p:nvPr/>
-        </p:nvPicPr>
-        <p:blipFill>
-          <a:blip r:embed="rId3">
-            <a:alphaModFix/>
-          </a:blip>
-          <a:stretch>
-            <a:fillRect/>
-          </a:stretch>
-        </p:blipFill>
-        <p:spPr>
-          <a:xfrm>
-            <a:off x="1088175" y="4781750"/>
-            <a:ext cx="5036025" cy="3241700"/>
-          </a:xfrm>
-          <a:prstGeom prst="rect">
-            <a:avLst/>
-          </a:prstGeom>
-          <a:noFill/>
-          <a:ln w="9525" cap="flat" cmpd="sng">
-            <a:solidFill>
-              <a:schemeClr val="dk2"/>
-            </a:solidFill>
-            <a:prstDash val="solid"/>
-            <a:round/>
-            <a:headEnd type="none" w="sm" len="sm"/>
-            <a:tailEnd type="none" w="sm" len="sm"/>
-          </a:ln>
-        </p:spPr>
-      </p:pic>
-    </p:spTree>
-  </p:cSld>
-  <p:clrMapOvr>
-    <a:masterClrMapping/>
-  </p:clrMapOvr>
-</p:sld>
-</file>
-
-<file path=ppt/slides/slide19.xml><?xml version="1.0" encoding="utf-8"?>
-<p:sld xmlns:a="http://schemas.openxmlformats.org/drawingml/2006/main" xmlns:r="http://schemas.openxmlformats.org/officeDocument/2006/relationships" xmlns:p="http://schemas.openxmlformats.org/presentationml/2006/main">
-  <p:cSld>
-    <p:spTree>
-      <p:nvGrpSpPr>
-        <p:cNvPr id="1" name="Shape 294"/>
-        <p:cNvGrpSpPr/>
-        <p:nvPr/>
-      </p:nvGrpSpPr>
-      <p:grpSpPr>
-        <a:xfrm>
-          <a:off x="0" y="0"/>
-          <a:ext cx="0" cy="0"/>
-          <a:chOff x="0" y="0"/>
-          <a:chExt cx="0" cy="0"/>
-        </a:xfrm>
-      </p:grpSpPr>
-      <p:sp>
-        <p:nvSpPr>
-          <p:cNvPr id="295" name="Google Shape;295;p69"/>
-          <p:cNvSpPr txBox="1">
-            <a:spLocks noGrp="1"/>
-          </p:cNvSpPr>
-          <p:nvPr>
-            <p:ph type="title"/>
-          </p:nvPr>
-        </p:nvSpPr>
-        <p:spPr>
-          <a:xfrm>
-            <a:off x="264945" y="870271"/>
-            <a:ext cx="7242600" cy="1119900"/>
-          </a:xfrm>
-          <a:prstGeom prst="rect">
-            <a:avLst/>
-          </a:prstGeom>
-        </p:spPr>
-        <p:txBody>
-          <a:bodyPr spcFirstLastPara="1" wrap="square" lIns="91425" tIns="91425" rIns="91425" bIns="91425" anchor="ctr" anchorCtr="0">
-            <a:noAutofit/>
-          </a:bodyPr>
-          <a:lstStyle/>
-          <a:p>
-            <a:pPr marL="0" lvl="0" indent="0" algn="l" rtl="0">
-              <a:spcBef>
-                <a:spcPts val="0"/>
-              </a:spcBef>
-              <a:spcAft>
-                <a:spcPts val="0"/>
-              </a:spcAft>
-              <a:buNone/>
-            </a:pPr>
-            <a:r>
-              <a:rPr lang="en"/>
-              <a:t>CRUD</a:t>
-            </a:r>
-            <a:endParaRPr/>
-          </a:p>
-        </p:txBody>
-      </p:sp>
-      <p:sp>
-        <p:nvSpPr>
-          <p:cNvPr id="296" name="Google Shape;296;p69"/>
-          <p:cNvSpPr txBox="1">
-            <a:spLocks noGrp="1"/>
-          </p:cNvSpPr>
-          <p:nvPr>
-            <p:ph type="body" idx="1"/>
-          </p:nvPr>
-        </p:nvSpPr>
-        <p:spPr>
-          <a:xfrm>
-            <a:off x="264950" y="2118049"/>
-            <a:ext cx="7242600" cy="7731900"/>
-          </a:xfrm>
-          <a:prstGeom prst="rect">
-            <a:avLst/>
-          </a:prstGeom>
-        </p:spPr>
-        <p:txBody>
-          <a:bodyPr spcFirstLastPara="1" wrap="square" lIns="91425" tIns="91425" rIns="91425" bIns="91425" anchor="t" anchorCtr="0">
-            <a:noAutofit/>
-          </a:bodyPr>
-          <a:lstStyle/>
-          <a:p>
-            <a:pPr marL="0" lvl="0" indent="0" algn="l" rtl="0">
-              <a:spcBef>
-                <a:spcPts val="0"/>
-              </a:spcBef>
-              <a:spcAft>
-                <a:spcPts val="0"/>
-              </a:spcAft>
-              <a:buNone/>
-            </a:pPr>
-            <a:endParaRPr sz="1900"/>
-          </a:p>
-          <a:p>
-            <a:pPr marL="457200" lvl="0" indent="-349250" algn="l" rtl="0">
-              <a:spcBef>
-                <a:spcPts val="1600"/>
-              </a:spcBef>
-              <a:spcAft>
-                <a:spcPts val="0"/>
-              </a:spcAft>
-              <a:buSzPts val="1900"/>
-              <a:buFont typeface="Open Sans"/>
-              <a:buChar char="●"/>
-            </a:pPr>
-            <a:r>
-              <a:rPr lang="en" sz="1900" b="1">
-                <a:latin typeface="Open Sans"/>
-                <a:ea typeface="Open Sans"/>
-                <a:cs typeface="Open Sans"/>
-                <a:sym typeface="Open Sans"/>
-              </a:rPr>
-              <a:t>Question 2: Insert Web Programmer as a new job title</a:t>
-            </a:r>
-            <a:endParaRPr sz="1900" b="1">
-              <a:latin typeface="Open Sans"/>
-              <a:ea typeface="Open Sans"/>
-              <a:cs typeface="Open Sans"/>
-              <a:sym typeface="Open Sans"/>
-            </a:endParaRPr>
-          </a:p>
-          <a:p>
-            <a:pPr marL="0" lvl="0" indent="0" algn="l" rtl="0">
-              <a:spcBef>
-                <a:spcPts val="1600"/>
-              </a:spcBef>
-              <a:spcAft>
-                <a:spcPts val="0"/>
-              </a:spcAft>
-              <a:buNone/>
-            </a:pPr>
-            <a:endParaRPr sz="1900" b="1">
-              <a:latin typeface="Open Sans"/>
-              <a:ea typeface="Open Sans"/>
-              <a:cs typeface="Open Sans"/>
-              <a:sym typeface="Open Sans"/>
-            </a:endParaRPr>
-          </a:p>
-          <a:p>
-            <a:pPr marL="0" lvl="0" indent="0" algn="l" rtl="0">
-              <a:lnSpc>
-                <a:spcPct val="170000"/>
-              </a:lnSpc>
-              <a:spcBef>
-                <a:spcPts val="1600"/>
-              </a:spcBef>
-              <a:spcAft>
-                <a:spcPts val="0"/>
-              </a:spcAft>
-              <a:buClr>
-                <a:schemeClr val="dk1"/>
-              </a:buClr>
-              <a:buSzPts val="1100"/>
-              <a:buFont typeface="Arial"/>
-              <a:buNone/>
-            </a:pPr>
-            <a:r>
-              <a:rPr lang="en" sz="1200">
-                <a:solidFill>
-                  <a:srgbClr val="525C65"/>
-                </a:solidFill>
-                <a:highlight>
-                  <a:schemeClr val="lt1"/>
-                </a:highlight>
-                <a:latin typeface="Open Sans"/>
-                <a:ea typeface="Open Sans"/>
-                <a:cs typeface="Open Sans"/>
-                <a:sym typeface="Open Sans"/>
-              </a:rPr>
-              <a:t>    </a:t>
-            </a:r>
-            <a:r>
-              <a:rPr lang="en" sz="1200">
-                <a:solidFill>
-                  <a:srgbClr val="FF0000"/>
-                </a:solidFill>
-                <a:highlight>
-                  <a:schemeClr val="lt1"/>
-                </a:highlight>
-                <a:latin typeface="Open Sans"/>
-                <a:ea typeface="Open Sans"/>
-                <a:cs typeface="Open Sans"/>
-                <a:sym typeface="Open Sans"/>
-              </a:rPr>
-              <a:t>** Replace example screenshot below with your response, and include the query in a SQL file</a:t>
-            </a:r>
-            <a:endParaRPr sz="1900" b="1">
-              <a:latin typeface="Open Sans"/>
-              <a:ea typeface="Open Sans"/>
-              <a:cs typeface="Open Sans"/>
-              <a:sym typeface="Open Sans"/>
-            </a:endParaRPr>
-          </a:p>
-          <a:p>
-            <a:pPr marL="0" lvl="0" indent="0" algn="l" rtl="0">
-              <a:spcBef>
-                <a:spcPts val="0"/>
-              </a:spcBef>
-              <a:spcAft>
-                <a:spcPts val="0"/>
-              </a:spcAft>
-              <a:buNone/>
-            </a:pPr>
-            <a:endParaRPr sz="1900" b="1">
-              <a:latin typeface="Open Sans"/>
-              <a:ea typeface="Open Sans"/>
-              <a:cs typeface="Open Sans"/>
-              <a:sym typeface="Open Sans"/>
-            </a:endParaRPr>
-          </a:p>
-          <a:p>
-            <a:pPr marL="0" lvl="0" indent="0" algn="l" rtl="0">
-              <a:spcBef>
-                <a:spcPts val="1600"/>
-              </a:spcBef>
-              <a:spcAft>
-                <a:spcPts val="0"/>
-              </a:spcAft>
-              <a:buNone/>
-            </a:pPr>
-            <a:endParaRPr sz="1900" b="1">
-              <a:latin typeface="Open Sans"/>
-              <a:ea typeface="Open Sans"/>
-              <a:cs typeface="Open Sans"/>
-              <a:sym typeface="Open Sans"/>
-            </a:endParaRPr>
-          </a:p>
-          <a:p>
-            <a:pPr marL="0" lvl="0" indent="0" algn="l" rtl="0">
-              <a:spcBef>
-                <a:spcPts val="1600"/>
-              </a:spcBef>
-              <a:spcAft>
-                <a:spcPts val="0"/>
-              </a:spcAft>
-              <a:buNone/>
-            </a:pPr>
-            <a:endParaRPr sz="1900" b="1">
-              <a:latin typeface="Open Sans"/>
-              <a:ea typeface="Open Sans"/>
-              <a:cs typeface="Open Sans"/>
-              <a:sym typeface="Open Sans"/>
-            </a:endParaRPr>
-          </a:p>
-          <a:p>
-            <a:pPr marL="0" lvl="0" indent="0" algn="l" rtl="0">
-              <a:spcBef>
-                <a:spcPts val="1600"/>
-              </a:spcBef>
-              <a:spcAft>
-                <a:spcPts val="0"/>
-              </a:spcAft>
-              <a:buNone/>
-            </a:pPr>
-            <a:endParaRPr sz="1900" b="1">
-              <a:latin typeface="Open Sans"/>
-              <a:ea typeface="Open Sans"/>
-              <a:cs typeface="Open Sans"/>
-              <a:sym typeface="Open Sans"/>
-            </a:endParaRPr>
-          </a:p>
-          <a:p>
-            <a:pPr marL="457200" lvl="0" indent="0" algn="l" rtl="0">
-              <a:spcBef>
-                <a:spcPts val="1600"/>
-              </a:spcBef>
-              <a:spcAft>
-                <a:spcPts val="0"/>
-              </a:spcAft>
-              <a:buNone/>
-            </a:pPr>
-            <a:endParaRPr sz="1900" b="1">
-              <a:latin typeface="Open Sans"/>
-              <a:ea typeface="Open Sans"/>
-              <a:cs typeface="Open Sans"/>
-              <a:sym typeface="Open Sans"/>
-            </a:endParaRPr>
-          </a:p>
-          <a:p>
-            <a:pPr marL="0" lvl="0" indent="0" algn="l" rtl="0">
-              <a:spcBef>
-                <a:spcPts val="1600"/>
-              </a:spcBef>
-              <a:spcAft>
-                <a:spcPts val="0"/>
-              </a:spcAft>
-              <a:buNone/>
-            </a:pPr>
-            <a:endParaRPr sz="1900" b="1">
-              <a:latin typeface="Open Sans"/>
-              <a:ea typeface="Open Sans"/>
-              <a:cs typeface="Open Sans"/>
-              <a:sym typeface="Open Sans"/>
-            </a:endParaRPr>
-          </a:p>
-          <a:p>
-            <a:pPr marL="0" lvl="0" indent="0" algn="l" rtl="0">
-              <a:spcBef>
-                <a:spcPts val="1600"/>
-              </a:spcBef>
-              <a:spcAft>
-                <a:spcPts val="0"/>
-              </a:spcAft>
-              <a:buNone/>
-            </a:pPr>
-            <a:endParaRPr sz="1900" b="1">
-              <a:latin typeface="Open Sans"/>
-              <a:ea typeface="Open Sans"/>
-              <a:cs typeface="Open Sans"/>
-              <a:sym typeface="Open Sans"/>
-            </a:endParaRPr>
-          </a:p>
-          <a:p>
-            <a:pPr marL="0" lvl="0" indent="0" algn="l" rtl="0">
-              <a:spcBef>
-                <a:spcPts val="1600"/>
-              </a:spcBef>
-              <a:spcAft>
-                <a:spcPts val="0"/>
-              </a:spcAft>
-              <a:buNone/>
-            </a:pPr>
-            <a:endParaRPr sz="1900"/>
-          </a:p>
-          <a:p>
-            <a:pPr marL="457200" lvl="0" indent="0" algn="l" rtl="0">
-              <a:spcBef>
-                <a:spcPts val="1600"/>
-              </a:spcBef>
-              <a:spcAft>
-                <a:spcPts val="0"/>
-              </a:spcAft>
-              <a:buNone/>
-            </a:pPr>
-            <a:endParaRPr sz="1900"/>
-          </a:p>
-          <a:p>
-            <a:pPr marL="457200" lvl="0" indent="0" algn="l" rtl="0">
-              <a:spcBef>
-                <a:spcPts val="1600"/>
-              </a:spcBef>
-              <a:spcAft>
-                <a:spcPts val="0"/>
-              </a:spcAft>
-              <a:buNone/>
-            </a:pPr>
-            <a:endParaRPr sz="1900"/>
-          </a:p>
-          <a:p>
-            <a:pPr marL="457200" lvl="0" indent="0" algn="l" rtl="0">
-              <a:spcBef>
-                <a:spcPts val="1600"/>
-              </a:spcBef>
-              <a:spcAft>
-                <a:spcPts val="1600"/>
-              </a:spcAft>
-              <a:buNone/>
-            </a:pPr>
-            <a:endParaRPr sz="1900"/>
-          </a:p>
-        </p:txBody>
-      </p:sp>
-      <p:pic>
-        <p:nvPicPr>
-          <p:cNvPr id="297" name="Google Shape;297;p69"/>
           <p:cNvPicPr preferRelativeResize="0"/>
           <p:nvPr/>
         </p:nvPicPr>
@@ -33635,6 +33655,412 @@
   <p:cSld>
     <p:spTree>
       <p:nvGrpSpPr>
+        <p:cNvPr id="1" name="Shape 294"/>
+        <p:cNvGrpSpPr/>
+        <p:nvPr/>
+      </p:nvGrpSpPr>
+      <p:grpSpPr>
+        <a:xfrm>
+          <a:off x="0" y="0"/>
+          <a:ext cx="0" cy="0"/>
+          <a:chOff x="0" y="0"/>
+          <a:chExt cx="0" cy="0"/>
+        </a:xfrm>
+      </p:grpSpPr>
+      <p:sp>
+        <p:nvSpPr>
+          <p:cNvPr id="295" name="Google Shape;295;p69"/>
+          <p:cNvSpPr txBox="1">
+            <a:spLocks noGrp="1"/>
+          </p:cNvSpPr>
+          <p:nvPr>
+            <p:ph type="title"/>
+          </p:nvPr>
+        </p:nvSpPr>
+        <p:spPr>
+          <a:xfrm>
+            <a:off x="264945" y="870271"/>
+            <a:ext cx="7242600" cy="1119900"/>
+          </a:xfrm>
+          <a:prstGeom prst="rect">
+            <a:avLst/>
+          </a:prstGeom>
+        </p:spPr>
+        <p:txBody>
+          <a:bodyPr spcFirstLastPara="1" wrap="square" lIns="91425" tIns="91425" rIns="91425" bIns="91425" anchor="ctr" anchorCtr="0">
+            <a:noAutofit/>
+          </a:bodyPr>
+          <a:lstStyle/>
+          <a:p>
+            <a:pPr marL="0" lvl="0" indent="0" algn="l" rtl="0">
+              <a:spcBef>
+                <a:spcPts val="0"/>
+              </a:spcBef>
+              <a:spcAft>
+                <a:spcPts val="0"/>
+              </a:spcAft>
+              <a:buNone/>
+            </a:pPr>
+            <a:r>
+              <a:rPr lang="en"/>
+              <a:t>CRUD</a:t>
+            </a:r>
+            <a:endParaRPr/>
+          </a:p>
+        </p:txBody>
+      </p:sp>
+      <p:sp>
+        <p:nvSpPr>
+          <p:cNvPr id="296" name="Google Shape;296;p69"/>
+          <p:cNvSpPr txBox="1">
+            <a:spLocks noGrp="1"/>
+          </p:cNvSpPr>
+          <p:nvPr>
+            <p:ph type="body" idx="1"/>
+          </p:nvPr>
+        </p:nvSpPr>
+        <p:spPr>
+          <a:xfrm>
+            <a:off x="264950" y="2118049"/>
+            <a:ext cx="7242600" cy="7731900"/>
+          </a:xfrm>
+          <a:prstGeom prst="rect">
+            <a:avLst/>
+          </a:prstGeom>
+        </p:spPr>
+        <p:txBody>
+          <a:bodyPr spcFirstLastPara="1" wrap="square" lIns="91425" tIns="91425" rIns="91425" bIns="91425" anchor="t" anchorCtr="0">
+            <a:noAutofit/>
+          </a:bodyPr>
+          <a:lstStyle/>
+          <a:p>
+            <a:pPr marL="0" lvl="0" indent="0" algn="l" rtl="0">
+              <a:spcBef>
+                <a:spcPts val="0"/>
+              </a:spcBef>
+              <a:spcAft>
+                <a:spcPts val="0"/>
+              </a:spcAft>
+              <a:buNone/>
+            </a:pPr>
+            <a:endParaRPr sz="1900"/>
+          </a:p>
+          <a:p>
+            <a:pPr marL="457200" lvl="0" indent="-349250" algn="l" rtl="0">
+              <a:spcBef>
+                <a:spcPts val="1600"/>
+              </a:spcBef>
+              <a:spcAft>
+                <a:spcPts val="0"/>
+              </a:spcAft>
+              <a:buSzPts val="1900"/>
+              <a:buFont typeface="Open Sans"/>
+              <a:buChar char="●"/>
+            </a:pPr>
+            <a:r>
+              <a:rPr lang="en" sz="1900" b="1">
+                <a:latin typeface="Open Sans"/>
+                <a:ea typeface="Open Sans"/>
+                <a:cs typeface="Open Sans"/>
+                <a:sym typeface="Open Sans"/>
+              </a:rPr>
+              <a:t>Question 2: Insert Web Programmer as a new job title</a:t>
+            </a:r>
+            <a:endParaRPr sz="1900" b="1">
+              <a:latin typeface="Open Sans"/>
+              <a:ea typeface="Open Sans"/>
+              <a:cs typeface="Open Sans"/>
+              <a:sym typeface="Open Sans"/>
+            </a:endParaRPr>
+          </a:p>
+          <a:p>
+            <a:pPr marL="0" lvl="0" indent="0" algn="l" rtl="0">
+              <a:spcBef>
+                <a:spcPts val="1600"/>
+              </a:spcBef>
+              <a:spcAft>
+                <a:spcPts val="0"/>
+              </a:spcAft>
+              <a:buNone/>
+            </a:pPr>
+            <a:endParaRPr sz="1900" b="1">
+              <a:latin typeface="Open Sans"/>
+              <a:ea typeface="Open Sans"/>
+              <a:cs typeface="Open Sans"/>
+              <a:sym typeface="Open Sans"/>
+            </a:endParaRPr>
+          </a:p>
+          <a:p>
+            <a:pPr marL="0" lvl="0" indent="0" algn="l" rtl="0">
+              <a:lnSpc>
+                <a:spcPct val="170000"/>
+              </a:lnSpc>
+              <a:spcBef>
+                <a:spcPts val="1600"/>
+              </a:spcBef>
+              <a:spcAft>
+                <a:spcPts val="0"/>
+              </a:spcAft>
+              <a:buClr>
+                <a:schemeClr val="dk1"/>
+              </a:buClr>
+              <a:buSzPts val="1100"/>
+              <a:buFont typeface="Arial"/>
+              <a:buNone/>
+            </a:pPr>
+            <a:r>
+              <a:rPr lang="en" sz="1200">
+                <a:solidFill>
+                  <a:srgbClr val="525C65"/>
+                </a:solidFill>
+                <a:highlight>
+                  <a:schemeClr val="lt1"/>
+                </a:highlight>
+                <a:latin typeface="Open Sans"/>
+                <a:ea typeface="Open Sans"/>
+                <a:cs typeface="Open Sans"/>
+                <a:sym typeface="Open Sans"/>
+              </a:rPr>
+              <a:t>    </a:t>
+            </a:r>
+            <a:r>
+              <a:rPr lang="en" sz="1200">
+                <a:solidFill>
+                  <a:srgbClr val="FF0000"/>
+                </a:solidFill>
+                <a:highlight>
+                  <a:schemeClr val="lt1"/>
+                </a:highlight>
+                <a:latin typeface="Open Sans"/>
+                <a:ea typeface="Open Sans"/>
+                <a:cs typeface="Open Sans"/>
+                <a:sym typeface="Open Sans"/>
+              </a:rPr>
+              <a:t>** Replace example screenshot below with your response, and include the query in a SQL file</a:t>
+            </a:r>
+            <a:endParaRPr sz="1900" b="1">
+              <a:latin typeface="Open Sans"/>
+              <a:ea typeface="Open Sans"/>
+              <a:cs typeface="Open Sans"/>
+              <a:sym typeface="Open Sans"/>
+            </a:endParaRPr>
+          </a:p>
+          <a:p>
+            <a:pPr marL="0" lvl="0" indent="0" algn="l" rtl="0">
+              <a:spcBef>
+                <a:spcPts val="0"/>
+              </a:spcBef>
+              <a:spcAft>
+                <a:spcPts val="0"/>
+              </a:spcAft>
+              <a:buNone/>
+            </a:pPr>
+            <a:endParaRPr sz="1900" b="1">
+              <a:latin typeface="Open Sans"/>
+              <a:ea typeface="Open Sans"/>
+              <a:cs typeface="Open Sans"/>
+              <a:sym typeface="Open Sans"/>
+            </a:endParaRPr>
+          </a:p>
+          <a:p>
+            <a:pPr marL="0" lvl="0" indent="0" algn="l" rtl="0">
+              <a:spcBef>
+                <a:spcPts val="1600"/>
+              </a:spcBef>
+              <a:spcAft>
+                <a:spcPts val="0"/>
+              </a:spcAft>
+              <a:buNone/>
+            </a:pPr>
+            <a:endParaRPr sz="1900" b="1">
+              <a:latin typeface="Open Sans"/>
+              <a:ea typeface="Open Sans"/>
+              <a:cs typeface="Open Sans"/>
+              <a:sym typeface="Open Sans"/>
+            </a:endParaRPr>
+          </a:p>
+          <a:p>
+            <a:pPr marL="0" lvl="0" indent="0" algn="l" rtl="0">
+              <a:spcBef>
+                <a:spcPts val="1600"/>
+              </a:spcBef>
+              <a:spcAft>
+                <a:spcPts val="0"/>
+              </a:spcAft>
+              <a:buNone/>
+            </a:pPr>
+            <a:endParaRPr sz="1900" b="1">
+              <a:latin typeface="Open Sans"/>
+              <a:ea typeface="Open Sans"/>
+              <a:cs typeface="Open Sans"/>
+              <a:sym typeface="Open Sans"/>
+            </a:endParaRPr>
+          </a:p>
+          <a:p>
+            <a:pPr marL="0" lvl="0" indent="0" algn="l" rtl="0">
+              <a:spcBef>
+                <a:spcPts val="1600"/>
+              </a:spcBef>
+              <a:spcAft>
+                <a:spcPts val="0"/>
+              </a:spcAft>
+              <a:buNone/>
+            </a:pPr>
+            <a:endParaRPr sz="1900" b="1">
+              <a:latin typeface="Open Sans"/>
+              <a:ea typeface="Open Sans"/>
+              <a:cs typeface="Open Sans"/>
+              <a:sym typeface="Open Sans"/>
+            </a:endParaRPr>
+          </a:p>
+          <a:p>
+            <a:pPr marL="457200" lvl="0" indent="0" algn="l" rtl="0">
+              <a:spcBef>
+                <a:spcPts val="1600"/>
+              </a:spcBef>
+              <a:spcAft>
+                <a:spcPts val="0"/>
+              </a:spcAft>
+              <a:buNone/>
+            </a:pPr>
+            <a:endParaRPr sz="1900" b="1">
+              <a:latin typeface="Open Sans"/>
+              <a:ea typeface="Open Sans"/>
+              <a:cs typeface="Open Sans"/>
+              <a:sym typeface="Open Sans"/>
+            </a:endParaRPr>
+          </a:p>
+          <a:p>
+            <a:pPr marL="0" lvl="0" indent="0" algn="l" rtl="0">
+              <a:spcBef>
+                <a:spcPts val="1600"/>
+              </a:spcBef>
+              <a:spcAft>
+                <a:spcPts val="0"/>
+              </a:spcAft>
+              <a:buNone/>
+            </a:pPr>
+            <a:endParaRPr sz="1900" b="1">
+              <a:latin typeface="Open Sans"/>
+              <a:ea typeface="Open Sans"/>
+              <a:cs typeface="Open Sans"/>
+              <a:sym typeface="Open Sans"/>
+            </a:endParaRPr>
+          </a:p>
+          <a:p>
+            <a:pPr marL="0" lvl="0" indent="0" algn="l" rtl="0">
+              <a:spcBef>
+                <a:spcPts val="1600"/>
+              </a:spcBef>
+              <a:spcAft>
+                <a:spcPts val="0"/>
+              </a:spcAft>
+              <a:buNone/>
+            </a:pPr>
+            <a:endParaRPr sz="1900" b="1">
+              <a:latin typeface="Open Sans"/>
+              <a:ea typeface="Open Sans"/>
+              <a:cs typeface="Open Sans"/>
+              <a:sym typeface="Open Sans"/>
+            </a:endParaRPr>
+          </a:p>
+          <a:p>
+            <a:pPr marL="0" lvl="0" indent="0" algn="l" rtl="0">
+              <a:spcBef>
+                <a:spcPts val="1600"/>
+              </a:spcBef>
+              <a:spcAft>
+                <a:spcPts val="0"/>
+              </a:spcAft>
+              <a:buNone/>
+            </a:pPr>
+            <a:endParaRPr sz="1900"/>
+          </a:p>
+          <a:p>
+            <a:pPr marL="457200" lvl="0" indent="0" algn="l" rtl="0">
+              <a:spcBef>
+                <a:spcPts val="1600"/>
+              </a:spcBef>
+              <a:spcAft>
+                <a:spcPts val="0"/>
+              </a:spcAft>
+              <a:buNone/>
+            </a:pPr>
+            <a:endParaRPr sz="1900"/>
+          </a:p>
+          <a:p>
+            <a:pPr marL="457200" lvl="0" indent="0" algn="l" rtl="0">
+              <a:spcBef>
+                <a:spcPts val="1600"/>
+              </a:spcBef>
+              <a:spcAft>
+                <a:spcPts val="0"/>
+              </a:spcAft>
+              <a:buNone/>
+            </a:pPr>
+            <a:endParaRPr sz="1900"/>
+          </a:p>
+          <a:p>
+            <a:pPr marL="457200" lvl="0" indent="0" algn="l" rtl="0">
+              <a:spcBef>
+                <a:spcPts val="1600"/>
+              </a:spcBef>
+              <a:spcAft>
+                <a:spcPts val="1600"/>
+              </a:spcAft>
+              <a:buNone/>
+            </a:pPr>
+            <a:endParaRPr sz="1900"/>
+          </a:p>
+        </p:txBody>
+      </p:sp>
+      <p:pic>
+        <p:nvPicPr>
+          <p:cNvPr id="297" name="Google Shape;297;p69"/>
+          <p:cNvPicPr preferRelativeResize="0"/>
+          <p:nvPr/>
+        </p:nvPicPr>
+        <p:blipFill>
+          <a:blip r:embed="rId3">
+            <a:alphaModFix/>
+          </a:blip>
+          <a:stretch>
+            <a:fillRect/>
+          </a:stretch>
+        </p:blipFill>
+        <p:spPr>
+          <a:xfrm>
+            <a:off x="1088175" y="4781750"/>
+            <a:ext cx="5036025" cy="3241700"/>
+          </a:xfrm>
+          <a:prstGeom prst="rect">
+            <a:avLst/>
+          </a:prstGeom>
+          <a:noFill/>
+          <a:ln w="9525" cap="flat" cmpd="sng">
+            <a:solidFill>
+              <a:schemeClr val="dk2"/>
+            </a:solidFill>
+            <a:prstDash val="solid"/>
+            <a:round/>
+            <a:headEnd type="none" w="sm" len="sm"/>
+            <a:tailEnd type="none" w="sm" len="sm"/>
+          </a:ln>
+        </p:spPr>
+      </p:pic>
+    </p:spTree>
+  </p:cSld>
+  <p:clrMapOvr>
+    <a:masterClrMapping/>
+  </p:clrMapOvr>
+</p:sld>
+</file>
+
+<file path=ppt/slides/slide21.xml><?xml version="1.0" encoding="utf-8"?>
+<p:sld xmlns:a="http://schemas.openxmlformats.org/drawingml/2006/main" xmlns:r="http://schemas.openxmlformats.org/officeDocument/2006/relationships" xmlns:p="http://schemas.openxmlformats.org/presentationml/2006/main">
+  <p:cSld>
+    <p:spTree>
+      <p:nvGrpSpPr>
         <p:cNvPr id="1" name="Shape 301"/>
         <p:cNvGrpSpPr/>
         <p:nvPr/>
@@ -34055,7 +34481,7 @@
 </p:sld>
 </file>
 
-<file path=ppt/slides/slide21.xml><?xml version="1.0" encoding="utf-8"?>
+<file path=ppt/slides/slide22.xml><?xml version="1.0" encoding="utf-8"?>
 <p:sld xmlns:a="http://schemas.openxmlformats.org/drawingml/2006/main" xmlns:r="http://schemas.openxmlformats.org/officeDocument/2006/relationships" xmlns:p="http://schemas.openxmlformats.org/presentationml/2006/main">
   <p:cSld>
     <p:spTree>
@@ -34480,7 +34906,7 @@
 </p:sld>
 </file>
 
-<file path=ppt/slides/slide22.xml><?xml version="1.0" encoding="utf-8"?>
+<file path=ppt/slides/slide23.xml><?xml version="1.0" encoding="utf-8"?>
 <p:sld xmlns:a="http://schemas.openxmlformats.org/drawingml/2006/main" xmlns:r="http://schemas.openxmlformats.org/officeDocument/2006/relationships" xmlns:p="http://schemas.openxmlformats.org/presentationml/2006/main">
   <p:cSld>
     <p:spTree>
@@ -34881,7 +35307,7 @@
 </p:sld>
 </file>
 
-<file path=ppt/slides/slide23.xml><?xml version="1.0" encoding="utf-8"?>
+<file path=ppt/slides/slide24.xml><?xml version="1.0" encoding="utf-8"?>
 <p:sld xmlns:a="http://schemas.openxmlformats.org/drawingml/2006/main" xmlns:r="http://schemas.openxmlformats.org/officeDocument/2006/relationships" xmlns:p="http://schemas.openxmlformats.org/presentationml/2006/main">
   <p:cSld>
     <p:spTree>
@@ -35265,7 +35691,7 @@
 </p:sld>
 </file>
 
-<file path=ppt/slides/slide24.xml><?xml version="1.0" encoding="utf-8"?>
+<file path=ppt/slides/slide25.xml><?xml version="1.0" encoding="utf-8"?>
 <p:sld xmlns:a="http://schemas.openxmlformats.org/drawingml/2006/main" xmlns:r="http://schemas.openxmlformats.org/officeDocument/2006/relationships" xmlns:p="http://schemas.openxmlformats.org/presentationml/2006/main">
   <p:cSld>
     <p:spTree>
@@ -35483,7 +35909,7 @@
 </p:sld>
 </file>
 
-<file path=ppt/slides/slide25.xml><?xml version="1.0" encoding="utf-8"?>
+<file path=ppt/slides/slide26.xml><?xml version="1.0" encoding="utf-8"?>
 <p:sld xmlns:a="http://schemas.openxmlformats.org/drawingml/2006/main" xmlns:r="http://schemas.openxmlformats.org/officeDocument/2006/relationships" xmlns:p="http://schemas.openxmlformats.org/presentationml/2006/main">
   <p:cSld>
     <p:bg>
@@ -35675,7 +36101,7 @@
 </p:sld>
 </file>
 
-<file path=ppt/slides/slide26.xml><?xml version="1.0" encoding="utf-8"?>
+<file path=ppt/slides/slide27.xml><?xml version="1.0" encoding="utf-8"?>
 <p:sld xmlns:a="http://schemas.openxmlformats.org/drawingml/2006/main" xmlns:r="http://schemas.openxmlformats.org/officeDocument/2006/relationships" xmlns:p="http://schemas.openxmlformats.org/presentationml/2006/main">
   <p:cSld>
     <p:spTree>
@@ -35843,7 +36269,7 @@
 </p:sld>
 </file>
 
-<file path=ppt/slides/slide27.xml><?xml version="1.0" encoding="utf-8"?>
+<file path=ppt/slides/slide28.xml><?xml version="1.0" encoding="utf-8"?>
 <p:sld xmlns:a="http://schemas.openxmlformats.org/drawingml/2006/main" xmlns:r="http://schemas.openxmlformats.org/officeDocument/2006/relationships" xmlns:p="http://schemas.openxmlformats.org/presentationml/2006/main">
   <p:cSld>
     <p:spTree>
@@ -36010,7 +36436,7 @@
 </p:sld>
 </file>
 
-<file path=ppt/slides/slide28.xml><?xml version="1.0" encoding="utf-8"?>
+<file path=ppt/slides/slide29.xml><?xml version="1.0" encoding="utf-8"?>
 <p:sld xmlns:a="http://schemas.openxmlformats.org/drawingml/2006/main" xmlns:r="http://schemas.openxmlformats.org/officeDocument/2006/relationships" xmlns:p="http://schemas.openxmlformats.org/presentationml/2006/main">
   <p:cSld>
     <p:spTree>
@@ -36154,217 +36580,6 @@
               <a:buNone/>
             </a:pPr>
             <a:endParaRPr sz="1900"/>
-          </a:p>
-          <a:p>
-            <a:pPr marL="457200" lvl="0" indent="0" algn="l" rtl="0">
-              <a:spcBef>
-                <a:spcPts val="1600"/>
-              </a:spcBef>
-              <a:spcAft>
-                <a:spcPts val="1600"/>
-              </a:spcAft>
-              <a:buNone/>
-            </a:pPr>
-            <a:endParaRPr sz="1900"/>
-          </a:p>
-        </p:txBody>
-      </p:sp>
-    </p:spTree>
-  </p:cSld>
-  <p:clrMapOvr>
-    <a:masterClrMapping/>
-  </p:clrMapOvr>
-</p:sld>
-</file>
-
-<file path=ppt/slides/slide29.xml><?xml version="1.0" encoding="utf-8"?>
-<p:sld xmlns:a="http://schemas.openxmlformats.org/drawingml/2006/main" xmlns:r="http://schemas.openxmlformats.org/officeDocument/2006/relationships" xmlns:p="http://schemas.openxmlformats.org/presentationml/2006/main">
-  <p:cSld>
-    <p:spTree>
-      <p:nvGrpSpPr>
-        <p:cNvPr id="1" name="Shape 359"/>
-        <p:cNvGrpSpPr/>
-        <p:nvPr/>
-      </p:nvGrpSpPr>
-      <p:grpSpPr>
-        <a:xfrm>
-          <a:off x="0" y="0"/>
-          <a:ext cx="0" cy="0"/>
-          <a:chOff x="0" y="0"/>
-          <a:chExt cx="0" cy="0"/>
-        </a:xfrm>
-      </p:grpSpPr>
-      <p:sp>
-        <p:nvSpPr>
-          <p:cNvPr id="360" name="Google Shape;360;p79"/>
-          <p:cNvSpPr txBox="1">
-            <a:spLocks noGrp="1"/>
-          </p:cNvSpPr>
-          <p:nvPr>
-            <p:ph type="title"/>
-          </p:nvPr>
-        </p:nvSpPr>
-        <p:spPr>
-          <a:xfrm>
-            <a:off x="264945" y="870271"/>
-            <a:ext cx="7242600" cy="1119900"/>
-          </a:xfrm>
-          <a:prstGeom prst="rect">
-            <a:avLst/>
-          </a:prstGeom>
-        </p:spPr>
-        <p:txBody>
-          <a:bodyPr spcFirstLastPara="1" wrap="square" lIns="91425" tIns="91425" rIns="91425" bIns="91425" anchor="ctr" anchorCtr="0">
-            <a:noAutofit/>
-          </a:bodyPr>
-          <a:lstStyle/>
-          <a:p>
-            <a:pPr marL="0" lvl="0" indent="0" algn="l" rtl="0">
-              <a:spcBef>
-                <a:spcPts val="0"/>
-              </a:spcBef>
-              <a:spcAft>
-                <a:spcPts val="0"/>
-              </a:spcAft>
-              <a:buNone/>
-            </a:pPr>
-            <a:r>
-              <a:rPr lang="en"/>
-              <a:t>Standout Suggestion 3</a:t>
-            </a:r>
-            <a:endParaRPr/>
-          </a:p>
-        </p:txBody>
-      </p:sp>
-      <p:sp>
-        <p:nvSpPr>
-          <p:cNvPr id="361" name="Google Shape;361;p79"/>
-          <p:cNvSpPr txBox="1">
-            <a:spLocks noGrp="1"/>
-          </p:cNvSpPr>
-          <p:nvPr>
-            <p:ph type="body" idx="1"/>
-          </p:nvPr>
-        </p:nvSpPr>
-        <p:spPr>
-          <a:xfrm>
-            <a:off x="264950" y="2253724"/>
-            <a:ext cx="7242600" cy="7731900"/>
-          </a:xfrm>
-          <a:prstGeom prst="rect">
-            <a:avLst/>
-          </a:prstGeom>
-        </p:spPr>
-        <p:txBody>
-          <a:bodyPr spcFirstLastPara="1" wrap="square" lIns="91425" tIns="91425" rIns="91425" bIns="91425" anchor="t" anchorCtr="0">
-            <a:noAutofit/>
-          </a:bodyPr>
-          <a:lstStyle/>
-          <a:p>
-            <a:pPr marL="0" lvl="0" indent="0" algn="l" rtl="0">
-              <a:spcBef>
-                <a:spcPts val="0"/>
-              </a:spcBef>
-              <a:spcAft>
-                <a:spcPts val="0"/>
-              </a:spcAft>
-              <a:buNone/>
-            </a:pPr>
-            <a:r>
-              <a:rPr lang="en" sz="2000" b="1">
-                <a:latin typeface="Open Sans"/>
-                <a:ea typeface="Open Sans"/>
-                <a:cs typeface="Open Sans"/>
-                <a:sym typeface="Open Sans"/>
-              </a:rPr>
-              <a:t>Implement user security on the restricted salary attribute.</a:t>
-            </a:r>
-            <a:endParaRPr sz="2000" b="1">
-              <a:latin typeface="Open Sans"/>
-              <a:ea typeface="Open Sans"/>
-              <a:cs typeface="Open Sans"/>
-              <a:sym typeface="Open Sans"/>
-            </a:endParaRPr>
-          </a:p>
-          <a:p>
-            <a:pPr marL="0" lvl="0" indent="0" algn="l" rtl="0">
-              <a:spcBef>
-                <a:spcPts val="1600"/>
-              </a:spcBef>
-              <a:spcAft>
-                <a:spcPts val="0"/>
-              </a:spcAft>
-              <a:buNone/>
-            </a:pPr>
-            <a:r>
-              <a:rPr lang="en" sz="1900">
-                <a:solidFill>
-                  <a:srgbClr val="FF0000"/>
-                </a:solidFill>
-              </a:rPr>
-              <a:t>Create a non-management user named </a:t>
-            </a:r>
-            <a:r>
-              <a:rPr lang="en" sz="1900">
-                <a:solidFill>
-                  <a:srgbClr val="FF0000"/>
-                </a:solidFill>
-                <a:latin typeface="Source Code Pro"/>
-                <a:ea typeface="Source Code Pro"/>
-                <a:cs typeface="Source Code Pro"/>
-                <a:sym typeface="Source Code Pro"/>
-              </a:rPr>
-              <a:t>NoMgr</a:t>
-            </a:r>
-            <a:r>
-              <a:rPr lang="en" sz="1900">
-                <a:solidFill>
-                  <a:srgbClr val="FF0000"/>
-                </a:solidFill>
-                <a:latin typeface="Open Sans"/>
-                <a:ea typeface="Open Sans"/>
-                <a:cs typeface="Open Sans"/>
-                <a:sym typeface="Open Sans"/>
-              </a:rPr>
-              <a:t>.</a:t>
-            </a:r>
-            <a:r>
-              <a:rPr lang="en" sz="1900">
-                <a:solidFill>
-                  <a:srgbClr val="FF0000"/>
-                </a:solidFill>
-              </a:rPr>
-              <a:t> Show the code of how your would grant access to the database, but revoke access to the salary data.</a:t>
-            </a:r>
-            <a:endParaRPr sz="1900">
-              <a:solidFill>
-                <a:srgbClr val="FF0000"/>
-              </a:solidFill>
-            </a:endParaRPr>
-          </a:p>
-          <a:p>
-            <a:pPr marL="0" lvl="0" indent="0" algn="l" rtl="0">
-              <a:spcBef>
-                <a:spcPts val="1600"/>
-              </a:spcBef>
-              <a:spcAft>
-                <a:spcPts val="0"/>
-              </a:spcAft>
-              <a:buNone/>
-            </a:pPr>
-            <a:r>
-              <a:rPr lang="en" sz="1900">
-                <a:solidFill>
-                  <a:srgbClr val="FF0000"/>
-                </a:solidFill>
-              </a:rPr>
-              <a:t>Submit screenshot of code</a:t>
-            </a:r>
-            <a:endParaRPr sz="1900">
-              <a:solidFill>
-                <a:srgbClr val="FF0000"/>
-              </a:solidFill>
-            </a:endParaRPr>
           </a:p>
           <a:p>
             <a:pPr marL="457200" lvl="0" indent="0" algn="l" rtl="0">
@@ -37211,6 +37426,217 @@
 <file path=ppt/slides/slide30.xml><?xml version="1.0" encoding="utf-8"?>
 <p:sld xmlns:a="http://schemas.openxmlformats.org/drawingml/2006/main" xmlns:r="http://schemas.openxmlformats.org/officeDocument/2006/relationships" xmlns:p="http://schemas.openxmlformats.org/presentationml/2006/main">
   <p:cSld>
+    <p:spTree>
+      <p:nvGrpSpPr>
+        <p:cNvPr id="1" name="Shape 359"/>
+        <p:cNvGrpSpPr/>
+        <p:nvPr/>
+      </p:nvGrpSpPr>
+      <p:grpSpPr>
+        <a:xfrm>
+          <a:off x="0" y="0"/>
+          <a:ext cx="0" cy="0"/>
+          <a:chOff x="0" y="0"/>
+          <a:chExt cx="0" cy="0"/>
+        </a:xfrm>
+      </p:grpSpPr>
+      <p:sp>
+        <p:nvSpPr>
+          <p:cNvPr id="360" name="Google Shape;360;p79"/>
+          <p:cNvSpPr txBox="1">
+            <a:spLocks noGrp="1"/>
+          </p:cNvSpPr>
+          <p:nvPr>
+            <p:ph type="title"/>
+          </p:nvPr>
+        </p:nvSpPr>
+        <p:spPr>
+          <a:xfrm>
+            <a:off x="264945" y="870271"/>
+            <a:ext cx="7242600" cy="1119900"/>
+          </a:xfrm>
+          <a:prstGeom prst="rect">
+            <a:avLst/>
+          </a:prstGeom>
+        </p:spPr>
+        <p:txBody>
+          <a:bodyPr spcFirstLastPara="1" wrap="square" lIns="91425" tIns="91425" rIns="91425" bIns="91425" anchor="ctr" anchorCtr="0">
+            <a:noAutofit/>
+          </a:bodyPr>
+          <a:lstStyle/>
+          <a:p>
+            <a:pPr marL="0" lvl="0" indent="0" algn="l" rtl="0">
+              <a:spcBef>
+                <a:spcPts val="0"/>
+              </a:spcBef>
+              <a:spcAft>
+                <a:spcPts val="0"/>
+              </a:spcAft>
+              <a:buNone/>
+            </a:pPr>
+            <a:r>
+              <a:rPr lang="en"/>
+              <a:t>Standout Suggestion 3</a:t>
+            </a:r>
+            <a:endParaRPr/>
+          </a:p>
+        </p:txBody>
+      </p:sp>
+      <p:sp>
+        <p:nvSpPr>
+          <p:cNvPr id="361" name="Google Shape;361;p79"/>
+          <p:cNvSpPr txBox="1">
+            <a:spLocks noGrp="1"/>
+          </p:cNvSpPr>
+          <p:nvPr>
+            <p:ph type="body" idx="1"/>
+          </p:nvPr>
+        </p:nvSpPr>
+        <p:spPr>
+          <a:xfrm>
+            <a:off x="264950" y="2253724"/>
+            <a:ext cx="7242600" cy="7731900"/>
+          </a:xfrm>
+          <a:prstGeom prst="rect">
+            <a:avLst/>
+          </a:prstGeom>
+        </p:spPr>
+        <p:txBody>
+          <a:bodyPr spcFirstLastPara="1" wrap="square" lIns="91425" tIns="91425" rIns="91425" bIns="91425" anchor="t" anchorCtr="0">
+            <a:noAutofit/>
+          </a:bodyPr>
+          <a:lstStyle/>
+          <a:p>
+            <a:pPr marL="0" lvl="0" indent="0" algn="l" rtl="0">
+              <a:spcBef>
+                <a:spcPts val="0"/>
+              </a:spcBef>
+              <a:spcAft>
+                <a:spcPts val="0"/>
+              </a:spcAft>
+              <a:buNone/>
+            </a:pPr>
+            <a:r>
+              <a:rPr lang="en" sz="2000" b="1">
+                <a:latin typeface="Open Sans"/>
+                <a:ea typeface="Open Sans"/>
+                <a:cs typeface="Open Sans"/>
+                <a:sym typeface="Open Sans"/>
+              </a:rPr>
+              <a:t>Implement user security on the restricted salary attribute.</a:t>
+            </a:r>
+            <a:endParaRPr sz="2000" b="1">
+              <a:latin typeface="Open Sans"/>
+              <a:ea typeface="Open Sans"/>
+              <a:cs typeface="Open Sans"/>
+              <a:sym typeface="Open Sans"/>
+            </a:endParaRPr>
+          </a:p>
+          <a:p>
+            <a:pPr marL="0" lvl="0" indent="0" algn="l" rtl="0">
+              <a:spcBef>
+                <a:spcPts val="1600"/>
+              </a:spcBef>
+              <a:spcAft>
+                <a:spcPts val="0"/>
+              </a:spcAft>
+              <a:buNone/>
+            </a:pPr>
+            <a:r>
+              <a:rPr lang="en" sz="1900">
+                <a:solidFill>
+                  <a:srgbClr val="FF0000"/>
+                </a:solidFill>
+              </a:rPr>
+              <a:t>Create a non-management user named </a:t>
+            </a:r>
+            <a:r>
+              <a:rPr lang="en" sz="1900">
+                <a:solidFill>
+                  <a:srgbClr val="FF0000"/>
+                </a:solidFill>
+                <a:latin typeface="Source Code Pro"/>
+                <a:ea typeface="Source Code Pro"/>
+                <a:cs typeface="Source Code Pro"/>
+                <a:sym typeface="Source Code Pro"/>
+              </a:rPr>
+              <a:t>NoMgr</a:t>
+            </a:r>
+            <a:r>
+              <a:rPr lang="en" sz="1900">
+                <a:solidFill>
+                  <a:srgbClr val="FF0000"/>
+                </a:solidFill>
+                <a:latin typeface="Open Sans"/>
+                <a:ea typeface="Open Sans"/>
+                <a:cs typeface="Open Sans"/>
+                <a:sym typeface="Open Sans"/>
+              </a:rPr>
+              <a:t>.</a:t>
+            </a:r>
+            <a:r>
+              <a:rPr lang="en" sz="1900">
+                <a:solidFill>
+                  <a:srgbClr val="FF0000"/>
+                </a:solidFill>
+              </a:rPr>
+              <a:t> Show the code of how your would grant access to the database, but revoke access to the salary data.</a:t>
+            </a:r>
+            <a:endParaRPr sz="1900">
+              <a:solidFill>
+                <a:srgbClr val="FF0000"/>
+              </a:solidFill>
+            </a:endParaRPr>
+          </a:p>
+          <a:p>
+            <a:pPr marL="0" lvl="0" indent="0" algn="l" rtl="0">
+              <a:spcBef>
+                <a:spcPts val="1600"/>
+              </a:spcBef>
+              <a:spcAft>
+                <a:spcPts val="0"/>
+              </a:spcAft>
+              <a:buNone/>
+            </a:pPr>
+            <a:r>
+              <a:rPr lang="en" sz="1900">
+                <a:solidFill>
+                  <a:srgbClr val="FF0000"/>
+                </a:solidFill>
+              </a:rPr>
+              <a:t>Submit screenshot of code</a:t>
+            </a:r>
+            <a:endParaRPr sz="1900">
+              <a:solidFill>
+                <a:srgbClr val="FF0000"/>
+              </a:solidFill>
+            </a:endParaRPr>
+          </a:p>
+          <a:p>
+            <a:pPr marL="457200" lvl="0" indent="0" algn="l" rtl="0">
+              <a:spcBef>
+                <a:spcPts val="1600"/>
+              </a:spcBef>
+              <a:spcAft>
+                <a:spcPts val="1600"/>
+              </a:spcAft>
+              <a:buNone/>
+            </a:pPr>
+            <a:endParaRPr sz="1900"/>
+          </a:p>
+        </p:txBody>
+      </p:sp>
+    </p:spTree>
+  </p:cSld>
+  <p:clrMapOvr>
+    <a:masterClrMapping/>
+  </p:clrMapOvr>
+</p:sld>
+</file>
+
+<file path=ppt/slides/slide31.xml><?xml version="1.0" encoding="utf-8"?>
+<p:sld xmlns:a="http://schemas.openxmlformats.org/drawingml/2006/main" xmlns:r="http://schemas.openxmlformats.org/officeDocument/2006/relationships" xmlns:p="http://schemas.openxmlformats.org/presentationml/2006/main">
+  <p:cSld>
     <p:bg>
       <p:bgPr>
         <a:solidFill>
@@ -37388,7 +37814,7 @@
 </p:sld>
 </file>
 
-<file path=ppt/slides/slide31.xml><?xml version="1.0" encoding="utf-8"?>
+<file path=ppt/slides/slide32.xml><?xml version="1.0" encoding="utf-8"?>
 <p:sld xmlns:a="http://schemas.openxmlformats.org/drawingml/2006/main" xmlns:r="http://schemas.openxmlformats.org/officeDocument/2006/relationships" xmlns:p="http://schemas.openxmlformats.org/presentationml/2006/main">
   <p:cSld>
     <p:spTree>
@@ -37620,7 +38046,7 @@
               <a:buChar char="●"/>
             </a:pPr>
             <a:r>
-              <a:rPr lang="en" sz="1900" b="1" dirty="0">
+              <a:rPr lang="en" sz="1800" b="1" dirty="0">
                 <a:latin typeface="Open Sans"/>
                 <a:ea typeface="Open Sans"/>
                 <a:cs typeface="Open Sans"/>
@@ -37628,7 +38054,7 @@
               </a:rPr>
               <a:t>Purpose of the new database:</a:t>
             </a:r>
-            <a:endParaRPr sz="1900" b="1" dirty="0">
+            <a:endParaRPr sz="1800" b="1" dirty="0">
               <a:latin typeface="Open Sans"/>
               <a:ea typeface="Open Sans"/>
               <a:cs typeface="Open Sans"/>
@@ -37654,30 +38080,19 @@
               <a:buNone/>
             </a:pPr>
             <a:r>
-              <a:rPr lang="en" sz="1700" dirty="0"/>
+              <a:rPr lang="en" sz="1600" dirty="0"/>
               <a:t>What is the business partner requesting  </a:t>
             </a:r>
-            <a:endParaRPr sz="1700" dirty="0"/>
-          </a:p>
-          <a:p>
-            <a:pPr marL="457200" lvl="0" indent="0" algn="l" rtl="0">
-              <a:lnSpc>
-                <a:spcPct val="100000"/>
-              </a:lnSpc>
-              <a:spcBef>
-                <a:spcPts val="0"/>
-              </a:spcBef>
-              <a:spcAft>
-                <a:spcPts val="0"/>
-              </a:spcAft>
-              <a:buClr>
-                <a:schemeClr val="dk1"/>
-              </a:buClr>
-              <a:buSzPts val="1100"/>
-              <a:buFont typeface="Arial"/>
-              <a:buNone/>
+          </a:p>
+          <a:p>
+            <a:pPr marL="742950" lvl="1" indent="-285750">
+              <a:buFont typeface="Wingdings" pitchFamily="2" charset="2"/>
+              <a:buChar char="§"/>
             </a:pPr>
-            <a:endParaRPr sz="1700" dirty="0"/>
+            <a:r>
+              <a:rPr lang="en-US" sz="1600" dirty="0"/>
+              <a:t>Tech ABC Corp has recently experienced a lot of growth with its new AI powered video game console. As a result, company started operations in 4 new locations and its employee strength grew from 10 to over 200 employees. So, it is getting difficult for business partner (HR) to maintain employee information in shared spreadsheet. Besides this, HR partner has serious concerns  about data integrity and data security. Therefore, HR partner wants to maintain this information in database.</a:t>
+            </a:r>
           </a:p>
           <a:p>
             <a:pPr marL="457200" lvl="0" indent="-349250" algn="l" rtl="0">
@@ -37692,7 +38107,7 @@
               <a:buChar char="●"/>
             </a:pPr>
             <a:r>
-              <a:rPr lang="en" sz="1900" b="1" dirty="0">
+              <a:rPr lang="en" sz="1800" b="1" dirty="0">
                 <a:latin typeface="Open Sans"/>
                 <a:ea typeface="Open Sans"/>
                 <a:cs typeface="Open Sans"/>
@@ -37700,7 +38115,7 @@
               </a:rPr>
               <a:t>Describe current data management solution:</a:t>
             </a:r>
-            <a:endParaRPr sz="1900" b="1" dirty="0">
+            <a:endParaRPr sz="1800" b="1" dirty="0">
               <a:solidFill>
                 <a:srgbClr val="000000"/>
               </a:solidFill>
@@ -37721,10 +38136,10 @@
               <a:buNone/>
             </a:pPr>
             <a:r>
-              <a:rPr lang="en" sz="1700" dirty="0"/>
+              <a:rPr lang="en" sz="1600" dirty="0"/>
               <a:t>What is the current method data storage/management</a:t>
             </a:r>
-            <a:endParaRPr sz="1900" dirty="0">
+            <a:endParaRPr sz="1800" dirty="0">
               <a:solidFill>
                 <a:srgbClr val="000000"/>
               </a:solidFill>
@@ -37735,39 +38150,29 @@
             </a:endParaRPr>
           </a:p>
           <a:p>
-            <a:pPr marL="457200" lvl="0" indent="0" algn="l" rtl="0">
+            <a:pPr marL="742950" indent="-285750">
               <a:spcBef>
                 <a:spcPts val="1200"/>
               </a:spcBef>
-              <a:spcAft>
-                <a:spcPts val="0"/>
-              </a:spcAft>
-              <a:buNone/>
+              <a:buFont typeface="Wingdings" pitchFamily="2" charset="2"/>
+              <a:buChar char="§"/>
             </a:pPr>
-            <a:endParaRPr sz="1100" dirty="0">
-              <a:solidFill>
-                <a:srgbClr val="000000"/>
-              </a:solidFill>
-              <a:latin typeface="Arial"/>
-              <a:ea typeface="Arial"/>
-              <a:cs typeface="Arial"/>
-              <a:sym typeface="Arial"/>
-            </a:endParaRPr>
-          </a:p>
-          <a:p>
-            <a:pPr marL="457200" lvl="0" indent="-349250" algn="l" rtl="0">
+            <a:r>
+              <a:rPr lang="en-US" sz="1600" dirty="0"/>
+              <a:t>The current data management solution is manual as employee data is maintained in excel spreadsheet on shared location. </a:t>
+            </a:r>
+          </a:p>
+          <a:p>
+            <a:pPr lvl="0" indent="-349250">
               <a:spcBef>
                 <a:spcPts val="1200"/>
               </a:spcBef>
-              <a:spcAft>
-                <a:spcPts val="0"/>
-              </a:spcAft>
               <a:buSzPts val="1900"/>
               <a:buFont typeface="Open Sans"/>
               <a:buChar char="●"/>
             </a:pPr>
             <a:r>
-              <a:rPr lang="en" sz="1900" b="1" dirty="0">
+              <a:rPr lang="en-US" sz="1800" b="1" dirty="0">
                 <a:latin typeface="Open Sans"/>
                 <a:ea typeface="Open Sans"/>
                 <a:cs typeface="Open Sans"/>
@@ -37775,25 +38180,16 @@
               </a:rPr>
               <a:t>Describe current data available:</a:t>
             </a:r>
-            <a:endParaRPr sz="1900" b="1" dirty="0">
-              <a:latin typeface="Open Sans"/>
-              <a:ea typeface="Open Sans"/>
-              <a:cs typeface="Open Sans"/>
-              <a:sym typeface="Open Sans"/>
-            </a:endParaRPr>
-          </a:p>
-          <a:p>
-            <a:pPr marL="0" lvl="0" indent="0" algn="l" rtl="0">
+          </a:p>
+          <a:p>
+            <a:pPr marL="0" lvl="0" indent="0">
               <a:spcBef>
                 <a:spcPts val="1600"/>
               </a:spcBef>
-              <a:spcAft>
-                <a:spcPts val="0"/>
-              </a:spcAft>
               <a:buNone/>
             </a:pPr>
             <a:r>
-              <a:rPr lang="en" sz="1900" b="1" dirty="0">
+              <a:rPr lang="en-US" sz="1800" b="1" dirty="0">
                 <a:latin typeface="Open Sans"/>
                 <a:ea typeface="Open Sans"/>
                 <a:cs typeface="Open Sans"/>
@@ -37802,11 +38198,166 @@
               <a:t>	</a:t>
             </a:r>
             <a:r>
-              <a:rPr lang="en" sz="1900" dirty="0"/>
+              <a:rPr lang="en-US" sz="1800" dirty="0"/>
               <a:t>What data does the business currently have available</a:t>
             </a:r>
+          </a:p>
+          <a:p>
+            <a:pPr marL="742950" lvl="1" indent="-285750">
+              <a:buFont typeface="Wingdings" pitchFamily="2" charset="2"/>
+              <a:buChar char="§"/>
+            </a:pPr>
+            <a:r>
+              <a:rPr lang="en-US" sz="1600" dirty="0"/>
+              <a:t>The </a:t>
+            </a:r>
+            <a:r>
+              <a:rPr lang="en-US" sz="1600" dirty="0">
+                <a:hlinkClick r:id="rId3">
+                  <a:extLst>
+                    <a:ext uri="{A12FA001-AC4F-418D-AE19-62706E023703}">
+                      <ahyp:hlinkClr xmlns:ahyp="http://schemas.microsoft.com/office/drawing/2018/hyperlinkcolor" val="tx"/>
+                    </a:ext>
+                  </a:extLst>
+                </a:hlinkClick>
+              </a:rPr>
+              <a:t>HR dataset</a:t>
+            </a:r>
+            <a:r>
+              <a:rPr lang="en-US" sz="1600" dirty="0"/>
+              <a:t>  is an Excel workbook consisting of 206 records, with eleven columns. The data is in human-readable format and has not been normalized at all. It contains information such as job title, department, manager's name, hire date, start date, end date, work location, and salary.</a:t>
+            </a:r>
+            <a:endParaRPr sz="1600" dirty="0">
+              <a:sym typeface="Arial"/>
+            </a:endParaRPr>
+          </a:p>
+          <a:p>
+            <a:pPr marL="457200" lvl="0" indent="0" algn="l" rtl="0">
+              <a:spcBef>
+                <a:spcPts val="0"/>
+              </a:spcBef>
+              <a:spcAft>
+                <a:spcPts val="0"/>
+              </a:spcAft>
+              <a:buClr>
+                <a:schemeClr val="dk1"/>
+              </a:buClr>
+              <a:buSzPts val="1100"/>
+              <a:buFont typeface="Arial"/>
+              <a:buNone/>
+            </a:pPr>
             <a:endParaRPr sz="1900" dirty="0"/>
           </a:p>
+          <a:p>
+            <a:pPr marL="457200" lvl="0" indent="0" algn="l" rtl="0">
+              <a:spcBef>
+                <a:spcPts val="1600"/>
+              </a:spcBef>
+              <a:spcAft>
+                <a:spcPts val="1600"/>
+              </a:spcAft>
+              <a:buNone/>
+            </a:pPr>
+            <a:endParaRPr sz="1900" dirty="0"/>
+          </a:p>
+        </p:txBody>
+      </p:sp>
+    </p:spTree>
+    <p:extLst>
+      <p:ext uri="{BB962C8B-B14F-4D97-AF65-F5344CB8AC3E}">
+        <p14:creationId xmlns:p14="http://schemas.microsoft.com/office/powerpoint/2010/main" val="3798810066"/>
+      </p:ext>
+    </p:extLst>
+  </p:cSld>
+  <p:clrMapOvr>
+    <a:masterClrMapping/>
+  </p:clrMapOvr>
+</p:sld>
+</file>
+
+<file path=ppt/slides/slide5.xml><?xml version="1.0" encoding="utf-8"?>
+<p:sld xmlns:a="http://schemas.openxmlformats.org/drawingml/2006/main" xmlns:r="http://schemas.openxmlformats.org/officeDocument/2006/relationships" xmlns:p="http://schemas.openxmlformats.org/presentationml/2006/main">
+  <p:cSld>
+    <p:spTree>
+      <p:nvGrpSpPr>
+        <p:cNvPr id="1" name="Shape 211"/>
+        <p:cNvGrpSpPr/>
+        <p:nvPr/>
+      </p:nvGrpSpPr>
+      <p:grpSpPr>
+        <a:xfrm>
+          <a:off x="0" y="0"/>
+          <a:ext cx="0" cy="0"/>
+          <a:chOff x="0" y="0"/>
+          <a:chExt cx="0" cy="0"/>
+        </a:xfrm>
+      </p:grpSpPr>
+      <p:sp>
+        <p:nvSpPr>
+          <p:cNvPr id="212" name="Google Shape;212;p56"/>
+          <p:cNvSpPr txBox="1">
+            <a:spLocks noGrp="1"/>
+          </p:cNvSpPr>
+          <p:nvPr>
+            <p:ph type="title"/>
+          </p:nvPr>
+        </p:nvSpPr>
+        <p:spPr>
+          <a:xfrm>
+            <a:off x="264945" y="870271"/>
+            <a:ext cx="7242600" cy="1119900"/>
+          </a:xfrm>
+          <a:prstGeom prst="rect">
+            <a:avLst/>
+          </a:prstGeom>
+        </p:spPr>
+        <p:txBody>
+          <a:bodyPr spcFirstLastPara="1" wrap="square" lIns="91425" tIns="91425" rIns="91425" bIns="91425" anchor="ctr" anchorCtr="0">
+            <a:noAutofit/>
+          </a:bodyPr>
+          <a:lstStyle/>
+          <a:p>
+            <a:pPr marL="0" lvl="0" indent="0" algn="l" rtl="0">
+              <a:spcBef>
+                <a:spcPts val="0"/>
+              </a:spcBef>
+              <a:spcAft>
+                <a:spcPts val="0"/>
+              </a:spcAft>
+              <a:buNone/>
+            </a:pPr>
+            <a:r>
+              <a:rPr lang="en"/>
+              <a:t>Data Architect Business Requirement</a:t>
+            </a:r>
+            <a:endParaRPr/>
+          </a:p>
+        </p:txBody>
+      </p:sp>
+      <p:sp>
+        <p:nvSpPr>
+          <p:cNvPr id="213" name="Google Shape;213;p56"/>
+          <p:cNvSpPr txBox="1">
+            <a:spLocks noGrp="1"/>
+          </p:cNvSpPr>
+          <p:nvPr>
+            <p:ph type="body" idx="1"/>
+          </p:nvPr>
+        </p:nvSpPr>
+        <p:spPr>
+          <a:xfrm>
+            <a:off x="264950" y="2253724"/>
+            <a:ext cx="7242600" cy="7731900"/>
+          </a:xfrm>
+          <a:prstGeom prst="rect">
+            <a:avLst/>
+          </a:prstGeom>
+        </p:spPr>
+        <p:txBody>
+          <a:bodyPr spcFirstLastPara="1" wrap="square" lIns="91425" tIns="91425" rIns="91425" bIns="91425" anchor="t" anchorCtr="0">
+            <a:noAutofit/>
+          </a:bodyPr>
+          <a:lstStyle/>
           <a:p>
             <a:pPr marL="457200" lvl="0" indent="-349250" algn="l" rtl="0">
               <a:spcBef>
@@ -37820,7 +38371,7 @@
               <a:buChar char="●"/>
             </a:pPr>
             <a:r>
-              <a:rPr lang="en" sz="1900" b="1" dirty="0">
+              <a:rPr lang="en" sz="1800" b="1" dirty="0">
                 <a:latin typeface="Open Sans"/>
                 <a:ea typeface="Open Sans"/>
                 <a:cs typeface="Open Sans"/>
@@ -37828,7 +38379,7 @@
               </a:rPr>
               <a:t>Additional data requests:</a:t>
             </a:r>
-            <a:endParaRPr sz="1900" b="1" dirty="0">
+            <a:endParaRPr sz="1800" b="1" dirty="0">
               <a:latin typeface="Open Sans"/>
               <a:ea typeface="Open Sans"/>
               <a:cs typeface="Open Sans"/>
@@ -37849,27 +38400,24 @@
               <a:buNone/>
             </a:pPr>
             <a:r>
-              <a:rPr lang="en" sz="1700" dirty="0"/>
+              <a:rPr lang="en" sz="1600" dirty="0"/>
               <a:t>Does the user have future data requests</a:t>
             </a:r>
-            <a:endParaRPr sz="1900" dirty="0"/>
-          </a:p>
-          <a:p>
-            <a:pPr marL="457200" lvl="0" indent="0" algn="l" rtl="0">
-              <a:spcBef>
-                <a:spcPts val="0"/>
-              </a:spcBef>
-              <a:spcAft>
-                <a:spcPts val="0"/>
-              </a:spcAft>
+            <a:endParaRPr sz="1800" dirty="0"/>
+          </a:p>
+          <a:p>
+            <a:pPr indent="0">
               <a:buClr>
                 <a:schemeClr val="dk1"/>
               </a:buClr>
               <a:buSzPts val="1100"/>
-              <a:buFont typeface="Arial"/>
               <a:buNone/>
             </a:pPr>
-            <a:endParaRPr sz="1900" dirty="0"/>
+            <a:r>
+              <a:rPr lang="en-US" sz="1600" dirty="0"/>
+              <a:t>Yes. The HR manager wants this new database to interface with payroll application in the future. </a:t>
+            </a:r>
+            <a:endParaRPr sz="1800" dirty="0"/>
           </a:p>
           <a:p>
             <a:pPr marL="457200" lvl="0" indent="-349250" algn="l" rtl="0">
@@ -37884,7 +38432,7 @@
               <a:buChar char="●"/>
             </a:pPr>
             <a:r>
-              <a:rPr lang="en" sz="1900" b="1" dirty="0">
+              <a:rPr lang="en" sz="1800" b="1" dirty="0">
                 <a:latin typeface="Open Sans"/>
                 <a:ea typeface="Open Sans"/>
                 <a:cs typeface="Open Sans"/>
@@ -37892,7 +38440,7 @@
               </a:rPr>
               <a:t>Who will own/manage data</a:t>
             </a:r>
-            <a:endParaRPr sz="1900" b="1" dirty="0">
+            <a:endParaRPr sz="1800" b="1" dirty="0">
               <a:latin typeface="Open Sans"/>
               <a:ea typeface="Open Sans"/>
               <a:cs typeface="Open Sans"/>
@@ -37913,10 +38461,22 @@
               <a:buNone/>
             </a:pPr>
             <a:r>
-              <a:rPr lang="en" sz="1700" dirty="0"/>
+              <a:rPr lang="en" sz="1600" dirty="0"/>
               <a:t>What department will own / manage the data in the database</a:t>
             </a:r>
-            <a:endParaRPr sz="1900" dirty="0"/>
+            <a:endParaRPr sz="1800" dirty="0"/>
+          </a:p>
+          <a:p>
+            <a:pPr indent="0">
+              <a:lnSpc>
+                <a:spcPct val="100000"/>
+              </a:lnSpc>
+              <a:buNone/>
+            </a:pPr>
+            <a:r>
+              <a:rPr lang="en-US" sz="1600" dirty="0"/>
+              <a:t>Management and HR employees will own and manage data. </a:t>
+            </a:r>
           </a:p>
           <a:p>
             <a:pPr marL="457200" lvl="0" indent="0" algn="l" rtl="0">
@@ -37931,7 +38491,7 @@
               </a:spcAft>
               <a:buNone/>
             </a:pPr>
-            <a:endParaRPr sz="1900" dirty="0"/>
+            <a:endParaRPr sz="1800" dirty="0"/>
           </a:p>
           <a:p>
             <a:pPr marL="457200" lvl="0" indent="-349250" algn="l" rtl="0">
@@ -37946,7 +38506,7 @@
               <a:buChar char="●"/>
             </a:pPr>
             <a:r>
-              <a:rPr lang="en" sz="1900" b="1" dirty="0">
+              <a:rPr lang="en" sz="1800" b="1" dirty="0">
                 <a:latin typeface="Open Sans"/>
                 <a:ea typeface="Open Sans"/>
                 <a:cs typeface="Open Sans"/>
@@ -37954,7 +38514,7 @@
               </a:rPr>
               <a:t>Who will have access to database</a:t>
             </a:r>
-            <a:endParaRPr sz="1900" b="1" dirty="0">
+            <a:endParaRPr sz="1800" b="1" dirty="0">
               <a:latin typeface="Open Sans"/>
               <a:ea typeface="Open Sans"/>
               <a:cs typeface="Open Sans"/>
@@ -37975,10 +38535,23 @@
               <a:buNone/>
             </a:pPr>
             <a:r>
-              <a:rPr lang="en" sz="1700" dirty="0"/>
+              <a:rPr lang="en" sz="1600" dirty="0"/>
               <a:t>List user types that will have access; also list any restrictions to access.</a:t>
             </a:r>
-            <a:endParaRPr sz="1900" dirty="0"/>
+            <a:endParaRPr sz="1800" dirty="0"/>
+          </a:p>
+          <a:p>
+            <a:pPr indent="0">
+              <a:buClr>
+                <a:schemeClr val="dk1"/>
+              </a:buClr>
+              <a:buSzPts val="1100"/>
+              <a:buNone/>
+            </a:pPr>
+            <a:r>
+              <a:rPr lang="en-US" sz="1600" dirty="0"/>
+              <a:t>Following are the two user types who will have access to this new database </a:t>
+            </a:r>
           </a:p>
           <a:p>
             <a:pPr marL="457200" lvl="0" indent="0" algn="l" rtl="0">
@@ -38011,6 +38584,595 @@
           </a:p>
         </p:txBody>
       </p:sp>
+      <p:graphicFrame>
+        <p:nvGraphicFramePr>
+          <p:cNvPr id="5" name="Table 4">
+            <a:extLst>
+              <a:ext uri="{FF2B5EF4-FFF2-40B4-BE49-F238E27FC236}">
+                <a16:creationId xmlns:a16="http://schemas.microsoft.com/office/drawing/2014/main" id="{6E64342E-B3B2-CF46-AFA8-9A8EDB718277}"/>
+              </a:ext>
+            </a:extLst>
+          </p:cNvPr>
+          <p:cNvGraphicFramePr>
+            <a:graphicFrameLocks noGrp="1"/>
+          </p:cNvGraphicFramePr>
+          <p:nvPr>
+            <p:extLst>
+              <p:ext uri="{D42A27DB-BD31-4B8C-83A1-F6EECF244321}">
+                <p14:modId xmlns:p14="http://schemas.microsoft.com/office/powerpoint/2010/main" val="1518919574"/>
+              </p:ext>
+            </p:extLst>
+          </p:nvPr>
+        </p:nvGraphicFramePr>
+        <p:xfrm>
+          <a:off x="752475" y="6845300"/>
+          <a:ext cx="5937250" cy="2170747"/>
+        </p:xfrm>
+        <a:graphic>
+          <a:graphicData uri="http://schemas.openxmlformats.org/drawingml/2006/table">
+            <a:tbl>
+              <a:tblPr firstRow="1" firstCol="1" bandRow="1">
+                <a:tableStyleId>{9D7B26C5-4107-4FEC-AEDC-1716B250A1EF}</a:tableStyleId>
+              </a:tblPr>
+              <a:tblGrid>
+                <a:gridCol w="2968625">
+                  <a:extLst>
+                    <a:ext uri="{9D8B030D-6E8A-4147-A177-3AD203B41FA5}">
+                      <a16:colId xmlns:a16="http://schemas.microsoft.com/office/drawing/2014/main" val="4273966921"/>
+                    </a:ext>
+                  </a:extLst>
+                </a:gridCol>
+                <a:gridCol w="2968625">
+                  <a:extLst>
+                    <a:ext uri="{9D8B030D-6E8A-4147-A177-3AD203B41FA5}">
+                      <a16:colId xmlns:a16="http://schemas.microsoft.com/office/drawing/2014/main" val="3288209409"/>
+                    </a:ext>
+                  </a:extLst>
+                </a:gridCol>
+              </a:tblGrid>
+              <a:tr h="271343">
+                <a:tc>
+                  <a:txBody>
+                    <a:bodyPr/>
+                    <a:lstStyle/>
+                    <a:p>
+                      <a:pPr marL="0" marR="0">
+                        <a:spcBef>
+                          <a:spcPts val="0"/>
+                        </a:spcBef>
+                        <a:spcAft>
+                          <a:spcPts val="0"/>
+                        </a:spcAft>
+                      </a:pPr>
+                      <a:r>
+                        <a:rPr lang="en-US" sz="1600" dirty="0">
+                          <a:effectLst/>
+                        </a:rPr>
+                        <a:t>User Types</a:t>
+                      </a:r>
+                      <a:endParaRPr lang="en-US" sz="1600" dirty="0">
+                        <a:effectLst/>
+                        <a:latin typeface="Times New Roman" panose="02020603050405020304" pitchFamily="18" charset="0"/>
+                        <a:ea typeface="Times New Roman" panose="02020603050405020304" pitchFamily="18" charset="0"/>
+                        <a:cs typeface="Times New Roman" panose="02020603050405020304" pitchFamily="18" charset="0"/>
+                      </a:endParaRPr>
+                    </a:p>
+                  </a:txBody>
+                  <a:tcPr marL="68580" marR="68580" marT="0" marB="0">
+                    <a:lnL w="3175" cap="flat" cmpd="sng" algn="ctr">
+                      <a:solidFill>
+                        <a:schemeClr val="tx1"/>
+                      </a:solidFill>
+                      <a:prstDash val="solid"/>
+                      <a:round/>
+                      <a:headEnd type="none" w="med" len="med"/>
+                      <a:tailEnd type="none" w="med" len="med"/>
+                    </a:lnL>
+                    <a:lnR w="3175" cap="flat" cmpd="sng" algn="ctr">
+                      <a:solidFill>
+                        <a:schemeClr val="tx1"/>
+                      </a:solidFill>
+                      <a:prstDash val="solid"/>
+                      <a:round/>
+                      <a:headEnd type="none" w="med" len="med"/>
+                      <a:tailEnd type="none" w="med" len="med"/>
+                    </a:lnR>
+                    <a:lnT w="3175" cap="flat" cmpd="sng" algn="ctr">
+                      <a:solidFill>
+                        <a:schemeClr val="tx1"/>
+                      </a:solidFill>
+                      <a:prstDash val="solid"/>
+                      <a:round/>
+                      <a:headEnd type="none" w="med" len="med"/>
+                      <a:tailEnd type="none" w="med" len="med"/>
+                    </a:lnT>
+                    <a:lnB w="3175" cap="flat" cmpd="sng" algn="ctr">
+                      <a:solidFill>
+                        <a:schemeClr val="tx1"/>
+                      </a:solidFill>
+                      <a:prstDash val="solid"/>
+                      <a:round/>
+                      <a:headEnd type="none" w="med" len="med"/>
+                      <a:tailEnd type="none" w="med" len="med"/>
+                    </a:lnB>
+                    <a:noFill/>
+                  </a:tcPr>
+                </a:tc>
+                <a:tc>
+                  <a:txBody>
+                    <a:bodyPr/>
+                    <a:lstStyle/>
+                    <a:p>
+                      <a:pPr marL="0" marR="0">
+                        <a:spcBef>
+                          <a:spcPts val="0"/>
+                        </a:spcBef>
+                        <a:spcAft>
+                          <a:spcPts val="0"/>
+                        </a:spcAft>
+                      </a:pPr>
+                      <a:r>
+                        <a:rPr lang="en-US" sz="1600" dirty="0">
+                          <a:effectLst/>
+                        </a:rPr>
+                        <a:t>Access Level &amp; Restrictions</a:t>
+                      </a:r>
+                      <a:endParaRPr lang="en-US" sz="1600" dirty="0">
+                        <a:effectLst/>
+                        <a:latin typeface="Times New Roman" panose="02020603050405020304" pitchFamily="18" charset="0"/>
+                        <a:ea typeface="Times New Roman" panose="02020603050405020304" pitchFamily="18" charset="0"/>
+                        <a:cs typeface="Times New Roman" panose="02020603050405020304" pitchFamily="18" charset="0"/>
+                      </a:endParaRPr>
+                    </a:p>
+                  </a:txBody>
+                  <a:tcPr marL="68580" marR="68580" marT="0" marB="0">
+                    <a:lnL w="3175" cap="flat" cmpd="sng" algn="ctr">
+                      <a:solidFill>
+                        <a:schemeClr val="tx1"/>
+                      </a:solidFill>
+                      <a:prstDash val="solid"/>
+                      <a:round/>
+                      <a:headEnd type="none" w="med" len="med"/>
+                      <a:tailEnd type="none" w="med" len="med"/>
+                    </a:lnL>
+                    <a:lnR w="3175" cap="flat" cmpd="sng" algn="ctr">
+                      <a:solidFill>
+                        <a:schemeClr val="tx1"/>
+                      </a:solidFill>
+                      <a:prstDash val="solid"/>
+                      <a:round/>
+                      <a:headEnd type="none" w="med" len="med"/>
+                      <a:tailEnd type="none" w="med" len="med"/>
+                    </a:lnR>
+                    <a:lnT w="3175" cap="flat" cmpd="sng" algn="ctr">
+                      <a:solidFill>
+                        <a:schemeClr val="tx1"/>
+                      </a:solidFill>
+                      <a:prstDash val="solid"/>
+                      <a:round/>
+                      <a:headEnd type="none" w="med" len="med"/>
+                      <a:tailEnd type="none" w="med" len="med"/>
+                    </a:lnT>
+                    <a:lnB w="3175" cap="flat" cmpd="sng" algn="ctr">
+                      <a:solidFill>
+                        <a:schemeClr val="tx1"/>
+                      </a:solidFill>
+                      <a:prstDash val="solid"/>
+                      <a:round/>
+                      <a:headEnd type="none" w="med" len="med"/>
+                      <a:tailEnd type="none" w="med" len="med"/>
+                    </a:lnB>
+                    <a:noFill/>
+                  </a:tcPr>
+                </a:tc>
+                <a:extLst>
+                  <a:ext uri="{0D108BD9-81ED-4DB2-BD59-A6C34878D82A}">
+                    <a16:rowId xmlns:a16="http://schemas.microsoft.com/office/drawing/2014/main" val="1787259444"/>
+                  </a:ext>
+                </a:extLst>
+              </a:tr>
+              <a:tr h="1085374">
+                <a:tc>
+                  <a:txBody>
+                    <a:bodyPr/>
+                    <a:lstStyle/>
+                    <a:p>
+                      <a:pPr marL="0" marR="0">
+                        <a:spcBef>
+                          <a:spcPts val="0"/>
+                        </a:spcBef>
+                        <a:spcAft>
+                          <a:spcPts val="0"/>
+                        </a:spcAft>
+                      </a:pPr>
+                      <a:r>
+                        <a:rPr lang="en-US" sz="1600" b="0" i="0" u="none" strike="noStrike" cap="none" dirty="0">
+                          <a:solidFill>
+                            <a:schemeClr val="dk2"/>
+                          </a:solidFill>
+                          <a:latin typeface="Open Sans Light"/>
+                          <a:cs typeface="Open Sans Light"/>
+                          <a:sym typeface="Open Sans Light"/>
+                        </a:rPr>
+                        <a:t>Employees</a:t>
+                      </a:r>
+                      <a:endParaRPr lang="en-US" sz="1600" b="0" i="0" u="none" strike="noStrike" cap="none" dirty="0">
+                        <a:solidFill>
+                          <a:schemeClr val="dk2"/>
+                        </a:solidFill>
+                        <a:latin typeface="Open Sans Light"/>
+                        <a:ea typeface="Times New Roman" panose="02020603050405020304" pitchFamily="18" charset="0"/>
+                        <a:cs typeface="Open Sans Light"/>
+                        <a:sym typeface="Open Sans Light"/>
+                      </a:endParaRPr>
+                    </a:p>
+                  </a:txBody>
+                  <a:tcPr marL="68580" marR="68580" marT="0" marB="0">
+                    <a:lnL w="3175" cap="flat" cmpd="sng" algn="ctr">
+                      <a:solidFill>
+                        <a:schemeClr val="tx1"/>
+                      </a:solidFill>
+                      <a:prstDash val="solid"/>
+                      <a:round/>
+                      <a:headEnd type="none" w="med" len="med"/>
+                      <a:tailEnd type="none" w="med" len="med"/>
+                    </a:lnL>
+                    <a:lnR w="3175" cap="flat" cmpd="sng" algn="ctr">
+                      <a:solidFill>
+                        <a:schemeClr val="tx1"/>
+                      </a:solidFill>
+                      <a:prstDash val="solid"/>
+                      <a:round/>
+                      <a:headEnd type="none" w="med" len="med"/>
+                      <a:tailEnd type="none" w="med" len="med"/>
+                    </a:lnR>
+                    <a:lnT w="3175" cap="flat" cmpd="sng" algn="ctr">
+                      <a:solidFill>
+                        <a:schemeClr val="tx1"/>
+                      </a:solidFill>
+                      <a:prstDash val="solid"/>
+                      <a:round/>
+                      <a:headEnd type="none" w="med" len="med"/>
+                      <a:tailEnd type="none" w="med" len="med"/>
+                    </a:lnT>
+                    <a:lnB w="3175" cap="flat" cmpd="sng" algn="ctr">
+                      <a:solidFill>
+                        <a:schemeClr val="tx1"/>
+                      </a:solidFill>
+                      <a:prstDash val="solid"/>
+                      <a:round/>
+                      <a:headEnd type="none" w="med" len="med"/>
+                      <a:tailEnd type="none" w="med" len="med"/>
+                    </a:lnB>
+                    <a:noFill/>
+                  </a:tcPr>
+                </a:tc>
+                <a:tc>
+                  <a:txBody>
+                    <a:bodyPr/>
+                    <a:lstStyle/>
+                    <a:p>
+                      <a:pPr marL="0" marR="0">
+                        <a:spcBef>
+                          <a:spcPts val="0"/>
+                        </a:spcBef>
+                        <a:spcAft>
+                          <a:spcPts val="0"/>
+                        </a:spcAft>
+                      </a:pPr>
+                      <a:r>
+                        <a:rPr lang="en-US" sz="1600" b="0" i="0" u="none" strike="noStrike" cap="none" dirty="0">
+                          <a:solidFill>
+                            <a:schemeClr val="dk2"/>
+                          </a:solidFill>
+                          <a:latin typeface="Open Sans Light"/>
+                          <a:cs typeface="Open Sans Light"/>
+                          <a:sym typeface="Open Sans Light"/>
+                        </a:rPr>
+                        <a:t>- Read only access</a:t>
+                      </a:r>
+                    </a:p>
+                    <a:p>
+                      <a:pPr marL="0" marR="0">
+                        <a:spcBef>
+                          <a:spcPts val="0"/>
+                        </a:spcBef>
+                        <a:spcAft>
+                          <a:spcPts val="0"/>
+                        </a:spcAft>
+                      </a:pPr>
+                      <a:r>
+                        <a:rPr lang="en-US" sz="1600" b="0" i="0" u="none" strike="noStrike" cap="none" dirty="0">
+                          <a:solidFill>
+                            <a:schemeClr val="dk2"/>
+                          </a:solidFill>
+                          <a:latin typeface="Open Sans Light"/>
+                          <a:cs typeface="Open Sans Light"/>
+                          <a:sym typeface="Open Sans Light"/>
+                        </a:rPr>
+                        <a:t>- No access to salary information</a:t>
+                      </a:r>
+                    </a:p>
+                    <a:p>
+                      <a:pPr marL="0" marR="0">
+                        <a:spcBef>
+                          <a:spcPts val="0"/>
+                        </a:spcBef>
+                        <a:spcAft>
+                          <a:spcPts val="0"/>
+                        </a:spcAft>
+                      </a:pPr>
+                      <a:r>
+                        <a:rPr lang="en-US" sz="1600" b="0" i="0" u="none" strike="noStrike" cap="none" dirty="0">
+                          <a:solidFill>
+                            <a:schemeClr val="dk2"/>
+                          </a:solidFill>
+                          <a:latin typeface="Open Sans Light"/>
+                          <a:cs typeface="Open Sans Light"/>
+                          <a:sym typeface="Open Sans Light"/>
+                        </a:rPr>
+                        <a:t> </a:t>
+                      </a:r>
+                      <a:endParaRPr lang="en-US" sz="1600" b="0" i="0" u="none" strike="noStrike" cap="none" dirty="0">
+                        <a:solidFill>
+                          <a:schemeClr val="dk2"/>
+                        </a:solidFill>
+                        <a:latin typeface="Open Sans Light"/>
+                        <a:ea typeface="Times New Roman" panose="02020603050405020304" pitchFamily="18" charset="0"/>
+                        <a:cs typeface="Open Sans Light"/>
+                        <a:sym typeface="Open Sans Light"/>
+                      </a:endParaRPr>
+                    </a:p>
+                  </a:txBody>
+                  <a:tcPr marL="68580" marR="68580" marT="0" marB="0">
+                    <a:lnL w="3175" cap="flat" cmpd="sng" algn="ctr">
+                      <a:solidFill>
+                        <a:schemeClr val="tx1"/>
+                      </a:solidFill>
+                      <a:prstDash val="solid"/>
+                      <a:round/>
+                      <a:headEnd type="none" w="med" len="med"/>
+                      <a:tailEnd type="none" w="med" len="med"/>
+                    </a:lnL>
+                    <a:lnR w="3175" cap="flat" cmpd="sng" algn="ctr">
+                      <a:solidFill>
+                        <a:schemeClr val="tx1"/>
+                      </a:solidFill>
+                      <a:prstDash val="solid"/>
+                      <a:round/>
+                      <a:headEnd type="none" w="med" len="med"/>
+                      <a:tailEnd type="none" w="med" len="med"/>
+                    </a:lnR>
+                    <a:lnT w="3175" cap="flat" cmpd="sng" algn="ctr">
+                      <a:solidFill>
+                        <a:schemeClr val="tx1"/>
+                      </a:solidFill>
+                      <a:prstDash val="solid"/>
+                      <a:round/>
+                      <a:headEnd type="none" w="med" len="med"/>
+                      <a:tailEnd type="none" w="med" len="med"/>
+                    </a:lnT>
+                    <a:lnB w="3175" cap="flat" cmpd="sng" algn="ctr">
+                      <a:solidFill>
+                        <a:schemeClr val="tx1"/>
+                      </a:solidFill>
+                      <a:prstDash val="solid"/>
+                      <a:round/>
+                      <a:headEnd type="none" w="med" len="med"/>
+                      <a:tailEnd type="none" w="med" len="med"/>
+                    </a:lnB>
+                    <a:noFill/>
+                  </a:tcPr>
+                </a:tc>
+                <a:extLst>
+                  <a:ext uri="{0D108BD9-81ED-4DB2-BD59-A6C34878D82A}">
+                    <a16:rowId xmlns:a16="http://schemas.microsoft.com/office/drawing/2014/main" val="2353780201"/>
+                  </a:ext>
+                </a:extLst>
+              </a:tr>
+              <a:tr h="814030">
+                <a:tc>
+                  <a:txBody>
+                    <a:bodyPr/>
+                    <a:lstStyle/>
+                    <a:p>
+                      <a:pPr marL="0" marR="0">
+                        <a:spcBef>
+                          <a:spcPts val="0"/>
+                        </a:spcBef>
+                        <a:spcAft>
+                          <a:spcPts val="0"/>
+                        </a:spcAft>
+                      </a:pPr>
+                      <a:r>
+                        <a:rPr lang="en-US" sz="1600" b="0" i="0" u="none" strike="noStrike" cap="none">
+                          <a:solidFill>
+                            <a:schemeClr val="dk2"/>
+                          </a:solidFill>
+                          <a:latin typeface="Open Sans Light"/>
+                          <a:cs typeface="Open Sans Light"/>
+                          <a:sym typeface="Open Sans Light"/>
+                        </a:rPr>
+                        <a:t>HR and management level Employees</a:t>
+                      </a:r>
+                    </a:p>
+                    <a:p>
+                      <a:pPr marL="0" marR="0">
+                        <a:spcBef>
+                          <a:spcPts val="0"/>
+                        </a:spcBef>
+                        <a:spcAft>
+                          <a:spcPts val="0"/>
+                        </a:spcAft>
+                      </a:pPr>
+                      <a:r>
+                        <a:rPr lang="en-US" sz="1600" b="0" i="0" u="none" strike="noStrike" cap="none">
+                          <a:solidFill>
+                            <a:schemeClr val="dk2"/>
+                          </a:solidFill>
+                          <a:latin typeface="Open Sans Light"/>
+                          <a:cs typeface="Open Sans Light"/>
+                          <a:sym typeface="Open Sans Light"/>
+                        </a:rPr>
+                        <a:t> </a:t>
+                      </a:r>
+                      <a:endParaRPr lang="en-US" sz="1600" b="0" i="0" u="none" strike="noStrike" cap="none">
+                        <a:solidFill>
+                          <a:schemeClr val="dk2"/>
+                        </a:solidFill>
+                        <a:latin typeface="Open Sans Light"/>
+                        <a:ea typeface="Times New Roman" panose="02020603050405020304" pitchFamily="18" charset="0"/>
+                        <a:cs typeface="Open Sans Light"/>
+                        <a:sym typeface="Open Sans Light"/>
+                      </a:endParaRPr>
+                    </a:p>
+                  </a:txBody>
+                  <a:tcPr marL="68580" marR="68580" marT="0" marB="0">
+                    <a:lnL w="3175" cap="flat" cmpd="sng" algn="ctr">
+                      <a:solidFill>
+                        <a:schemeClr val="tx1"/>
+                      </a:solidFill>
+                      <a:prstDash val="solid"/>
+                      <a:round/>
+                      <a:headEnd type="none" w="med" len="med"/>
+                      <a:tailEnd type="none" w="med" len="med"/>
+                    </a:lnL>
+                    <a:lnR w="3175" cap="flat" cmpd="sng" algn="ctr">
+                      <a:solidFill>
+                        <a:schemeClr val="tx1"/>
+                      </a:solidFill>
+                      <a:prstDash val="solid"/>
+                      <a:round/>
+                      <a:headEnd type="none" w="med" len="med"/>
+                      <a:tailEnd type="none" w="med" len="med"/>
+                    </a:lnR>
+                    <a:lnT w="3175" cap="flat" cmpd="sng" algn="ctr">
+                      <a:solidFill>
+                        <a:schemeClr val="tx1"/>
+                      </a:solidFill>
+                      <a:prstDash val="solid"/>
+                      <a:round/>
+                      <a:headEnd type="none" w="med" len="med"/>
+                      <a:tailEnd type="none" w="med" len="med"/>
+                    </a:lnT>
+                    <a:lnB w="3175" cap="flat" cmpd="sng" algn="ctr">
+                      <a:solidFill>
+                        <a:schemeClr val="tx1"/>
+                      </a:solidFill>
+                      <a:prstDash val="solid"/>
+                      <a:round/>
+                      <a:headEnd type="none" w="med" len="med"/>
+                      <a:tailEnd type="none" w="med" len="med"/>
+                    </a:lnB>
+                    <a:noFill/>
+                  </a:tcPr>
+                </a:tc>
+                <a:tc>
+                  <a:txBody>
+                    <a:bodyPr/>
+                    <a:lstStyle/>
+                    <a:p>
+                      <a:pPr marL="0" marR="0">
+                        <a:spcBef>
+                          <a:spcPts val="0"/>
+                        </a:spcBef>
+                        <a:spcAft>
+                          <a:spcPts val="0"/>
+                        </a:spcAft>
+                      </a:pPr>
+                      <a:r>
+                        <a:rPr lang="en-US" sz="1600" b="0" i="0" u="none" strike="noStrike" cap="none" dirty="0">
+                          <a:solidFill>
+                            <a:schemeClr val="dk2"/>
+                          </a:solidFill>
+                          <a:latin typeface="Open Sans Light"/>
+                          <a:cs typeface="Open Sans Light"/>
+                          <a:sym typeface="Open Sans Light"/>
+                        </a:rPr>
+                        <a:t>- Write access</a:t>
+                      </a:r>
+                    </a:p>
+                    <a:p>
+                      <a:pPr marL="0" marR="0">
+                        <a:spcBef>
+                          <a:spcPts val="0"/>
+                        </a:spcBef>
+                        <a:spcAft>
+                          <a:spcPts val="0"/>
+                        </a:spcAft>
+                      </a:pPr>
+                      <a:r>
+                        <a:rPr lang="en-US" sz="1600" b="0" i="0" u="none" strike="noStrike" cap="none" dirty="0">
+                          <a:solidFill>
+                            <a:schemeClr val="dk2"/>
+                          </a:solidFill>
+                          <a:latin typeface="Open Sans Light"/>
+                          <a:cs typeface="Open Sans Light"/>
+                          <a:sym typeface="Open Sans Light"/>
+                        </a:rPr>
+                        <a:t>- No restrictions </a:t>
+                      </a:r>
+                      <a:endParaRPr lang="en-US" sz="1600" b="0" i="0" u="none" strike="noStrike" cap="none" dirty="0">
+                        <a:solidFill>
+                          <a:schemeClr val="dk2"/>
+                        </a:solidFill>
+                        <a:latin typeface="Open Sans Light"/>
+                        <a:ea typeface="Times New Roman" panose="02020603050405020304" pitchFamily="18" charset="0"/>
+                        <a:cs typeface="Open Sans Light"/>
+                        <a:sym typeface="Open Sans Light"/>
+                      </a:endParaRPr>
+                    </a:p>
+                  </a:txBody>
+                  <a:tcPr marL="68580" marR="68580" marT="0" marB="0">
+                    <a:lnL w="3175" cap="flat" cmpd="sng" algn="ctr">
+                      <a:solidFill>
+                        <a:schemeClr val="tx1"/>
+                      </a:solidFill>
+                      <a:prstDash val="solid"/>
+                      <a:round/>
+                      <a:headEnd type="none" w="med" len="med"/>
+                      <a:tailEnd type="none" w="med" len="med"/>
+                    </a:lnL>
+                    <a:lnR w="3175" cap="flat" cmpd="sng" algn="ctr">
+                      <a:solidFill>
+                        <a:schemeClr val="tx1"/>
+                      </a:solidFill>
+                      <a:prstDash val="solid"/>
+                      <a:round/>
+                      <a:headEnd type="none" w="med" len="med"/>
+                      <a:tailEnd type="none" w="med" len="med"/>
+                    </a:lnR>
+                    <a:lnT w="3175" cap="flat" cmpd="sng" algn="ctr">
+                      <a:solidFill>
+                        <a:schemeClr val="tx1"/>
+                      </a:solidFill>
+                      <a:prstDash val="solid"/>
+                      <a:round/>
+                      <a:headEnd type="none" w="med" len="med"/>
+                      <a:tailEnd type="none" w="med" len="med"/>
+                    </a:lnT>
+                    <a:lnB w="3175" cap="flat" cmpd="sng" algn="ctr">
+                      <a:solidFill>
+                        <a:schemeClr val="tx1"/>
+                      </a:solidFill>
+                      <a:prstDash val="solid"/>
+                      <a:round/>
+                      <a:headEnd type="none" w="med" len="med"/>
+                      <a:tailEnd type="none" w="med" len="med"/>
+                    </a:lnB>
+                    <a:noFill/>
+                  </a:tcPr>
+                </a:tc>
+                <a:extLst>
+                  <a:ext uri="{0D108BD9-81ED-4DB2-BD59-A6C34878D82A}">
+                    <a16:rowId xmlns:a16="http://schemas.microsoft.com/office/drawing/2014/main" val="611807478"/>
+                  </a:ext>
+                </a:extLst>
+              </a:tr>
+            </a:tbl>
+          </a:graphicData>
+        </a:graphic>
+      </p:graphicFrame>
     </p:spTree>
   </p:cSld>
   <p:clrMapOvr>
@@ -38019,7 +39181,7 @@
 </p:sld>
 </file>
 
-<file path=ppt/slides/slide5.xml><?xml version="1.0" encoding="utf-8"?>
+<file path=ppt/slides/slide6.xml><?xml version="1.0" encoding="utf-8"?>
 <p:sld xmlns:a="http://schemas.openxmlformats.org/drawingml/2006/main" xmlns:r="http://schemas.openxmlformats.org/officeDocument/2006/relationships" xmlns:p="http://schemas.openxmlformats.org/presentationml/2006/main">
   <p:cSld>
     <p:spTree>
@@ -38159,7 +39321,16 @@
               </a:spcAft>
               <a:buNone/>
             </a:pPr>
-            <a:endParaRPr sz="1900" dirty="0"/>
+            <a:endParaRPr lang="en-US" sz="1900" dirty="0"/>
+          </a:p>
+          <a:p>
+            <a:pPr marL="457200" lvl="1" indent="0">
+              <a:buNone/>
+            </a:pPr>
+            <a:r>
+              <a:rPr lang="en-US" sz="1700" dirty="0"/>
+              <a:t>-206 number of rows and 11 number of columns.</a:t>
+            </a:r>
           </a:p>
           <a:p>
             <a:pPr marL="457200" lvl="0" indent="-349250" algn="l" rtl="0">
@@ -38214,19 +39385,14 @@
             </a:endParaRPr>
           </a:p>
           <a:p>
-            <a:pPr marL="0" lvl="0" indent="0" algn="l" rtl="0">
-              <a:spcBef>
-                <a:spcPts val="0"/>
-              </a:spcBef>
-              <a:spcAft>
-                <a:spcPts val="0"/>
-              </a:spcAft>
+            <a:pPr marL="457200" lvl="1" indent="0">
               <a:buNone/>
             </a:pPr>
-            <a:endParaRPr sz="1900" b="1" dirty="0">
-              <a:latin typeface="Open Sans"/>
-              <a:ea typeface="Open Sans"/>
-              <a:cs typeface="Open Sans"/>
+            <a:r>
+              <a:rPr lang="en-US" sz="1700" dirty="0"/>
+              <a:t>-20% growth a year for the next 5 years. </a:t>
+            </a:r>
+            <a:endParaRPr sz="1700" dirty="0">
               <a:sym typeface="Open Sans"/>
             </a:endParaRPr>
           </a:p>
@@ -38295,33 +39461,19 @@
             </a:endParaRPr>
           </a:p>
           <a:p>
-            <a:pPr marL="457200" lvl="0" indent="0" algn="l" rtl="0">
+            <a:pPr indent="0">
               <a:lnSpc>
                 <a:spcPct val="100000"/>
               </a:lnSpc>
               <a:spcBef>
                 <a:spcPts val="1600"/>
               </a:spcBef>
-              <a:spcAft>
-                <a:spcPts val="0"/>
-              </a:spcAft>
               <a:buNone/>
             </a:pPr>
-            <a:endParaRPr sz="1700" dirty="0"/>
-          </a:p>
-          <a:p>
-            <a:pPr marL="457200" lvl="0" indent="0" algn="l" rtl="0">
-              <a:lnSpc>
-                <a:spcPct val="100000"/>
-              </a:lnSpc>
-              <a:spcBef>
-                <a:spcPts val="0"/>
-              </a:spcBef>
-              <a:spcAft>
-                <a:spcPts val="0"/>
-              </a:spcAft>
-              <a:buNone/>
-            </a:pPr>
+            <a:r>
+              <a:rPr lang="en-US" sz="1700" dirty="0"/>
+              <a:t>- Yes, salary data is sensitive, and its access should be restricted to HR partner or management level employees.  No other employees should be able to access salary information. </a:t>
+            </a:r>
             <a:endParaRPr sz="1700" dirty="0"/>
           </a:p>
         </p:txBody>
@@ -38334,7 +39486,7 @@
 </p:sld>
 </file>
 
-<file path=ppt/slides/slide6.xml><?xml version="1.0" encoding="utf-8"?>
+<file path=ppt/slides/slide7.xml><?xml version="1.0" encoding="utf-8"?>
 <p:sld xmlns:a="http://schemas.openxmlformats.org/drawingml/2006/main" xmlns:r="http://schemas.openxmlformats.org/officeDocument/2006/relationships" xmlns:p="http://schemas.openxmlformats.org/presentationml/2006/main">
   <p:cSld>
     <p:spTree>
@@ -38386,10 +39538,10 @@
               <a:buNone/>
             </a:pPr>
             <a:r>
-              <a:rPr lang="en"/>
+              <a:rPr lang="en" dirty="0"/>
               <a:t>Data Architect Technical Requirement</a:t>
             </a:r>
-            <a:endParaRPr/>
+            <a:endParaRPr dirty="0"/>
           </a:p>
         </p:txBody>
       </p:sp>
@@ -38430,7 +39582,7 @@
               <a:buChar char="●"/>
             </a:pPr>
             <a:r>
-              <a:rPr lang="en" sz="1900" b="1" dirty="0">
+              <a:rPr lang="en" sz="1800" b="1" dirty="0">
                 <a:latin typeface="Open Sans"/>
                 <a:ea typeface="Open Sans"/>
                 <a:cs typeface="Open Sans"/>
@@ -38438,7 +39590,7 @@
               </a:rPr>
               <a:t>Justification for the new database</a:t>
             </a:r>
-            <a:endParaRPr sz="1900" b="1" dirty="0">
+            <a:endParaRPr sz="1800" b="1" dirty="0">
               <a:latin typeface="Open Sans"/>
               <a:ea typeface="Open Sans"/>
               <a:cs typeface="Open Sans"/>
@@ -38459,22 +39611,30 @@
               <a:buNone/>
             </a:pPr>
             <a:r>
-              <a:rPr lang="en" sz="1700" dirty="0"/>
+              <a:rPr lang="en" sz="1600" dirty="0"/>
               <a:t>Provide at least two justifications for building a database</a:t>
             </a:r>
-            <a:endParaRPr sz="1900" dirty="0"/>
-          </a:p>
-          <a:p>
-            <a:pPr marL="0" lvl="0" indent="0" algn="l" rtl="0">
-              <a:spcBef>
-                <a:spcPts val="0"/>
-              </a:spcBef>
-              <a:spcAft>
-                <a:spcPts val="0"/>
-              </a:spcAft>
-              <a:buNone/>
+            <a:endParaRPr sz="1800" dirty="0"/>
+          </a:p>
+          <a:p>
+            <a:pPr lvl="1">
+              <a:buFont typeface="Wingdings" pitchFamily="2" charset="2"/>
+              <a:buChar char="§"/>
             </a:pPr>
-            <a:endParaRPr sz="1900" dirty="0"/>
+            <a:r>
+              <a:rPr lang="en-US" sz="1600" dirty="0"/>
+              <a:t>Data integrity and data security issues will be addressed by building database. </a:t>
+            </a:r>
+          </a:p>
+          <a:p>
+            <a:pPr lvl="1">
+              <a:buFont typeface="Wingdings" pitchFamily="2" charset="2"/>
+              <a:buChar char="§"/>
+            </a:pPr>
+            <a:r>
+              <a:rPr lang="en-US" sz="1600" dirty="0"/>
+              <a:t>It is becoming cumbersome to manage employee details in excel spreadsheet as employee numbers grew from 10-person team to 200+ person. Also, 20% growth is projected for next 5 years which will make it difficult to manager information in excel file. </a:t>
+            </a:r>
           </a:p>
           <a:p>
             <a:pPr marL="457200" lvl="0" indent="-349250" algn="l" rtl="0">
@@ -38489,7 +39649,7 @@
               <a:buChar char="●"/>
             </a:pPr>
             <a:r>
-              <a:rPr lang="en" sz="1900" b="1" dirty="0">
+              <a:rPr lang="en" sz="1800" b="1" dirty="0">
                 <a:latin typeface="Open Sans"/>
                 <a:ea typeface="Open Sans"/>
                 <a:cs typeface="Open Sans"/>
@@ -38497,7 +39657,7 @@
               </a:rPr>
               <a:t>Database objects</a:t>
             </a:r>
-            <a:endParaRPr sz="1900" b="1" dirty="0">
+            <a:endParaRPr sz="1800" b="1" dirty="0">
               <a:latin typeface="Open Sans"/>
               <a:ea typeface="Open Sans"/>
               <a:cs typeface="Open Sans"/>
@@ -38518,10 +39678,10 @@
               <a:buNone/>
             </a:pPr>
             <a:r>
-              <a:rPr lang="en" sz="1700" dirty="0"/>
+              <a:rPr lang="en" sz="1600" dirty="0"/>
               <a:t>List the database objects (tables, views, special procedures)  that will be created for the database. </a:t>
             </a:r>
-            <a:endParaRPr sz="1700" dirty="0"/>
+            <a:endParaRPr sz="1600" dirty="0"/>
           </a:p>
           <a:p>
             <a:pPr marL="457200" lvl="0" indent="0" algn="l" rtl="0">
@@ -38536,7 +39696,7 @@
               </a:spcAft>
               <a:buNone/>
             </a:pPr>
-            <a:endParaRPr sz="1700" dirty="0"/>
+            <a:endParaRPr sz="1600" dirty="0"/>
           </a:p>
           <a:p>
             <a:pPr marL="457200" lvl="0" indent="0" algn="l" rtl="0">
@@ -38552,10 +39712,10 @@
               <a:buNone/>
             </a:pPr>
             <a:r>
-              <a:rPr lang="en" sz="1700" dirty="0"/>
+              <a:rPr lang="en" sz="1600" dirty="0"/>
               <a:t>Hint - you may want to circle back to this answer after completing the logical ERD in step 2.</a:t>
             </a:r>
-            <a:endParaRPr sz="1700" dirty="0"/>
+            <a:endParaRPr sz="1600" dirty="0"/>
           </a:p>
           <a:p>
             <a:pPr marL="457200" lvl="0" indent="0" algn="l" rtl="0">
@@ -38567,7 +39727,7 @@
               </a:spcAft>
               <a:buNone/>
             </a:pPr>
-            <a:endParaRPr sz="1900" dirty="0"/>
+            <a:endParaRPr sz="1800" dirty="0"/>
           </a:p>
           <a:p>
             <a:pPr marL="457200" lvl="0" indent="-349250" algn="l" rtl="0">
@@ -38582,7 +39742,7 @@
               <a:buChar char="●"/>
             </a:pPr>
             <a:r>
-              <a:rPr lang="en" sz="1900" b="1" dirty="0">
+              <a:rPr lang="en" sz="1800" b="1" dirty="0">
                 <a:latin typeface="Open Sans"/>
                 <a:ea typeface="Open Sans"/>
                 <a:cs typeface="Open Sans"/>
@@ -38590,7 +39750,7 @@
               </a:rPr>
               <a:t>Data ingestion</a:t>
             </a:r>
-            <a:endParaRPr sz="1900" b="1" dirty="0">
+            <a:endParaRPr sz="1800" b="1" dirty="0">
               <a:latin typeface="Open Sans"/>
               <a:ea typeface="Open Sans"/>
               <a:cs typeface="Open Sans"/>
@@ -38616,10 +39776,10 @@
               <a:buNone/>
             </a:pPr>
             <a:r>
-              <a:rPr lang="en" sz="1700" dirty="0"/>
+              <a:rPr lang="en" sz="1600" dirty="0"/>
               <a:t>Select a data ingestion method (ETL, Direct feed, API) based on the information provided. </a:t>
             </a:r>
-            <a:endParaRPr sz="1900" dirty="0"/>
+            <a:endParaRPr sz="1800" dirty="0"/>
           </a:p>
         </p:txBody>
       </p:sp>
@@ -38631,7 +39791,7 @@
 </p:sld>
 </file>
 
-<file path=ppt/slides/slide7.xml><?xml version="1.0" encoding="utf-8"?>
+<file path=ppt/slides/slide8.xml><?xml version="1.0" encoding="utf-8"?>
 <p:sld xmlns:a="http://schemas.openxmlformats.org/drawingml/2006/main" xmlns:r="http://schemas.openxmlformats.org/officeDocument/2006/relationships" xmlns:p="http://schemas.openxmlformats.org/presentationml/2006/main">
   <p:cSld>
     <p:spTree>
@@ -39159,7 +40319,7 @@
 </p:sld>
 </file>
 
-<file path=ppt/slides/slide8.xml><?xml version="1.0" encoding="utf-8"?>
+<file path=ppt/slides/slide9.xml><?xml version="1.0" encoding="utf-8"?>
 <p:sld xmlns:a="http://schemas.openxmlformats.org/drawingml/2006/main" xmlns:r="http://schemas.openxmlformats.org/officeDocument/2006/relationships" xmlns:p="http://schemas.openxmlformats.org/presentationml/2006/main">
   <p:cSld>
     <p:bg>
@@ -39340,322 +40500,6 @@
               <a:cs typeface="Helvetica Neue"/>
               <a:sym typeface="Helvetica Neue"/>
             </a:endParaRPr>
-          </a:p>
-        </p:txBody>
-      </p:sp>
-    </p:spTree>
-  </p:cSld>
-  <p:clrMapOvr>
-    <a:masterClrMapping/>
-  </p:clrMapOvr>
-</p:sld>
-</file>
-
-<file path=ppt/slides/slide9.xml><?xml version="1.0" encoding="utf-8"?>
-<p:sld xmlns:a="http://schemas.openxmlformats.org/drawingml/2006/main" xmlns:r="http://schemas.openxmlformats.org/officeDocument/2006/relationships" xmlns:p="http://schemas.openxmlformats.org/presentationml/2006/main">
-  <p:cSld>
-    <p:spTree>
-      <p:nvGrpSpPr>
-        <p:cNvPr id="1" name="Shape 241"/>
-        <p:cNvGrpSpPr/>
-        <p:nvPr/>
-      </p:nvGrpSpPr>
-      <p:grpSpPr>
-        <a:xfrm>
-          <a:off x="0" y="0"/>
-          <a:ext cx="0" cy="0"/>
-          <a:chOff x="0" y="0"/>
-          <a:chExt cx="0" cy="0"/>
-        </a:xfrm>
-      </p:grpSpPr>
-      <p:sp>
-        <p:nvSpPr>
-          <p:cNvPr id="242" name="Google Shape;242;p61"/>
-          <p:cNvSpPr txBox="1">
-            <a:spLocks noGrp="1"/>
-          </p:cNvSpPr>
-          <p:nvPr>
-            <p:ph type="title"/>
-          </p:nvPr>
-        </p:nvSpPr>
-        <p:spPr>
-          <a:xfrm>
-            <a:off x="264945" y="870271"/>
-            <a:ext cx="7242600" cy="1119900"/>
-          </a:xfrm>
-          <a:prstGeom prst="rect">
-            <a:avLst/>
-          </a:prstGeom>
-        </p:spPr>
-        <p:txBody>
-          <a:bodyPr spcFirstLastPara="1" wrap="square" lIns="91425" tIns="91425" rIns="91425" bIns="91425" anchor="ctr" anchorCtr="0">
-            <a:noAutofit/>
-          </a:bodyPr>
-          <a:lstStyle/>
-          <a:p>
-            <a:pPr marL="0" lvl="0" indent="0" algn="l" rtl="0">
-              <a:spcBef>
-                <a:spcPts val="0"/>
-              </a:spcBef>
-              <a:spcAft>
-                <a:spcPts val="0"/>
-              </a:spcAft>
-              <a:buNone/>
-            </a:pPr>
-            <a:r>
-              <a:rPr lang="en"/>
-              <a:t>Step 2: Relational Database Design</a:t>
-            </a:r>
-            <a:endParaRPr/>
-          </a:p>
-        </p:txBody>
-      </p:sp>
-      <p:sp>
-        <p:nvSpPr>
-          <p:cNvPr id="243" name="Google Shape;243;p61"/>
-          <p:cNvSpPr txBox="1">
-            <a:spLocks noGrp="1"/>
-          </p:cNvSpPr>
-          <p:nvPr>
-            <p:ph type="body" idx="1"/>
-          </p:nvPr>
-        </p:nvSpPr>
-        <p:spPr>
-          <a:xfrm>
-            <a:off x="264945" y="2253729"/>
-            <a:ext cx="7242600" cy="6239700"/>
-          </a:xfrm>
-          <a:prstGeom prst="rect">
-            <a:avLst/>
-          </a:prstGeom>
-        </p:spPr>
-        <p:txBody>
-          <a:bodyPr spcFirstLastPara="1" wrap="square" lIns="91425" tIns="91425" rIns="91425" bIns="91425" anchor="t" anchorCtr="0">
-            <a:noAutofit/>
-          </a:bodyPr>
-          <a:lstStyle/>
-          <a:p>
-            <a:pPr marL="0" lvl="0" indent="0" algn="l" rtl="0">
-              <a:lnSpc>
-                <a:spcPct val="170000"/>
-              </a:lnSpc>
-              <a:spcBef>
-                <a:spcPts val="0"/>
-              </a:spcBef>
-              <a:spcAft>
-                <a:spcPts val="0"/>
-              </a:spcAft>
-              <a:buNone/>
-            </a:pPr>
-            <a:r>
-              <a:rPr lang="en" sz="1500">
-                <a:solidFill>
-                  <a:srgbClr val="525C65"/>
-                </a:solidFill>
-                <a:highlight>
-                  <a:srgbClr val="FFFFFF"/>
-                </a:highlight>
-                <a:latin typeface="Open Sans"/>
-                <a:ea typeface="Open Sans"/>
-                <a:cs typeface="Open Sans"/>
-                <a:sym typeface="Open Sans"/>
-              </a:rPr>
-              <a:t>This step is where you will go through the process of designing a new database for Tech ABC Corp's HR department. Using the </a:t>
-            </a:r>
-            <a:r>
-              <a:rPr lang="en" sz="1500" u="sng">
-                <a:solidFill>
-                  <a:schemeClr val="hlink"/>
-                </a:solidFill>
-                <a:highlight>
-                  <a:srgbClr val="FFFFFF"/>
-                </a:highlight>
-                <a:latin typeface="Open Sans"/>
-                <a:ea typeface="Open Sans"/>
-                <a:cs typeface="Open Sans"/>
-                <a:sym typeface="Open Sans"/>
-                <a:hlinkClick r:id="rId3"/>
-              </a:rPr>
-              <a:t>dataset</a:t>
-            </a:r>
-            <a:r>
-              <a:rPr lang="en" sz="1500">
-                <a:solidFill>
-                  <a:srgbClr val="525C65"/>
-                </a:solidFill>
-                <a:highlight>
-                  <a:srgbClr val="FFFFFF"/>
-                </a:highlight>
-                <a:latin typeface="Open Sans"/>
-                <a:ea typeface="Open Sans"/>
-                <a:cs typeface="Open Sans"/>
-                <a:sym typeface="Open Sans"/>
-              </a:rPr>
-              <a:t> provided, along with the requirements gathered in step one, you are going to develop a relational database set to the 3NF.</a:t>
-            </a:r>
-            <a:endParaRPr sz="1500">
-              <a:solidFill>
-                <a:srgbClr val="525C65"/>
-              </a:solidFill>
-              <a:highlight>
-                <a:srgbClr val="FFFFFF"/>
-              </a:highlight>
-              <a:latin typeface="Open Sans"/>
-              <a:ea typeface="Open Sans"/>
-              <a:cs typeface="Open Sans"/>
-              <a:sym typeface="Open Sans"/>
-            </a:endParaRPr>
-          </a:p>
-          <a:p>
-            <a:pPr marL="0" lvl="0" indent="0" algn="l" rtl="0">
-              <a:lnSpc>
-                <a:spcPct val="170000"/>
-              </a:lnSpc>
-              <a:spcBef>
-                <a:spcPts val="1100"/>
-              </a:spcBef>
-              <a:spcAft>
-                <a:spcPts val="0"/>
-              </a:spcAft>
-              <a:buNone/>
-            </a:pPr>
-            <a:endParaRPr sz="500">
-              <a:solidFill>
-                <a:srgbClr val="525C65"/>
-              </a:solidFill>
-              <a:highlight>
-                <a:srgbClr val="FFFFFF"/>
-              </a:highlight>
-              <a:latin typeface="Open Sans"/>
-              <a:ea typeface="Open Sans"/>
-              <a:cs typeface="Open Sans"/>
-              <a:sym typeface="Open Sans"/>
-            </a:endParaRPr>
-          </a:p>
-          <a:p>
-            <a:pPr marL="0" lvl="0" indent="0" algn="l" rtl="0">
-              <a:lnSpc>
-                <a:spcPct val="170000"/>
-              </a:lnSpc>
-              <a:spcBef>
-                <a:spcPts val="1100"/>
-              </a:spcBef>
-              <a:spcAft>
-                <a:spcPts val="0"/>
-              </a:spcAft>
-              <a:buNone/>
-            </a:pPr>
-            <a:r>
-              <a:rPr lang="en" sz="1500">
-                <a:solidFill>
-                  <a:srgbClr val="525C65"/>
-                </a:solidFill>
-                <a:highlight>
-                  <a:srgbClr val="FFFFFF"/>
-                </a:highlight>
-                <a:latin typeface="Open Sans"/>
-                <a:ea typeface="Open Sans"/>
-                <a:cs typeface="Open Sans"/>
-                <a:sym typeface="Open Sans"/>
-              </a:rPr>
-              <a:t>Using Lucidchart, you will create 3 entity relationship diagrams (ERDs) to show how you developed the final design for your data.</a:t>
-            </a:r>
-            <a:endParaRPr sz="1500">
-              <a:solidFill>
-                <a:srgbClr val="525C65"/>
-              </a:solidFill>
-              <a:highlight>
-                <a:srgbClr val="FFFFFF"/>
-              </a:highlight>
-              <a:latin typeface="Open Sans"/>
-              <a:ea typeface="Open Sans"/>
-              <a:cs typeface="Open Sans"/>
-              <a:sym typeface="Open Sans"/>
-            </a:endParaRPr>
-          </a:p>
-          <a:p>
-            <a:pPr marL="0" lvl="0" indent="0" algn="l" rtl="0">
-              <a:lnSpc>
-                <a:spcPct val="170000"/>
-              </a:lnSpc>
-              <a:spcBef>
-                <a:spcPts val="1100"/>
-              </a:spcBef>
-              <a:spcAft>
-                <a:spcPts val="0"/>
-              </a:spcAft>
-              <a:buNone/>
-            </a:pPr>
-            <a:endParaRPr sz="500">
-              <a:solidFill>
-                <a:srgbClr val="525C65"/>
-              </a:solidFill>
-              <a:highlight>
-                <a:srgbClr val="FFFFFF"/>
-              </a:highlight>
-              <a:latin typeface="Open Sans"/>
-              <a:ea typeface="Open Sans"/>
-              <a:cs typeface="Open Sans"/>
-              <a:sym typeface="Open Sans"/>
-            </a:endParaRPr>
-          </a:p>
-          <a:p>
-            <a:pPr marL="0" lvl="0" indent="0" algn="l" rtl="0">
-              <a:lnSpc>
-                <a:spcPct val="170000"/>
-              </a:lnSpc>
-              <a:spcBef>
-                <a:spcPts val="1100"/>
-              </a:spcBef>
-              <a:spcAft>
-                <a:spcPts val="0"/>
-              </a:spcAft>
-              <a:buClr>
-                <a:schemeClr val="dk1"/>
-              </a:buClr>
-              <a:buSzPts val="1100"/>
-              <a:buFont typeface="Arial"/>
-              <a:buNone/>
-            </a:pPr>
-            <a:r>
-              <a:rPr lang="en" sz="1500">
-                <a:solidFill>
-                  <a:srgbClr val="525C65"/>
-                </a:solidFill>
-                <a:highlight>
-                  <a:srgbClr val="FFFFFF"/>
-                </a:highlight>
-                <a:latin typeface="Open Sans"/>
-                <a:ea typeface="Open Sans"/>
-                <a:cs typeface="Open Sans"/>
-                <a:sym typeface="Open Sans"/>
-              </a:rPr>
-              <a:t>You will submit a screenshot for each of the 3 ERDs you create. You will find detailed instructions for developing each of the ERDs over the next several pages.</a:t>
-            </a:r>
-            <a:endParaRPr sz="1500">
-              <a:solidFill>
-                <a:srgbClr val="525C65"/>
-              </a:solidFill>
-              <a:highlight>
-                <a:srgbClr val="FFFFFF"/>
-              </a:highlight>
-              <a:latin typeface="Open Sans"/>
-              <a:ea typeface="Open Sans"/>
-              <a:cs typeface="Open Sans"/>
-              <a:sym typeface="Open Sans"/>
-            </a:endParaRPr>
-          </a:p>
-          <a:p>
-            <a:pPr marL="0" lvl="0" indent="0" algn="l" rtl="0">
-              <a:spcBef>
-                <a:spcPts val="1100"/>
-              </a:spcBef>
-              <a:spcAft>
-                <a:spcPts val="1600"/>
-              </a:spcAft>
-              <a:buNone/>
-            </a:pPr>
-            <a:endParaRPr sz="2200"/>
           </a:p>
         </p:txBody>
       </p:sp>

</xml_diff>

<commit_message>
cm04 - Physical Database Creation Completed
</commit_message>
<xml_diff>
--- a/HR_Dataset_Assignment.pptx
+++ b/HR_Dataset_Assignment.pptx
@@ -50,39 +50,32 @@
   <p:notesSz cx="6858000" cy="9144000"/>
   <p:embeddedFontLst>
     <p:embeddedFont>
-      <p:font typeface="Calibri" panose="020F0502020204030204" pitchFamily="34" charset="0"/>
+      <p:font typeface="Helvetica Neue" panose="02000503000000020004" pitchFamily="2" charset="0"/>
       <p:regular r:id="rId40"/>
       <p:bold r:id="rId41"/>
       <p:italic r:id="rId42"/>
       <p:boldItalic r:id="rId43"/>
     </p:embeddedFont>
     <p:embeddedFont>
-      <p:font typeface="Helvetica Neue" panose="02000503000000020004" pitchFamily="2" charset="0"/>
+      <p:font typeface="Open Sans" panose="020B0606030504020204" pitchFamily="34" charset="0"/>
       <p:regular r:id="rId44"/>
       <p:bold r:id="rId45"/>
       <p:italic r:id="rId46"/>
       <p:boldItalic r:id="rId47"/>
     </p:embeddedFont>
     <p:embeddedFont>
-      <p:font typeface="Open Sans" panose="020B0606030504020204" pitchFamily="34" charset="0"/>
+      <p:font typeface="Open Sans Light" panose="020F0302020204030204" pitchFamily="34" charset="0"/>
       <p:regular r:id="rId48"/>
       <p:bold r:id="rId49"/>
       <p:italic r:id="rId50"/>
       <p:boldItalic r:id="rId51"/>
     </p:embeddedFont>
     <p:embeddedFont>
-      <p:font typeface="Open Sans Light" panose="020F0302020204030204" pitchFamily="34" charset="0"/>
+      <p:font typeface="Source Code Pro" panose="020B0509030403020204" pitchFamily="49" charset="0"/>
       <p:regular r:id="rId52"/>
       <p:bold r:id="rId53"/>
       <p:italic r:id="rId54"/>
       <p:boldItalic r:id="rId55"/>
-    </p:embeddedFont>
-    <p:embeddedFont>
-      <p:font typeface="Source Code Pro" panose="020B0509030403020204" pitchFamily="49" charset="0"/>
-      <p:regular r:id="rId56"/>
-      <p:bold r:id="rId57"/>
-      <p:italic r:id="rId58"/>
-      <p:boldItalic r:id="rId59"/>
     </p:embeddedFont>
   </p:embeddedFontLst>
   <p:defaultTextStyle>
@@ -29845,90 +29838,6 @@
             </a:r>
           </a:p>
           <a:p>
-            <a:pPr marL="457200" lvl="0" indent="0" algn="l" rtl="0">
-              <a:spcBef>
-                <a:spcPts val="0"/>
-              </a:spcBef>
-              <a:spcAft>
-                <a:spcPts val="0"/>
-              </a:spcAft>
-              <a:buNone/>
-            </a:pPr>
-            <a:endParaRPr lang="en-US" sz="1900" dirty="0"/>
-          </a:p>
-          <a:p>
-            <a:pPr marL="0" lvl="0" indent="0" algn="l" rtl="0">
-              <a:spcBef>
-                <a:spcPts val="1600"/>
-              </a:spcBef>
-              <a:spcAft>
-                <a:spcPts val="0"/>
-              </a:spcAft>
-              <a:buNone/>
-            </a:pPr>
-            <a:endParaRPr lang="en-US" sz="1900" dirty="0"/>
-          </a:p>
-          <a:p>
-            <a:pPr marL="0" lvl="0" indent="0" algn="l" rtl="0">
-              <a:spcBef>
-                <a:spcPts val="1600"/>
-              </a:spcBef>
-              <a:spcAft>
-                <a:spcPts val="0"/>
-              </a:spcAft>
-              <a:buNone/>
-            </a:pPr>
-            <a:endParaRPr lang="en-US" sz="1900" dirty="0"/>
-          </a:p>
-          <a:p>
-            <a:pPr marL="0" lvl="0" indent="0" algn="l" rtl="0">
-              <a:spcBef>
-                <a:spcPts val="1600"/>
-              </a:spcBef>
-              <a:spcAft>
-                <a:spcPts val="0"/>
-              </a:spcAft>
-              <a:buNone/>
-            </a:pPr>
-            <a:endParaRPr lang="en-US" sz="1900" dirty="0"/>
-          </a:p>
-          <a:p>
-            <a:pPr marL="0" lvl="0" indent="0" algn="l" rtl="0">
-              <a:spcBef>
-                <a:spcPts val="1600"/>
-              </a:spcBef>
-              <a:spcAft>
-                <a:spcPts val="0"/>
-              </a:spcAft>
-              <a:buNone/>
-            </a:pPr>
-            <a:endParaRPr lang="en-US" sz="1900" dirty="0"/>
-          </a:p>
-          <a:p>
-            <a:pPr marL="0" lvl="0" indent="0" algn="l" rtl="0">
-              <a:spcBef>
-                <a:spcPts val="1600"/>
-              </a:spcBef>
-              <a:spcAft>
-                <a:spcPts val="0"/>
-              </a:spcAft>
-              <a:buNone/>
-            </a:pPr>
-            <a:endParaRPr sz="1900" dirty="0"/>
-          </a:p>
-          <a:p>
-            <a:pPr marL="0" lvl="0" indent="0" algn="l" rtl="0">
-              <a:spcBef>
-                <a:spcPts val="1600"/>
-              </a:spcBef>
-              <a:spcAft>
-                <a:spcPts val="0"/>
-              </a:spcAft>
-              <a:buNone/>
-            </a:pPr>
-            <a:endParaRPr sz="1900" dirty="0"/>
-          </a:p>
-          <a:p>
             <a:pPr marL="0" lvl="0" indent="0">
               <a:lnSpc>
                 <a:spcPct val="150000"/>
@@ -29954,49 +29863,19 @@
               </a:lnSpc>
               <a:buNone/>
             </a:pPr>
-            <a:endParaRPr lang="en-US" sz="1200" dirty="0">
-              <a:solidFill>
-                <a:srgbClr val="525C65"/>
-              </a:solidFill>
-              <a:highlight>
-                <a:srgbClr val="FFFFFF"/>
-              </a:highlight>
-              <a:latin typeface="Open Sans"/>
-              <a:ea typeface="Open Sans"/>
-              <a:cs typeface="Open Sans"/>
-            </a:endParaRPr>
-          </a:p>
-          <a:p>
-            <a:pPr marL="0" lvl="0" indent="0">
-              <a:lnSpc>
-                <a:spcPct val="150000"/>
-              </a:lnSpc>
-              <a:buNone/>
-            </a:pPr>
             <a:r>
-              <a:rPr lang="en-US" sz="1200" dirty="0">
+              <a:rPr lang="en-US" sz="1400" dirty="0">
                 <a:solidFill>
                   <a:srgbClr val="525C65"/>
                 </a:solidFill>
                 <a:highlight>
                   <a:srgbClr val="FFFFFF"/>
                 </a:highlight>
-                <a:latin typeface="Open Sans"/>
-                <a:ea typeface="Open Sans"/>
-                <a:cs typeface="Open Sans"/>
+                <a:latin typeface="Open Sans" panose="020B0606030504020204" pitchFamily="34" charset="0"/>
+                <a:ea typeface="Open Sans" panose="020B0606030504020204" pitchFamily="34" charset="0"/>
+                <a:cs typeface="Open Sans" panose="020B0606030504020204" pitchFamily="34" charset="0"/>
               </a:rPr>
-              <a:t>1. So, primary key for this table is combination of </a:t>
-            </a:r>
-            <a:r>
-              <a:rPr lang="en-US" sz="1200" dirty="0">
-                <a:solidFill>
-                  <a:srgbClr val="525C65"/>
-                </a:solidFill>
-                <a:latin typeface="Open Sans"/>
-                <a:ea typeface="Open Sans"/>
-                <a:cs typeface="Open Sans"/>
-              </a:rPr>
-              <a:t>Employee ID, Job Title, Address ID, Manager ID, Department ID, Salary ID attributes. </a:t>
+              <a:t>1. Primary key – I have chosen a combination of Employee ID and Start Date as a “Primary Key” for “Employee History” Table. </a:t>
             </a:r>
           </a:p>
           <a:p>
@@ -30007,27 +29886,19 @@
               <a:buNone/>
             </a:pPr>
             <a:r>
-              <a:rPr lang="en-US" sz="1200" dirty="0">
+              <a:rPr lang="en-US" sz="1400" dirty="0">
                 <a:solidFill>
                   <a:srgbClr val="525C65"/>
                 </a:solidFill>
-                <a:latin typeface="Open Sans"/>
-                <a:ea typeface="Open Sans"/>
-                <a:cs typeface="Open Sans"/>
+                <a:highlight>
+                  <a:srgbClr val="FFFFFF"/>
+                </a:highlight>
+                <a:latin typeface="Open Sans" panose="020B0606030504020204" pitchFamily="34" charset="0"/>
+                <a:ea typeface="Open Sans" panose="020B0606030504020204" pitchFamily="34" charset="0"/>
+                <a:cs typeface="Open Sans" panose="020B0606030504020204" pitchFamily="34" charset="0"/>
               </a:rPr>
-              <a:t>2. Alternate key – We could have chosen a combination of Employee ID and Start Date also as a “Primary Key”, if there is a new start populated whenever there is a change in Department, Job title, Address, Manager and Salary. </a:t>
+              <a:t>A new start date will be populated whenever there is a change in Department, Job title, Address, Manager and Salary. End Date is also populated for old record.</a:t>
             </a:r>
-            <a:endParaRPr lang="en-US" sz="1200" dirty="0">
-              <a:solidFill>
-                <a:srgbClr val="525C65"/>
-              </a:solidFill>
-              <a:highlight>
-                <a:srgbClr val="FFFFFF"/>
-              </a:highlight>
-              <a:latin typeface="Open Sans"/>
-              <a:ea typeface="Open Sans"/>
-              <a:cs typeface="Open Sans"/>
-            </a:endParaRPr>
           </a:p>
           <a:p>
             <a:pPr marL="0" lvl="0" indent="0" algn="l" rtl="0">
@@ -30043,1767 +29914,6 @@
           </a:p>
         </p:txBody>
       </p:sp>
-      <p:graphicFrame>
-        <p:nvGraphicFramePr>
-          <p:cNvPr id="6" name="Table 5">
-            <a:extLst>
-              <a:ext uri="{FF2B5EF4-FFF2-40B4-BE49-F238E27FC236}">
-                <a16:creationId xmlns:a16="http://schemas.microsoft.com/office/drawing/2014/main" id="{5ADB25AF-7302-8043-AC27-8D52221DB3A0}"/>
-              </a:ext>
-            </a:extLst>
-          </p:cNvPr>
-          <p:cNvGraphicFramePr>
-            <a:graphicFrameLocks noGrp="1"/>
-          </p:cNvGraphicFramePr>
-          <p:nvPr>
-            <p:extLst>
-              <p:ext uri="{D42A27DB-BD31-4B8C-83A1-F6EECF244321}">
-                <p14:modId xmlns:p14="http://schemas.microsoft.com/office/powerpoint/2010/main" val="856448958"/>
-              </p:ext>
-            </p:extLst>
-          </p:nvPr>
-        </p:nvGraphicFramePr>
-        <p:xfrm>
-          <a:off x="265280" y="4419600"/>
-          <a:ext cx="7242175" cy="4009881"/>
-        </p:xfrm>
-        <a:graphic>
-          <a:graphicData uri="http://schemas.openxmlformats.org/drawingml/2006/table">
-            <a:tbl>
-              <a:tblPr/>
-              <a:tblGrid>
-                <a:gridCol w="357233">
-                  <a:extLst>
-                    <a:ext uri="{9D8B030D-6E8A-4147-A177-3AD203B41FA5}">
-                      <a16:colId xmlns:a16="http://schemas.microsoft.com/office/drawing/2014/main" val="3079068522"/>
-                    </a:ext>
-                  </a:extLst>
-                </a:gridCol>
-                <a:gridCol w="4699000">
-                  <a:extLst>
-                    <a:ext uri="{9D8B030D-6E8A-4147-A177-3AD203B41FA5}">
-                      <a16:colId xmlns:a16="http://schemas.microsoft.com/office/drawing/2014/main" val="1032043424"/>
-                    </a:ext>
-                  </a:extLst>
-                </a:gridCol>
-                <a:gridCol w="901487">
-                  <a:extLst>
-                    <a:ext uri="{9D8B030D-6E8A-4147-A177-3AD203B41FA5}">
-                      <a16:colId xmlns:a16="http://schemas.microsoft.com/office/drawing/2014/main" val="907581887"/>
-                    </a:ext>
-                  </a:extLst>
-                </a:gridCol>
-                <a:gridCol w="1284455">
-                  <a:extLst>
-                    <a:ext uri="{9D8B030D-6E8A-4147-A177-3AD203B41FA5}">
-                      <a16:colId xmlns:a16="http://schemas.microsoft.com/office/drawing/2014/main" val="3626420216"/>
-                    </a:ext>
-                  </a:extLst>
-                </a:gridCol>
-              </a:tblGrid>
-              <a:tr h="365032">
-                <a:tc>
-                  <a:txBody>
-                    <a:bodyPr/>
-                    <a:lstStyle/>
-                    <a:p>
-                      <a:pPr algn="ctr" fontAlgn="b"/>
-                      <a:r>
-                        <a:rPr lang="en-US" sz="1200" b="1" i="0" u="none" strike="noStrike" dirty="0">
-                          <a:solidFill>
-                            <a:schemeClr val="tx1"/>
-                          </a:solidFill>
-                          <a:effectLst/>
-                          <a:latin typeface="Calibri" panose="020F0502020204030204" pitchFamily="34" charset="0"/>
-                        </a:rPr>
-                        <a:t>S No</a:t>
-                      </a:r>
-                    </a:p>
-                  </a:txBody>
-                  <a:tcPr marL="5394" marR="5394" marT="5394" marB="0" anchor="b">
-                    <a:lnL w="12700" cap="flat" cmpd="sng" algn="ctr">
-                      <a:solidFill>
-                        <a:schemeClr val="tx1"/>
-                      </a:solidFill>
-                      <a:prstDash val="solid"/>
-                      <a:round/>
-                      <a:headEnd type="none" w="med" len="med"/>
-                      <a:tailEnd type="none" w="med" len="med"/>
-                    </a:lnL>
-                    <a:lnR w="12700" cap="flat" cmpd="sng" algn="ctr">
-                      <a:solidFill>
-                        <a:schemeClr val="tx1"/>
-                      </a:solidFill>
-                      <a:prstDash val="solid"/>
-                      <a:round/>
-                      <a:headEnd type="none" w="med" len="med"/>
-                      <a:tailEnd type="none" w="med" len="med"/>
-                    </a:lnR>
-                    <a:lnT w="12700" cap="flat" cmpd="sng" algn="ctr">
-                      <a:solidFill>
-                        <a:schemeClr val="tx1"/>
-                      </a:solidFill>
-                      <a:prstDash val="solid"/>
-                      <a:round/>
-                      <a:headEnd type="none" w="med" len="med"/>
-                      <a:tailEnd type="none" w="med" len="med"/>
-                    </a:lnT>
-                    <a:lnB w="12700" cap="flat" cmpd="sng" algn="ctr">
-                      <a:solidFill>
-                        <a:schemeClr val="tx1"/>
-                      </a:solidFill>
-                      <a:prstDash val="solid"/>
-                      <a:round/>
-                      <a:headEnd type="none" w="med" len="med"/>
-                      <a:tailEnd type="none" w="med" len="med"/>
-                    </a:lnB>
-                    <a:solidFill>
-                      <a:schemeClr val="lt1"/>
-                    </a:solidFill>
-                  </a:tcPr>
-                </a:tc>
-                <a:tc>
-                  <a:txBody>
-                    <a:bodyPr/>
-                    <a:lstStyle/>
-                    <a:p>
-                      <a:pPr algn="ctr" fontAlgn="b"/>
-                      <a:r>
-                        <a:rPr lang="en-US" sz="1200" b="1" i="0" u="none" strike="noStrike" dirty="0">
-                          <a:solidFill>
-                            <a:schemeClr val="tx1"/>
-                          </a:solidFill>
-                          <a:effectLst/>
-                          <a:latin typeface="Calibri" panose="020F0502020204030204" pitchFamily="34" charset="0"/>
-                        </a:rPr>
-                        <a:t>Assumptions</a:t>
-                      </a:r>
-                    </a:p>
-                  </a:txBody>
-                  <a:tcPr marL="5394" marR="5394" marT="5394" marB="0" anchor="b">
-                    <a:lnL w="12700" cap="flat" cmpd="sng" algn="ctr">
-                      <a:solidFill>
-                        <a:schemeClr val="tx1"/>
-                      </a:solidFill>
-                      <a:prstDash val="solid"/>
-                      <a:round/>
-                      <a:headEnd type="none" w="med" len="med"/>
-                      <a:tailEnd type="none" w="med" len="med"/>
-                    </a:lnL>
-                    <a:lnR w="12700" cap="flat" cmpd="sng" algn="ctr">
-                      <a:solidFill>
-                        <a:schemeClr val="tx1"/>
-                      </a:solidFill>
-                      <a:prstDash val="solid"/>
-                      <a:round/>
-                      <a:headEnd type="none" w="med" len="med"/>
-                      <a:tailEnd type="none" w="med" len="med"/>
-                    </a:lnR>
-                    <a:lnT w="12700" cap="flat" cmpd="sng" algn="ctr">
-                      <a:solidFill>
-                        <a:schemeClr val="tx1"/>
-                      </a:solidFill>
-                      <a:prstDash val="solid"/>
-                      <a:round/>
-                      <a:headEnd type="none" w="med" len="med"/>
-                      <a:tailEnd type="none" w="med" len="med"/>
-                    </a:lnT>
-                    <a:lnB w="12700" cap="flat" cmpd="sng" algn="ctr">
-                      <a:solidFill>
-                        <a:schemeClr val="tx1"/>
-                      </a:solidFill>
-                      <a:prstDash val="solid"/>
-                      <a:round/>
-                      <a:headEnd type="none" w="med" len="med"/>
-                      <a:tailEnd type="none" w="med" len="med"/>
-                    </a:lnB>
-                    <a:solidFill>
-                      <a:schemeClr val="lt1"/>
-                    </a:solidFill>
-                  </a:tcPr>
-                </a:tc>
-                <a:tc>
-                  <a:txBody>
-                    <a:bodyPr/>
-                    <a:lstStyle/>
-                    <a:p>
-                      <a:pPr algn="ctr" fontAlgn="b"/>
-                      <a:r>
-                        <a:rPr lang="en-US" sz="1200" b="1" i="0" u="none" strike="noStrike" dirty="0">
-                          <a:solidFill>
-                            <a:schemeClr val="tx1"/>
-                          </a:solidFill>
-                          <a:effectLst/>
-                          <a:latin typeface="Calibri" panose="020F0502020204030204" pitchFamily="34" charset="0"/>
-                        </a:rPr>
-                        <a:t>Case</a:t>
-                      </a:r>
-                    </a:p>
-                  </a:txBody>
-                  <a:tcPr marL="5394" marR="5394" marT="5394" marB="0" anchor="b">
-                    <a:lnL w="12700" cap="flat" cmpd="sng" algn="ctr">
-                      <a:solidFill>
-                        <a:schemeClr val="tx1"/>
-                      </a:solidFill>
-                      <a:prstDash val="solid"/>
-                      <a:round/>
-                      <a:headEnd type="none" w="med" len="med"/>
-                      <a:tailEnd type="none" w="med" len="med"/>
-                    </a:lnL>
-                    <a:lnR w="12700" cap="flat" cmpd="sng" algn="ctr">
-                      <a:solidFill>
-                        <a:schemeClr val="tx1"/>
-                      </a:solidFill>
-                      <a:prstDash val="solid"/>
-                      <a:round/>
-                      <a:headEnd type="none" w="med" len="med"/>
-                      <a:tailEnd type="none" w="med" len="med"/>
-                    </a:lnR>
-                    <a:lnT w="12700" cap="flat" cmpd="sng" algn="ctr">
-                      <a:solidFill>
-                        <a:schemeClr val="tx1"/>
-                      </a:solidFill>
-                      <a:prstDash val="solid"/>
-                      <a:round/>
-                      <a:headEnd type="none" w="med" len="med"/>
-                      <a:tailEnd type="none" w="med" len="med"/>
-                    </a:lnT>
-                    <a:lnB w="12700" cap="flat" cmpd="sng" algn="ctr">
-                      <a:solidFill>
-                        <a:schemeClr val="tx1"/>
-                      </a:solidFill>
-                      <a:prstDash val="solid"/>
-                      <a:round/>
-                      <a:headEnd type="none" w="med" len="med"/>
-                      <a:tailEnd type="none" w="med" len="med"/>
-                    </a:lnB>
-                    <a:solidFill>
-                      <a:schemeClr val="lt1"/>
-                    </a:solidFill>
-                  </a:tcPr>
-                </a:tc>
-                <a:tc>
-                  <a:txBody>
-                    <a:bodyPr/>
-                    <a:lstStyle/>
-                    <a:p>
-                      <a:pPr algn="ctr" fontAlgn="b"/>
-                      <a:r>
-                        <a:rPr lang="en-US" sz="1200" b="1" i="0" u="none" strike="noStrike" dirty="0">
-                          <a:solidFill>
-                            <a:schemeClr val="tx1"/>
-                          </a:solidFill>
-                          <a:effectLst/>
-                          <a:latin typeface="Calibri" panose="020F0502020204030204" pitchFamily="34" charset="0"/>
-                        </a:rPr>
-                        <a:t>Employee Hist Primary Key</a:t>
-                      </a:r>
-                    </a:p>
-                  </a:txBody>
-                  <a:tcPr marL="5394" marR="5394" marT="5394" marB="0" anchor="b">
-                    <a:lnL w="12700" cap="flat" cmpd="sng" algn="ctr">
-                      <a:solidFill>
-                        <a:schemeClr val="tx1"/>
-                      </a:solidFill>
-                      <a:prstDash val="solid"/>
-                      <a:round/>
-                      <a:headEnd type="none" w="med" len="med"/>
-                      <a:tailEnd type="none" w="med" len="med"/>
-                    </a:lnL>
-                    <a:lnR w="12700" cap="flat" cmpd="sng" algn="ctr">
-                      <a:solidFill>
-                        <a:schemeClr val="tx1"/>
-                      </a:solidFill>
-                      <a:prstDash val="solid"/>
-                      <a:round/>
-                      <a:headEnd type="none" w="med" len="med"/>
-                      <a:tailEnd type="none" w="med" len="med"/>
-                    </a:lnR>
-                    <a:lnT w="12700" cap="flat" cmpd="sng" algn="ctr">
-                      <a:solidFill>
-                        <a:schemeClr val="tx1"/>
-                      </a:solidFill>
-                      <a:prstDash val="solid"/>
-                      <a:round/>
-                      <a:headEnd type="none" w="med" len="med"/>
-                      <a:tailEnd type="none" w="med" len="med"/>
-                    </a:lnT>
-                    <a:lnB w="12700" cap="flat" cmpd="sng" algn="ctr">
-                      <a:solidFill>
-                        <a:schemeClr val="tx1"/>
-                      </a:solidFill>
-                      <a:prstDash val="solid"/>
-                      <a:round/>
-                      <a:headEnd type="none" w="med" len="med"/>
-                      <a:tailEnd type="none" w="med" len="med"/>
-                    </a:lnB>
-                    <a:solidFill>
-                      <a:schemeClr val="lt1"/>
-                    </a:solidFill>
-                  </a:tcPr>
-                </a:tc>
-                <a:extLst>
-                  <a:ext uri="{0D108BD9-81ED-4DB2-BD59-A6C34878D82A}">
-                    <a16:rowId xmlns:a16="http://schemas.microsoft.com/office/drawing/2014/main" val="2949236405"/>
-                  </a:ext>
-                </a:extLst>
-              </a:tr>
-              <a:tr h="1006376">
-                <a:tc>
-                  <a:txBody>
-                    <a:bodyPr/>
-                    <a:lstStyle/>
-                    <a:p>
-                      <a:pPr algn="ctr" fontAlgn="b"/>
-                      <a:r>
-                        <a:rPr lang="en-US" sz="1000" b="0" i="0" u="none" strike="noStrike" cap="none" dirty="0">
-                          <a:solidFill>
-                            <a:schemeClr val="tx1"/>
-                          </a:solidFill>
-                          <a:highlight>
-                            <a:srgbClr val="FFFFFF"/>
-                          </a:highlight>
-                          <a:latin typeface="Open Sans"/>
-                          <a:ea typeface="Open Sans"/>
-                          <a:cs typeface="Open Sans"/>
-                          <a:sym typeface="Open Sans Light"/>
-                        </a:rPr>
-                        <a:t>1</a:t>
-                      </a:r>
-                    </a:p>
-                  </a:txBody>
-                  <a:tcPr marL="5394" marR="5394" marT="5394" marB="0" anchor="ctr">
-                    <a:lnL w="12700" cap="flat" cmpd="sng" algn="ctr">
-                      <a:solidFill>
-                        <a:schemeClr val="tx1"/>
-                      </a:solidFill>
-                      <a:prstDash val="solid"/>
-                      <a:round/>
-                      <a:headEnd type="none" w="med" len="med"/>
-                      <a:tailEnd type="none" w="med" len="med"/>
-                    </a:lnL>
-                    <a:lnR w="12700" cap="flat" cmpd="sng" algn="ctr">
-                      <a:solidFill>
-                        <a:schemeClr val="tx1"/>
-                      </a:solidFill>
-                      <a:prstDash val="solid"/>
-                      <a:round/>
-                      <a:headEnd type="none" w="med" len="med"/>
-                      <a:tailEnd type="none" w="med" len="med"/>
-                    </a:lnR>
-                    <a:lnT w="12700" cap="flat" cmpd="sng" algn="ctr">
-                      <a:solidFill>
-                        <a:schemeClr val="tx1"/>
-                      </a:solidFill>
-                      <a:prstDash val="solid"/>
-                      <a:round/>
-                      <a:headEnd type="none" w="med" len="med"/>
-                      <a:tailEnd type="none" w="med" len="med"/>
-                    </a:lnT>
-                    <a:lnB w="12700" cap="flat" cmpd="sng" algn="ctr">
-                      <a:solidFill>
-                        <a:schemeClr val="tx1"/>
-                      </a:solidFill>
-                      <a:prstDash val="solid"/>
-                      <a:round/>
-                      <a:headEnd type="none" w="med" len="med"/>
-                      <a:tailEnd type="none" w="med" len="med"/>
-                    </a:lnB>
-                    <a:solidFill>
-                      <a:schemeClr val="lt1"/>
-                    </a:solidFill>
-                  </a:tcPr>
-                </a:tc>
-                <a:tc>
-                  <a:txBody>
-                    <a:bodyPr/>
-                    <a:lstStyle/>
-                    <a:p>
-                      <a:pPr algn="l" fontAlgn="b"/>
-                      <a:r>
-                        <a:rPr lang="en-US" sz="1000" b="0" i="0" u="none" strike="noStrike" cap="none" dirty="0">
-                          <a:solidFill>
-                            <a:schemeClr val="tx1"/>
-                          </a:solidFill>
-                          <a:highlight>
-                            <a:srgbClr val="FFFFFF"/>
-                          </a:highlight>
-                          <a:latin typeface="Open Sans"/>
-                          <a:ea typeface="Open Sans"/>
-                          <a:cs typeface="Open Sans"/>
-                          <a:sym typeface="Open Sans Light"/>
-                        </a:rPr>
-                        <a:t>Employee  department can change keeping all the other attribute same.  </a:t>
-                      </a:r>
-                      <a:br>
-                        <a:rPr lang="en-US" sz="1000" b="0" i="0" u="none" strike="noStrike" cap="none" dirty="0">
-                          <a:solidFill>
-                            <a:schemeClr val="tx1"/>
-                          </a:solidFill>
-                          <a:highlight>
-                            <a:srgbClr val="FFFFFF"/>
-                          </a:highlight>
-                          <a:latin typeface="Open Sans"/>
-                          <a:ea typeface="Open Sans"/>
-                          <a:cs typeface="Open Sans"/>
-                          <a:sym typeface="Open Sans Light"/>
-                        </a:rPr>
-                      </a:br>
-                      <a:r>
-                        <a:rPr lang="en-US" sz="1000" b="0" i="0" u="none" strike="noStrike" cap="none" dirty="0">
-                          <a:solidFill>
-                            <a:schemeClr val="tx1"/>
-                          </a:solidFill>
-                          <a:highlight>
-                            <a:srgbClr val="FFFFFF"/>
-                          </a:highlight>
-                          <a:latin typeface="Open Sans"/>
-                          <a:ea typeface="Open Sans"/>
-                          <a:cs typeface="Open Sans"/>
-                          <a:sym typeface="Open Sans Light"/>
-                        </a:rPr>
-                        <a:t>For e.g.,  Product Development and IT department have same job title "Design Engineer" and "Network Engineer" . So, employee may change department without a change in manager, job title, Address ,salary attribute change</a:t>
-                      </a:r>
-                    </a:p>
-                  </a:txBody>
-                  <a:tcPr marL="5394" marR="5394" marT="5394" marB="0" anchor="ctr">
-                    <a:lnL w="12700" cap="flat" cmpd="sng" algn="ctr">
-                      <a:solidFill>
-                        <a:schemeClr val="tx1"/>
-                      </a:solidFill>
-                      <a:prstDash val="solid"/>
-                      <a:round/>
-                      <a:headEnd type="none" w="med" len="med"/>
-                      <a:tailEnd type="none" w="med" len="med"/>
-                    </a:lnL>
-                    <a:lnR w="12700" cap="flat" cmpd="sng" algn="ctr">
-                      <a:solidFill>
-                        <a:schemeClr val="tx1"/>
-                      </a:solidFill>
-                      <a:prstDash val="solid"/>
-                      <a:round/>
-                      <a:headEnd type="none" w="med" len="med"/>
-                      <a:tailEnd type="none" w="med" len="med"/>
-                    </a:lnR>
-                    <a:lnT w="12700" cap="flat" cmpd="sng" algn="ctr">
-                      <a:solidFill>
-                        <a:schemeClr val="tx1"/>
-                      </a:solidFill>
-                      <a:prstDash val="solid"/>
-                      <a:round/>
-                      <a:headEnd type="none" w="med" len="med"/>
-                      <a:tailEnd type="none" w="med" len="med"/>
-                    </a:lnT>
-                    <a:lnB w="12700" cap="flat" cmpd="sng" algn="ctr">
-                      <a:solidFill>
-                        <a:schemeClr val="tx1"/>
-                      </a:solidFill>
-                      <a:prstDash val="solid"/>
-                      <a:round/>
-                      <a:headEnd type="none" w="med" len="med"/>
-                      <a:tailEnd type="none" w="med" len="med"/>
-                    </a:lnB>
-                    <a:solidFill>
-                      <a:schemeClr val="lt1"/>
-                    </a:solidFill>
-                  </a:tcPr>
-                </a:tc>
-                <a:tc>
-                  <a:txBody>
-                    <a:bodyPr/>
-                    <a:lstStyle/>
-                    <a:p>
-                      <a:pPr algn="ctr" fontAlgn="b"/>
-                      <a:r>
-                        <a:rPr lang="en-US" sz="1000" b="0" i="0" u="none" strike="noStrike" cap="none" dirty="0">
-                          <a:solidFill>
-                            <a:schemeClr val="tx1"/>
-                          </a:solidFill>
-                          <a:highlight>
-                            <a:srgbClr val="FFFFFF"/>
-                          </a:highlight>
-                          <a:latin typeface="Open Sans"/>
-                          <a:ea typeface="Open Sans"/>
-                          <a:cs typeface="Open Sans"/>
-                          <a:sym typeface="Open Sans Light"/>
-                        </a:rPr>
-                        <a:t>Department Change</a:t>
-                      </a:r>
-                    </a:p>
-                  </a:txBody>
-                  <a:tcPr marL="5394" marR="5394" marT="5394" marB="0" anchor="ctr">
-                    <a:lnL w="12700" cap="flat" cmpd="sng" algn="ctr">
-                      <a:solidFill>
-                        <a:schemeClr val="tx1"/>
-                      </a:solidFill>
-                      <a:prstDash val="solid"/>
-                      <a:round/>
-                      <a:headEnd type="none" w="med" len="med"/>
-                      <a:tailEnd type="none" w="med" len="med"/>
-                    </a:lnL>
-                    <a:lnR w="12700" cap="flat" cmpd="sng" algn="ctr">
-                      <a:solidFill>
-                        <a:schemeClr val="tx1"/>
-                      </a:solidFill>
-                      <a:prstDash val="solid"/>
-                      <a:round/>
-                      <a:headEnd type="none" w="med" len="med"/>
-                      <a:tailEnd type="none" w="med" len="med"/>
-                    </a:lnR>
-                    <a:lnT w="12700" cap="flat" cmpd="sng" algn="ctr">
-                      <a:solidFill>
-                        <a:schemeClr val="tx1"/>
-                      </a:solidFill>
-                      <a:prstDash val="solid"/>
-                      <a:round/>
-                      <a:headEnd type="none" w="med" len="med"/>
-                      <a:tailEnd type="none" w="med" len="med"/>
-                    </a:lnT>
-                    <a:lnB w="12700" cap="flat" cmpd="sng" algn="ctr">
-                      <a:solidFill>
-                        <a:schemeClr val="tx1"/>
-                      </a:solidFill>
-                      <a:prstDash val="solid"/>
-                      <a:round/>
-                      <a:headEnd type="none" w="med" len="med"/>
-                      <a:tailEnd type="none" w="med" len="med"/>
-                    </a:lnB>
-                    <a:solidFill>
-                      <a:schemeClr val="lt1"/>
-                    </a:solidFill>
-                  </a:tcPr>
-                </a:tc>
-                <a:tc>
-                  <a:txBody>
-                    <a:bodyPr/>
-                    <a:lstStyle/>
-                    <a:p>
-                      <a:pPr algn="ctr" fontAlgn="b"/>
-                      <a:r>
-                        <a:rPr lang="en-US" sz="1000" b="0" i="0" u="none" strike="noStrike" cap="none" dirty="0">
-                          <a:solidFill>
-                            <a:schemeClr val="tx1"/>
-                          </a:solidFill>
-                          <a:highlight>
-                            <a:srgbClr val="FFFFFF"/>
-                          </a:highlight>
-                          <a:latin typeface="Open Sans"/>
-                          <a:ea typeface="Open Sans"/>
-                          <a:cs typeface="Open Sans"/>
-                          <a:sym typeface="Open Sans Light"/>
-                        </a:rPr>
-                        <a:t>Yes</a:t>
-                      </a:r>
-                    </a:p>
-                  </a:txBody>
-                  <a:tcPr marL="5394" marR="5394" marT="5394" marB="0" anchor="ctr">
-                    <a:lnL w="12700" cap="flat" cmpd="sng" algn="ctr">
-                      <a:solidFill>
-                        <a:schemeClr val="tx1"/>
-                      </a:solidFill>
-                      <a:prstDash val="solid"/>
-                      <a:round/>
-                      <a:headEnd type="none" w="med" len="med"/>
-                      <a:tailEnd type="none" w="med" len="med"/>
-                    </a:lnL>
-                    <a:lnR w="12700" cap="flat" cmpd="sng" algn="ctr">
-                      <a:solidFill>
-                        <a:schemeClr val="tx1"/>
-                      </a:solidFill>
-                      <a:prstDash val="solid"/>
-                      <a:round/>
-                      <a:headEnd type="none" w="med" len="med"/>
-                      <a:tailEnd type="none" w="med" len="med"/>
-                    </a:lnR>
-                    <a:lnT w="12700" cap="flat" cmpd="sng" algn="ctr">
-                      <a:solidFill>
-                        <a:schemeClr val="tx1"/>
-                      </a:solidFill>
-                      <a:prstDash val="solid"/>
-                      <a:round/>
-                      <a:headEnd type="none" w="med" len="med"/>
-                      <a:tailEnd type="none" w="med" len="med"/>
-                    </a:lnT>
-                    <a:lnB w="12700" cap="flat" cmpd="sng" algn="ctr">
-                      <a:solidFill>
-                        <a:schemeClr val="tx1"/>
-                      </a:solidFill>
-                      <a:prstDash val="solid"/>
-                      <a:round/>
-                      <a:headEnd type="none" w="med" len="med"/>
-                      <a:tailEnd type="none" w="med" len="med"/>
-                    </a:lnB>
-                    <a:solidFill>
-                      <a:schemeClr val="lt1"/>
-                    </a:solidFill>
-                  </a:tcPr>
-                </a:tc>
-                <a:extLst>
-                  <a:ext uri="{0D108BD9-81ED-4DB2-BD59-A6C34878D82A}">
-                    <a16:rowId xmlns:a16="http://schemas.microsoft.com/office/drawing/2014/main" val="2840013262"/>
-                  </a:ext>
-                </a:extLst>
-              </a:tr>
-              <a:tr h="720156">
-                <a:tc>
-                  <a:txBody>
-                    <a:bodyPr/>
-                    <a:lstStyle/>
-                    <a:p>
-                      <a:pPr algn="ctr" fontAlgn="b"/>
-                      <a:r>
-                        <a:rPr lang="en-US" sz="1000" b="0" i="0" u="none" strike="noStrike" cap="none" dirty="0">
-                          <a:solidFill>
-                            <a:schemeClr val="tx1"/>
-                          </a:solidFill>
-                          <a:highlight>
-                            <a:srgbClr val="FFFFFF"/>
-                          </a:highlight>
-                          <a:latin typeface="Open Sans"/>
-                          <a:ea typeface="Open Sans"/>
-                          <a:cs typeface="Open Sans"/>
-                          <a:sym typeface="Open Sans Light"/>
-                        </a:rPr>
-                        <a:t>2</a:t>
-                      </a:r>
-                    </a:p>
-                  </a:txBody>
-                  <a:tcPr marL="5394" marR="5394" marT="5394" marB="0" anchor="ctr">
-                    <a:lnL w="12700" cap="flat" cmpd="sng" algn="ctr">
-                      <a:solidFill>
-                        <a:schemeClr val="tx1"/>
-                      </a:solidFill>
-                      <a:prstDash val="solid"/>
-                      <a:round/>
-                      <a:headEnd type="none" w="med" len="med"/>
-                      <a:tailEnd type="none" w="med" len="med"/>
-                    </a:lnL>
-                    <a:lnR w="12700" cap="flat" cmpd="sng" algn="ctr">
-                      <a:solidFill>
-                        <a:schemeClr val="tx1"/>
-                      </a:solidFill>
-                      <a:prstDash val="solid"/>
-                      <a:round/>
-                      <a:headEnd type="none" w="med" len="med"/>
-                      <a:tailEnd type="none" w="med" len="med"/>
-                    </a:lnR>
-                    <a:lnT w="12700" cap="flat" cmpd="sng" algn="ctr">
-                      <a:solidFill>
-                        <a:schemeClr val="tx1"/>
-                      </a:solidFill>
-                      <a:prstDash val="solid"/>
-                      <a:round/>
-                      <a:headEnd type="none" w="med" len="med"/>
-                      <a:tailEnd type="none" w="med" len="med"/>
-                    </a:lnT>
-                    <a:lnB w="12700" cap="flat" cmpd="sng" algn="ctr">
-                      <a:solidFill>
-                        <a:schemeClr val="tx1"/>
-                      </a:solidFill>
-                      <a:prstDash val="solid"/>
-                      <a:round/>
-                      <a:headEnd type="none" w="med" len="med"/>
-                      <a:tailEnd type="none" w="med" len="med"/>
-                    </a:lnB>
-                    <a:solidFill>
-                      <a:schemeClr val="lt1"/>
-                    </a:solidFill>
-                  </a:tcPr>
-                </a:tc>
-                <a:tc>
-                  <a:txBody>
-                    <a:bodyPr/>
-                    <a:lstStyle/>
-                    <a:p>
-                      <a:pPr algn="l" fontAlgn="b"/>
-                      <a:r>
-                        <a:rPr lang="en-US" sz="1000" b="0" i="0" u="none" strike="noStrike" cap="none" dirty="0">
-                          <a:solidFill>
-                            <a:schemeClr val="tx1"/>
-                          </a:solidFill>
-                          <a:highlight>
-                            <a:srgbClr val="FFFFFF"/>
-                          </a:highlight>
-                          <a:latin typeface="Open Sans"/>
-                          <a:ea typeface="Open Sans"/>
-                          <a:cs typeface="Open Sans"/>
-                          <a:sym typeface="Open Sans Light"/>
-                        </a:rPr>
-                        <a:t>Employee job title may change keeping all the other attributes same. </a:t>
-                      </a:r>
-                      <a:br>
-                        <a:rPr lang="en-US" sz="1000" b="0" i="0" u="none" strike="noStrike" cap="none" dirty="0">
-                          <a:solidFill>
-                            <a:schemeClr val="tx1"/>
-                          </a:solidFill>
-                          <a:highlight>
-                            <a:srgbClr val="FFFFFF"/>
-                          </a:highlight>
-                          <a:latin typeface="Open Sans"/>
-                          <a:ea typeface="Open Sans"/>
-                          <a:cs typeface="Open Sans"/>
-                          <a:sym typeface="Open Sans Light"/>
-                        </a:rPr>
-                      </a:br>
-                      <a:r>
-                        <a:rPr lang="en-US" sz="1000" b="0" i="0" u="none" strike="noStrike" cap="none" dirty="0">
-                          <a:solidFill>
-                            <a:schemeClr val="tx1"/>
-                          </a:solidFill>
-                          <a:highlight>
-                            <a:srgbClr val="FFFFFF"/>
-                          </a:highlight>
-                          <a:latin typeface="Open Sans"/>
-                          <a:ea typeface="Open Sans"/>
-                          <a:cs typeface="Open Sans"/>
-                          <a:sym typeface="Open Sans Light"/>
-                        </a:rPr>
-                        <a:t>For Ex,  Employee may draw the same salary and be in same department even after changing the job title.</a:t>
-                      </a:r>
-                    </a:p>
-                  </a:txBody>
-                  <a:tcPr marL="5394" marR="5394" marT="5394" marB="0" anchor="ctr">
-                    <a:lnL w="12700" cap="flat" cmpd="sng" algn="ctr">
-                      <a:solidFill>
-                        <a:schemeClr val="tx1"/>
-                      </a:solidFill>
-                      <a:prstDash val="solid"/>
-                      <a:round/>
-                      <a:headEnd type="none" w="med" len="med"/>
-                      <a:tailEnd type="none" w="med" len="med"/>
-                    </a:lnL>
-                    <a:lnR w="12700" cap="flat" cmpd="sng" algn="ctr">
-                      <a:solidFill>
-                        <a:schemeClr val="tx1"/>
-                      </a:solidFill>
-                      <a:prstDash val="solid"/>
-                      <a:round/>
-                      <a:headEnd type="none" w="med" len="med"/>
-                      <a:tailEnd type="none" w="med" len="med"/>
-                    </a:lnR>
-                    <a:lnT w="12700" cap="flat" cmpd="sng" algn="ctr">
-                      <a:solidFill>
-                        <a:schemeClr val="tx1"/>
-                      </a:solidFill>
-                      <a:prstDash val="solid"/>
-                      <a:round/>
-                      <a:headEnd type="none" w="med" len="med"/>
-                      <a:tailEnd type="none" w="med" len="med"/>
-                    </a:lnT>
-                    <a:lnB w="12700" cap="flat" cmpd="sng" algn="ctr">
-                      <a:solidFill>
-                        <a:schemeClr val="tx1"/>
-                      </a:solidFill>
-                      <a:prstDash val="solid"/>
-                      <a:round/>
-                      <a:headEnd type="none" w="med" len="med"/>
-                      <a:tailEnd type="none" w="med" len="med"/>
-                    </a:lnB>
-                    <a:solidFill>
-                      <a:schemeClr val="lt1"/>
-                    </a:solidFill>
-                  </a:tcPr>
-                </a:tc>
-                <a:tc>
-                  <a:txBody>
-                    <a:bodyPr/>
-                    <a:lstStyle/>
-                    <a:p>
-                      <a:pPr algn="ctr" fontAlgn="b"/>
-                      <a:r>
-                        <a:rPr lang="en-US" sz="1000" b="0" i="0" u="none" strike="noStrike" cap="none" dirty="0">
-                          <a:solidFill>
-                            <a:schemeClr val="tx1"/>
-                          </a:solidFill>
-                          <a:highlight>
-                            <a:srgbClr val="FFFFFF"/>
-                          </a:highlight>
-                          <a:latin typeface="Open Sans"/>
-                          <a:ea typeface="Open Sans"/>
-                          <a:cs typeface="Open Sans"/>
-                          <a:sym typeface="Open Sans Light"/>
-                        </a:rPr>
-                        <a:t>Job Title Change</a:t>
-                      </a:r>
-                    </a:p>
-                  </a:txBody>
-                  <a:tcPr marL="5394" marR="5394" marT="5394" marB="0" anchor="ctr">
-                    <a:lnL w="12700" cap="flat" cmpd="sng" algn="ctr">
-                      <a:solidFill>
-                        <a:schemeClr val="tx1"/>
-                      </a:solidFill>
-                      <a:prstDash val="solid"/>
-                      <a:round/>
-                      <a:headEnd type="none" w="med" len="med"/>
-                      <a:tailEnd type="none" w="med" len="med"/>
-                    </a:lnL>
-                    <a:lnR w="12700" cap="flat" cmpd="sng" algn="ctr">
-                      <a:solidFill>
-                        <a:schemeClr val="tx1"/>
-                      </a:solidFill>
-                      <a:prstDash val="solid"/>
-                      <a:round/>
-                      <a:headEnd type="none" w="med" len="med"/>
-                      <a:tailEnd type="none" w="med" len="med"/>
-                    </a:lnR>
-                    <a:lnT w="12700" cap="flat" cmpd="sng" algn="ctr">
-                      <a:solidFill>
-                        <a:schemeClr val="tx1"/>
-                      </a:solidFill>
-                      <a:prstDash val="solid"/>
-                      <a:round/>
-                      <a:headEnd type="none" w="med" len="med"/>
-                      <a:tailEnd type="none" w="med" len="med"/>
-                    </a:lnT>
-                    <a:lnB w="12700" cap="flat" cmpd="sng" algn="ctr">
-                      <a:solidFill>
-                        <a:schemeClr val="tx1"/>
-                      </a:solidFill>
-                      <a:prstDash val="solid"/>
-                      <a:round/>
-                      <a:headEnd type="none" w="med" len="med"/>
-                      <a:tailEnd type="none" w="med" len="med"/>
-                    </a:lnB>
-                    <a:solidFill>
-                      <a:schemeClr val="lt1"/>
-                    </a:solidFill>
-                  </a:tcPr>
-                </a:tc>
-                <a:tc>
-                  <a:txBody>
-                    <a:bodyPr/>
-                    <a:lstStyle/>
-                    <a:p>
-                      <a:pPr algn="ctr" fontAlgn="b"/>
-                      <a:r>
-                        <a:rPr lang="en-US" sz="1000" b="0" i="0" u="none" strike="noStrike" cap="none" dirty="0">
-                          <a:solidFill>
-                            <a:schemeClr val="tx1"/>
-                          </a:solidFill>
-                          <a:highlight>
-                            <a:srgbClr val="FFFFFF"/>
-                          </a:highlight>
-                          <a:latin typeface="Open Sans"/>
-                          <a:ea typeface="Open Sans"/>
-                          <a:cs typeface="Open Sans"/>
-                          <a:sym typeface="Open Sans Light"/>
-                        </a:rPr>
-                        <a:t>Yes</a:t>
-                      </a:r>
-                    </a:p>
-                  </a:txBody>
-                  <a:tcPr marL="5394" marR="5394" marT="5394" marB="0" anchor="ctr">
-                    <a:lnL w="12700" cap="flat" cmpd="sng" algn="ctr">
-                      <a:solidFill>
-                        <a:schemeClr val="tx1"/>
-                      </a:solidFill>
-                      <a:prstDash val="solid"/>
-                      <a:round/>
-                      <a:headEnd type="none" w="med" len="med"/>
-                      <a:tailEnd type="none" w="med" len="med"/>
-                    </a:lnL>
-                    <a:lnR w="12700" cap="flat" cmpd="sng" algn="ctr">
-                      <a:solidFill>
-                        <a:schemeClr val="tx1"/>
-                      </a:solidFill>
-                      <a:prstDash val="solid"/>
-                      <a:round/>
-                      <a:headEnd type="none" w="med" len="med"/>
-                      <a:tailEnd type="none" w="med" len="med"/>
-                    </a:lnR>
-                    <a:lnT w="12700" cap="flat" cmpd="sng" algn="ctr">
-                      <a:solidFill>
-                        <a:schemeClr val="tx1"/>
-                      </a:solidFill>
-                      <a:prstDash val="solid"/>
-                      <a:round/>
-                      <a:headEnd type="none" w="med" len="med"/>
-                      <a:tailEnd type="none" w="med" len="med"/>
-                    </a:lnT>
-                    <a:lnB w="12700" cap="flat" cmpd="sng" algn="ctr">
-                      <a:solidFill>
-                        <a:schemeClr val="tx1"/>
-                      </a:solidFill>
-                      <a:prstDash val="solid"/>
-                      <a:round/>
-                      <a:headEnd type="none" w="med" len="med"/>
-                      <a:tailEnd type="none" w="med" len="med"/>
-                    </a:lnB>
-                    <a:solidFill>
-                      <a:schemeClr val="lt1"/>
-                    </a:solidFill>
-                  </a:tcPr>
-                </a:tc>
-                <a:extLst>
-                  <a:ext uri="{0D108BD9-81ED-4DB2-BD59-A6C34878D82A}">
-                    <a16:rowId xmlns:a16="http://schemas.microsoft.com/office/drawing/2014/main" val="2481423283"/>
-                  </a:ext>
-                </a:extLst>
-              </a:tr>
-              <a:tr h="863266">
-                <a:tc>
-                  <a:txBody>
-                    <a:bodyPr/>
-                    <a:lstStyle/>
-                    <a:p>
-                      <a:pPr algn="ctr" fontAlgn="b"/>
-                      <a:r>
-                        <a:rPr lang="en-US" sz="1000" b="0" i="0" u="none" strike="noStrike" cap="none" dirty="0">
-                          <a:solidFill>
-                            <a:schemeClr val="tx1"/>
-                          </a:solidFill>
-                          <a:highlight>
-                            <a:srgbClr val="FFFFFF"/>
-                          </a:highlight>
-                          <a:latin typeface="Open Sans"/>
-                          <a:ea typeface="Open Sans"/>
-                          <a:cs typeface="Open Sans"/>
-                          <a:sym typeface="Open Sans Light"/>
-                        </a:rPr>
-                        <a:t>3</a:t>
-                      </a:r>
-                    </a:p>
-                  </a:txBody>
-                  <a:tcPr marL="5394" marR="5394" marT="5394" marB="0" anchor="ctr">
-                    <a:lnL w="12700" cap="flat" cmpd="sng" algn="ctr">
-                      <a:solidFill>
-                        <a:schemeClr val="tx1"/>
-                      </a:solidFill>
-                      <a:prstDash val="solid"/>
-                      <a:round/>
-                      <a:headEnd type="none" w="med" len="med"/>
-                      <a:tailEnd type="none" w="med" len="med"/>
-                    </a:lnL>
-                    <a:lnR w="12700" cap="flat" cmpd="sng" algn="ctr">
-                      <a:solidFill>
-                        <a:schemeClr val="tx1"/>
-                      </a:solidFill>
-                      <a:prstDash val="solid"/>
-                      <a:round/>
-                      <a:headEnd type="none" w="med" len="med"/>
-                      <a:tailEnd type="none" w="med" len="med"/>
-                    </a:lnR>
-                    <a:lnT w="12700" cap="flat" cmpd="sng" algn="ctr">
-                      <a:solidFill>
-                        <a:schemeClr val="tx1"/>
-                      </a:solidFill>
-                      <a:prstDash val="solid"/>
-                      <a:round/>
-                      <a:headEnd type="none" w="med" len="med"/>
-                      <a:tailEnd type="none" w="med" len="med"/>
-                    </a:lnT>
-                    <a:lnB w="12700" cap="flat" cmpd="sng" algn="ctr">
-                      <a:solidFill>
-                        <a:schemeClr val="tx1"/>
-                      </a:solidFill>
-                      <a:prstDash val="solid"/>
-                      <a:round/>
-                      <a:headEnd type="none" w="med" len="med"/>
-                      <a:tailEnd type="none" w="med" len="med"/>
-                    </a:lnB>
-                    <a:solidFill>
-                      <a:schemeClr val="lt1"/>
-                    </a:solidFill>
-                  </a:tcPr>
-                </a:tc>
-                <a:tc>
-                  <a:txBody>
-                    <a:bodyPr/>
-                    <a:lstStyle/>
-                    <a:p>
-                      <a:pPr algn="l" fontAlgn="b"/>
-                      <a:r>
-                        <a:rPr lang="en-US" sz="1000" b="0" i="0" u="none" strike="noStrike" cap="none" dirty="0">
-                          <a:solidFill>
-                            <a:schemeClr val="tx1"/>
-                          </a:solidFill>
-                          <a:highlight>
-                            <a:srgbClr val="FFFFFF"/>
-                          </a:highlight>
-                          <a:latin typeface="Open Sans"/>
-                          <a:ea typeface="Open Sans"/>
-                          <a:cs typeface="Open Sans"/>
-                          <a:sym typeface="Open Sans Light"/>
-                        </a:rPr>
-                        <a:t>Employee can move to different manager keeping all the other attributes same. </a:t>
-                      </a:r>
-                      <a:br>
-                        <a:rPr lang="en-US" sz="1000" b="0" i="0" u="none" strike="noStrike" cap="none" dirty="0">
-                          <a:solidFill>
-                            <a:schemeClr val="tx1"/>
-                          </a:solidFill>
-                          <a:highlight>
-                            <a:srgbClr val="FFFFFF"/>
-                          </a:highlight>
-                          <a:latin typeface="Open Sans"/>
-                          <a:ea typeface="Open Sans"/>
-                          <a:cs typeface="Open Sans"/>
-                          <a:sym typeface="Open Sans Light"/>
-                        </a:rPr>
-                      </a:br>
-                      <a:r>
-                        <a:rPr lang="en-US" sz="1000" b="0" i="0" u="none" strike="noStrike" cap="none" dirty="0">
-                          <a:solidFill>
-                            <a:schemeClr val="tx1"/>
-                          </a:solidFill>
-                          <a:highlight>
-                            <a:srgbClr val="FFFFFF"/>
-                          </a:highlight>
-                          <a:latin typeface="Open Sans"/>
-                          <a:ea typeface="Open Sans"/>
-                          <a:cs typeface="Open Sans"/>
-                          <a:sym typeface="Open Sans Light"/>
-                        </a:rPr>
-                        <a:t>For ex, Employee may get transferred from manager  "Tyrone Hutchison" to  "Allison Gentle" both of whom department is "Distribution". </a:t>
-                      </a:r>
-                    </a:p>
-                  </a:txBody>
-                  <a:tcPr marL="5394" marR="5394" marT="5394" marB="0" anchor="ctr">
-                    <a:lnL w="12700" cap="flat" cmpd="sng" algn="ctr">
-                      <a:solidFill>
-                        <a:schemeClr val="tx1"/>
-                      </a:solidFill>
-                      <a:prstDash val="solid"/>
-                      <a:round/>
-                      <a:headEnd type="none" w="med" len="med"/>
-                      <a:tailEnd type="none" w="med" len="med"/>
-                    </a:lnL>
-                    <a:lnR w="12700" cap="flat" cmpd="sng" algn="ctr">
-                      <a:solidFill>
-                        <a:schemeClr val="tx1"/>
-                      </a:solidFill>
-                      <a:prstDash val="solid"/>
-                      <a:round/>
-                      <a:headEnd type="none" w="med" len="med"/>
-                      <a:tailEnd type="none" w="med" len="med"/>
-                    </a:lnR>
-                    <a:lnT w="12700" cap="flat" cmpd="sng" algn="ctr">
-                      <a:solidFill>
-                        <a:schemeClr val="tx1"/>
-                      </a:solidFill>
-                      <a:prstDash val="solid"/>
-                      <a:round/>
-                      <a:headEnd type="none" w="med" len="med"/>
-                      <a:tailEnd type="none" w="med" len="med"/>
-                    </a:lnT>
-                    <a:lnB w="12700" cap="flat" cmpd="sng" algn="ctr">
-                      <a:solidFill>
-                        <a:schemeClr val="tx1"/>
-                      </a:solidFill>
-                      <a:prstDash val="solid"/>
-                      <a:round/>
-                      <a:headEnd type="none" w="med" len="med"/>
-                      <a:tailEnd type="none" w="med" len="med"/>
-                    </a:lnB>
-                    <a:solidFill>
-                      <a:schemeClr val="lt1"/>
-                    </a:solidFill>
-                  </a:tcPr>
-                </a:tc>
-                <a:tc>
-                  <a:txBody>
-                    <a:bodyPr/>
-                    <a:lstStyle/>
-                    <a:p>
-                      <a:pPr algn="ctr" fontAlgn="b"/>
-                      <a:r>
-                        <a:rPr lang="en-US" sz="1000" b="0" i="0" u="none" strike="noStrike" cap="none" dirty="0">
-                          <a:solidFill>
-                            <a:schemeClr val="tx1"/>
-                          </a:solidFill>
-                          <a:highlight>
-                            <a:srgbClr val="FFFFFF"/>
-                          </a:highlight>
-                          <a:latin typeface="Open Sans"/>
-                          <a:ea typeface="Open Sans"/>
-                          <a:cs typeface="Open Sans"/>
-                          <a:sym typeface="Open Sans Light"/>
-                        </a:rPr>
-                        <a:t>Manager Change</a:t>
-                      </a:r>
-                    </a:p>
-                  </a:txBody>
-                  <a:tcPr marL="5394" marR="5394" marT="5394" marB="0" anchor="ctr">
-                    <a:lnL w="12700" cap="flat" cmpd="sng" algn="ctr">
-                      <a:solidFill>
-                        <a:schemeClr val="tx1"/>
-                      </a:solidFill>
-                      <a:prstDash val="solid"/>
-                      <a:round/>
-                      <a:headEnd type="none" w="med" len="med"/>
-                      <a:tailEnd type="none" w="med" len="med"/>
-                    </a:lnL>
-                    <a:lnR w="12700" cap="flat" cmpd="sng" algn="ctr">
-                      <a:solidFill>
-                        <a:schemeClr val="tx1"/>
-                      </a:solidFill>
-                      <a:prstDash val="solid"/>
-                      <a:round/>
-                      <a:headEnd type="none" w="med" len="med"/>
-                      <a:tailEnd type="none" w="med" len="med"/>
-                    </a:lnR>
-                    <a:lnT w="12700" cap="flat" cmpd="sng" algn="ctr">
-                      <a:solidFill>
-                        <a:schemeClr val="tx1"/>
-                      </a:solidFill>
-                      <a:prstDash val="solid"/>
-                      <a:round/>
-                      <a:headEnd type="none" w="med" len="med"/>
-                      <a:tailEnd type="none" w="med" len="med"/>
-                    </a:lnT>
-                    <a:lnB w="12700" cap="flat" cmpd="sng" algn="ctr">
-                      <a:solidFill>
-                        <a:schemeClr val="tx1"/>
-                      </a:solidFill>
-                      <a:prstDash val="solid"/>
-                      <a:round/>
-                      <a:headEnd type="none" w="med" len="med"/>
-                      <a:tailEnd type="none" w="med" len="med"/>
-                    </a:lnB>
-                    <a:solidFill>
-                      <a:schemeClr val="lt1"/>
-                    </a:solidFill>
-                  </a:tcPr>
-                </a:tc>
-                <a:tc>
-                  <a:txBody>
-                    <a:bodyPr/>
-                    <a:lstStyle/>
-                    <a:p>
-                      <a:pPr algn="ctr" fontAlgn="b"/>
-                      <a:r>
-                        <a:rPr lang="en-US" sz="1000" b="0" i="0" u="none" strike="noStrike" cap="none" dirty="0">
-                          <a:solidFill>
-                            <a:schemeClr val="tx1"/>
-                          </a:solidFill>
-                          <a:highlight>
-                            <a:srgbClr val="FFFFFF"/>
-                          </a:highlight>
-                          <a:latin typeface="Open Sans"/>
-                          <a:ea typeface="Open Sans"/>
-                          <a:cs typeface="Open Sans"/>
-                          <a:sym typeface="Open Sans Light"/>
-                        </a:rPr>
-                        <a:t>Yes</a:t>
-                      </a:r>
-                    </a:p>
-                  </a:txBody>
-                  <a:tcPr marL="5394" marR="5394" marT="5394" marB="0" anchor="ctr">
-                    <a:lnL w="12700" cap="flat" cmpd="sng" algn="ctr">
-                      <a:solidFill>
-                        <a:schemeClr val="tx1"/>
-                      </a:solidFill>
-                      <a:prstDash val="solid"/>
-                      <a:round/>
-                      <a:headEnd type="none" w="med" len="med"/>
-                      <a:tailEnd type="none" w="med" len="med"/>
-                    </a:lnL>
-                    <a:lnR w="12700" cap="flat" cmpd="sng" algn="ctr">
-                      <a:solidFill>
-                        <a:schemeClr val="tx1"/>
-                      </a:solidFill>
-                      <a:prstDash val="solid"/>
-                      <a:round/>
-                      <a:headEnd type="none" w="med" len="med"/>
-                      <a:tailEnd type="none" w="med" len="med"/>
-                    </a:lnR>
-                    <a:lnT w="12700" cap="flat" cmpd="sng" algn="ctr">
-                      <a:solidFill>
-                        <a:schemeClr val="tx1"/>
-                      </a:solidFill>
-                      <a:prstDash val="solid"/>
-                      <a:round/>
-                      <a:headEnd type="none" w="med" len="med"/>
-                      <a:tailEnd type="none" w="med" len="med"/>
-                    </a:lnT>
-                    <a:lnB w="12700" cap="flat" cmpd="sng" algn="ctr">
-                      <a:solidFill>
-                        <a:schemeClr val="tx1"/>
-                      </a:solidFill>
-                      <a:prstDash val="solid"/>
-                      <a:round/>
-                      <a:headEnd type="none" w="med" len="med"/>
-                      <a:tailEnd type="none" w="med" len="med"/>
-                    </a:lnB>
-                    <a:solidFill>
-                      <a:schemeClr val="lt1"/>
-                    </a:solidFill>
-                  </a:tcPr>
-                </a:tc>
-                <a:extLst>
-                  <a:ext uri="{0D108BD9-81ED-4DB2-BD59-A6C34878D82A}">
-                    <a16:rowId xmlns:a16="http://schemas.microsoft.com/office/drawing/2014/main" val="1521843540"/>
-                  </a:ext>
-                </a:extLst>
-              </a:tr>
-              <a:tr h="433935">
-                <a:tc>
-                  <a:txBody>
-                    <a:bodyPr/>
-                    <a:lstStyle/>
-                    <a:p>
-                      <a:pPr algn="ctr" fontAlgn="b"/>
-                      <a:r>
-                        <a:rPr lang="en-US" sz="1000" b="0" i="0" u="none" strike="noStrike" cap="none" dirty="0">
-                          <a:solidFill>
-                            <a:schemeClr val="tx1"/>
-                          </a:solidFill>
-                          <a:highlight>
-                            <a:srgbClr val="FFFFFF"/>
-                          </a:highlight>
-                          <a:latin typeface="Open Sans"/>
-                          <a:ea typeface="Open Sans"/>
-                          <a:cs typeface="Open Sans"/>
-                          <a:sym typeface="Open Sans Light"/>
-                        </a:rPr>
-                        <a:t>4</a:t>
-                      </a:r>
-                    </a:p>
-                  </a:txBody>
-                  <a:tcPr marL="5394" marR="5394" marT="5394" marB="0" anchor="ctr">
-                    <a:lnL w="12700" cap="flat" cmpd="sng" algn="ctr">
-                      <a:solidFill>
-                        <a:schemeClr val="tx1"/>
-                      </a:solidFill>
-                      <a:prstDash val="solid"/>
-                      <a:round/>
-                      <a:headEnd type="none" w="med" len="med"/>
-                      <a:tailEnd type="none" w="med" len="med"/>
-                    </a:lnL>
-                    <a:lnR w="12700" cap="flat" cmpd="sng" algn="ctr">
-                      <a:solidFill>
-                        <a:schemeClr val="tx1"/>
-                      </a:solidFill>
-                      <a:prstDash val="solid"/>
-                      <a:round/>
-                      <a:headEnd type="none" w="med" len="med"/>
-                      <a:tailEnd type="none" w="med" len="med"/>
-                    </a:lnR>
-                    <a:lnT w="12700" cap="flat" cmpd="sng" algn="ctr">
-                      <a:solidFill>
-                        <a:schemeClr val="tx1"/>
-                      </a:solidFill>
-                      <a:prstDash val="solid"/>
-                      <a:round/>
-                      <a:headEnd type="none" w="med" len="med"/>
-                      <a:tailEnd type="none" w="med" len="med"/>
-                    </a:lnT>
-                    <a:lnB w="12700" cap="flat" cmpd="sng" algn="ctr">
-                      <a:solidFill>
-                        <a:schemeClr val="tx1"/>
-                      </a:solidFill>
-                      <a:prstDash val="solid"/>
-                      <a:round/>
-                      <a:headEnd type="none" w="med" len="med"/>
-                      <a:tailEnd type="none" w="med" len="med"/>
-                    </a:lnB>
-                    <a:solidFill>
-                      <a:schemeClr val="lt1"/>
-                    </a:solidFill>
-                  </a:tcPr>
-                </a:tc>
-                <a:tc>
-                  <a:txBody>
-                    <a:bodyPr/>
-                    <a:lstStyle/>
-                    <a:p>
-                      <a:pPr algn="l" fontAlgn="b"/>
-                      <a:r>
-                        <a:rPr lang="en-US" sz="1000" b="0" i="0" u="none" strike="noStrike" cap="none" dirty="0">
-                          <a:solidFill>
-                            <a:schemeClr val="tx1"/>
-                          </a:solidFill>
-                          <a:highlight>
-                            <a:srgbClr val="FFFFFF"/>
-                          </a:highlight>
-                          <a:latin typeface="Open Sans"/>
-                          <a:ea typeface="Open Sans"/>
-                          <a:cs typeface="Open Sans"/>
-                          <a:sym typeface="Open Sans Light"/>
-                        </a:rPr>
-                        <a:t>Employee may get transferred to other office (Change in address) without changing all the other attributes.</a:t>
-                      </a:r>
-                    </a:p>
-                  </a:txBody>
-                  <a:tcPr marL="5394" marR="5394" marT="5394" marB="0" anchor="ctr">
-                    <a:lnL w="12700" cap="flat" cmpd="sng" algn="ctr">
-                      <a:solidFill>
-                        <a:schemeClr val="tx1"/>
-                      </a:solidFill>
-                      <a:prstDash val="solid"/>
-                      <a:round/>
-                      <a:headEnd type="none" w="med" len="med"/>
-                      <a:tailEnd type="none" w="med" len="med"/>
-                    </a:lnL>
-                    <a:lnR w="12700" cap="flat" cmpd="sng" algn="ctr">
-                      <a:solidFill>
-                        <a:schemeClr val="tx1"/>
-                      </a:solidFill>
-                      <a:prstDash val="solid"/>
-                      <a:round/>
-                      <a:headEnd type="none" w="med" len="med"/>
-                      <a:tailEnd type="none" w="med" len="med"/>
-                    </a:lnR>
-                    <a:lnT w="12700" cap="flat" cmpd="sng" algn="ctr">
-                      <a:solidFill>
-                        <a:schemeClr val="tx1"/>
-                      </a:solidFill>
-                      <a:prstDash val="solid"/>
-                      <a:round/>
-                      <a:headEnd type="none" w="med" len="med"/>
-                      <a:tailEnd type="none" w="med" len="med"/>
-                    </a:lnT>
-                    <a:lnB w="12700" cap="flat" cmpd="sng" algn="ctr">
-                      <a:solidFill>
-                        <a:schemeClr val="tx1"/>
-                      </a:solidFill>
-                      <a:prstDash val="solid"/>
-                      <a:round/>
-                      <a:headEnd type="none" w="med" len="med"/>
-                      <a:tailEnd type="none" w="med" len="med"/>
-                    </a:lnB>
-                    <a:solidFill>
-                      <a:schemeClr val="lt1"/>
-                    </a:solidFill>
-                  </a:tcPr>
-                </a:tc>
-                <a:tc>
-                  <a:txBody>
-                    <a:bodyPr/>
-                    <a:lstStyle/>
-                    <a:p>
-                      <a:pPr algn="ctr" fontAlgn="b"/>
-                      <a:r>
-                        <a:rPr lang="en-US" sz="1000" b="0" i="0" u="none" strike="noStrike" cap="none" dirty="0">
-                          <a:solidFill>
-                            <a:schemeClr val="tx1"/>
-                          </a:solidFill>
-                          <a:highlight>
-                            <a:srgbClr val="FFFFFF"/>
-                          </a:highlight>
-                          <a:latin typeface="Open Sans"/>
-                          <a:ea typeface="Open Sans"/>
-                          <a:cs typeface="Open Sans"/>
-                          <a:sym typeface="Open Sans Light"/>
-                        </a:rPr>
-                        <a:t>Address Change</a:t>
-                      </a:r>
-                    </a:p>
-                  </a:txBody>
-                  <a:tcPr marL="5394" marR="5394" marT="5394" marB="0" anchor="ctr">
-                    <a:lnL w="12700" cap="flat" cmpd="sng" algn="ctr">
-                      <a:solidFill>
-                        <a:schemeClr val="tx1"/>
-                      </a:solidFill>
-                      <a:prstDash val="solid"/>
-                      <a:round/>
-                      <a:headEnd type="none" w="med" len="med"/>
-                      <a:tailEnd type="none" w="med" len="med"/>
-                    </a:lnL>
-                    <a:lnR w="12700" cap="flat" cmpd="sng" algn="ctr">
-                      <a:solidFill>
-                        <a:schemeClr val="tx1"/>
-                      </a:solidFill>
-                      <a:prstDash val="solid"/>
-                      <a:round/>
-                      <a:headEnd type="none" w="med" len="med"/>
-                      <a:tailEnd type="none" w="med" len="med"/>
-                    </a:lnR>
-                    <a:lnT w="12700" cap="flat" cmpd="sng" algn="ctr">
-                      <a:solidFill>
-                        <a:schemeClr val="tx1"/>
-                      </a:solidFill>
-                      <a:prstDash val="solid"/>
-                      <a:round/>
-                      <a:headEnd type="none" w="med" len="med"/>
-                      <a:tailEnd type="none" w="med" len="med"/>
-                    </a:lnT>
-                    <a:lnB w="12700" cap="flat" cmpd="sng" algn="ctr">
-                      <a:solidFill>
-                        <a:schemeClr val="tx1"/>
-                      </a:solidFill>
-                      <a:prstDash val="solid"/>
-                      <a:round/>
-                      <a:headEnd type="none" w="med" len="med"/>
-                      <a:tailEnd type="none" w="med" len="med"/>
-                    </a:lnB>
-                    <a:solidFill>
-                      <a:schemeClr val="lt1"/>
-                    </a:solidFill>
-                  </a:tcPr>
-                </a:tc>
-                <a:tc>
-                  <a:txBody>
-                    <a:bodyPr/>
-                    <a:lstStyle/>
-                    <a:p>
-                      <a:pPr algn="ctr" fontAlgn="b"/>
-                      <a:r>
-                        <a:rPr lang="en-US" sz="1000" b="0" i="0" u="none" strike="noStrike" cap="none" dirty="0">
-                          <a:solidFill>
-                            <a:schemeClr val="tx1"/>
-                          </a:solidFill>
-                          <a:highlight>
-                            <a:srgbClr val="FFFFFF"/>
-                          </a:highlight>
-                          <a:latin typeface="Open Sans"/>
-                          <a:ea typeface="Open Sans"/>
-                          <a:cs typeface="Open Sans"/>
-                          <a:sym typeface="Open Sans Light"/>
-                        </a:rPr>
-                        <a:t>Yes</a:t>
-                      </a:r>
-                    </a:p>
-                  </a:txBody>
-                  <a:tcPr marL="5394" marR="5394" marT="5394" marB="0" anchor="ctr">
-                    <a:lnL w="12700" cap="flat" cmpd="sng" algn="ctr">
-                      <a:solidFill>
-                        <a:schemeClr val="tx1"/>
-                      </a:solidFill>
-                      <a:prstDash val="solid"/>
-                      <a:round/>
-                      <a:headEnd type="none" w="med" len="med"/>
-                      <a:tailEnd type="none" w="med" len="med"/>
-                    </a:lnL>
-                    <a:lnR w="12700" cap="flat" cmpd="sng" algn="ctr">
-                      <a:solidFill>
-                        <a:schemeClr val="tx1"/>
-                      </a:solidFill>
-                      <a:prstDash val="solid"/>
-                      <a:round/>
-                      <a:headEnd type="none" w="med" len="med"/>
-                      <a:tailEnd type="none" w="med" len="med"/>
-                    </a:lnR>
-                    <a:lnT w="12700" cap="flat" cmpd="sng" algn="ctr">
-                      <a:solidFill>
-                        <a:schemeClr val="tx1"/>
-                      </a:solidFill>
-                      <a:prstDash val="solid"/>
-                      <a:round/>
-                      <a:headEnd type="none" w="med" len="med"/>
-                      <a:tailEnd type="none" w="med" len="med"/>
-                    </a:lnT>
-                    <a:lnB w="12700" cap="flat" cmpd="sng" algn="ctr">
-                      <a:solidFill>
-                        <a:schemeClr val="tx1"/>
-                      </a:solidFill>
-                      <a:prstDash val="solid"/>
-                      <a:round/>
-                      <a:headEnd type="none" w="med" len="med"/>
-                      <a:tailEnd type="none" w="med" len="med"/>
-                    </a:lnB>
-                    <a:solidFill>
-                      <a:schemeClr val="lt1"/>
-                    </a:solidFill>
-                  </a:tcPr>
-                </a:tc>
-                <a:extLst>
-                  <a:ext uri="{0D108BD9-81ED-4DB2-BD59-A6C34878D82A}">
-                    <a16:rowId xmlns:a16="http://schemas.microsoft.com/office/drawing/2014/main" val="1256993961"/>
-                  </a:ext>
-                </a:extLst>
-              </a:tr>
-              <a:tr h="0">
-                <a:tc>
-                  <a:txBody>
-                    <a:bodyPr/>
-                    <a:lstStyle/>
-                    <a:p>
-                      <a:pPr algn="ctr" fontAlgn="b"/>
-                      <a:r>
-                        <a:rPr lang="en-US" sz="1000" b="0" i="0" u="none" strike="noStrike" cap="none" dirty="0">
-                          <a:solidFill>
-                            <a:schemeClr val="tx1"/>
-                          </a:solidFill>
-                          <a:highlight>
-                            <a:srgbClr val="FFFFFF"/>
-                          </a:highlight>
-                          <a:latin typeface="Open Sans"/>
-                          <a:ea typeface="Open Sans"/>
-                          <a:cs typeface="Open Sans"/>
-                          <a:sym typeface="Open Sans Light"/>
-                        </a:rPr>
-                        <a:t>5</a:t>
-                      </a:r>
-                    </a:p>
-                  </a:txBody>
-                  <a:tcPr marL="5394" marR="5394" marT="5394" marB="0" anchor="ctr">
-                    <a:lnL w="12700" cap="flat" cmpd="sng" algn="ctr">
-                      <a:solidFill>
-                        <a:schemeClr val="tx1"/>
-                      </a:solidFill>
-                      <a:prstDash val="solid"/>
-                      <a:round/>
-                      <a:headEnd type="none" w="med" len="med"/>
-                      <a:tailEnd type="none" w="med" len="med"/>
-                    </a:lnL>
-                    <a:lnR w="12700" cap="flat" cmpd="sng" algn="ctr">
-                      <a:solidFill>
-                        <a:schemeClr val="tx1"/>
-                      </a:solidFill>
-                      <a:prstDash val="solid"/>
-                      <a:round/>
-                      <a:headEnd type="none" w="med" len="med"/>
-                      <a:tailEnd type="none" w="med" len="med"/>
-                    </a:lnR>
-                    <a:lnT w="12700" cap="flat" cmpd="sng" algn="ctr">
-                      <a:solidFill>
-                        <a:schemeClr val="tx1"/>
-                      </a:solidFill>
-                      <a:prstDash val="solid"/>
-                      <a:round/>
-                      <a:headEnd type="none" w="med" len="med"/>
-                      <a:tailEnd type="none" w="med" len="med"/>
-                    </a:lnT>
-                    <a:lnB w="12700" cap="flat" cmpd="sng" algn="ctr">
-                      <a:solidFill>
-                        <a:schemeClr val="tx1"/>
-                      </a:solidFill>
-                      <a:prstDash val="solid"/>
-                      <a:round/>
-                      <a:headEnd type="none" w="med" len="med"/>
-                      <a:tailEnd type="none" w="med" len="med"/>
-                    </a:lnB>
-                    <a:solidFill>
-                      <a:schemeClr val="lt1"/>
-                    </a:solidFill>
-                  </a:tcPr>
-                </a:tc>
-                <a:tc>
-                  <a:txBody>
-                    <a:bodyPr/>
-                    <a:lstStyle/>
-                    <a:p>
-                      <a:pPr algn="l" fontAlgn="b"/>
-                      <a:endParaRPr lang="en-US" sz="1000" b="0" i="0" u="none" strike="noStrike" cap="none" dirty="0">
-                        <a:solidFill>
-                          <a:schemeClr val="tx1"/>
-                        </a:solidFill>
-                        <a:highlight>
-                          <a:srgbClr val="FFFFFF"/>
-                        </a:highlight>
-                        <a:latin typeface="Open Sans"/>
-                        <a:ea typeface="Open Sans"/>
-                        <a:cs typeface="Open Sans"/>
-                        <a:sym typeface="Open Sans Light"/>
-                      </a:endParaRPr>
-                    </a:p>
-                    <a:p>
-                      <a:pPr algn="l" fontAlgn="b"/>
-                      <a:r>
-                        <a:rPr lang="en-US" sz="1000" b="0" i="0" u="none" strike="noStrike" cap="none" dirty="0">
-                          <a:solidFill>
-                            <a:schemeClr val="tx1"/>
-                          </a:solidFill>
-                          <a:highlight>
-                            <a:srgbClr val="FFFFFF"/>
-                          </a:highlight>
-                          <a:latin typeface="Open Sans"/>
-                          <a:ea typeface="Open Sans"/>
-                          <a:cs typeface="Open Sans"/>
-                          <a:sym typeface="Open Sans Light"/>
-                        </a:rPr>
-                        <a:t>Employee received salary hike without change in designation and other attributes. This usually happens in most of the organization. </a:t>
-                      </a:r>
-                    </a:p>
-                    <a:p>
-                      <a:pPr algn="l" fontAlgn="b"/>
-                      <a:endParaRPr lang="en-US" sz="1000" b="0" i="0" u="none" strike="noStrike" cap="none" dirty="0">
-                        <a:solidFill>
-                          <a:schemeClr val="tx1"/>
-                        </a:solidFill>
-                        <a:highlight>
-                          <a:srgbClr val="FFFFFF"/>
-                        </a:highlight>
-                        <a:latin typeface="Open Sans"/>
-                        <a:ea typeface="Open Sans"/>
-                        <a:cs typeface="Open Sans"/>
-                        <a:sym typeface="Open Sans Light"/>
-                      </a:endParaRPr>
-                    </a:p>
-                  </a:txBody>
-                  <a:tcPr marL="5394" marR="5394" marT="5394" marB="0" anchor="ctr">
-                    <a:lnL w="12700" cap="flat" cmpd="sng" algn="ctr">
-                      <a:solidFill>
-                        <a:schemeClr val="tx1"/>
-                      </a:solidFill>
-                      <a:prstDash val="solid"/>
-                      <a:round/>
-                      <a:headEnd type="none" w="med" len="med"/>
-                      <a:tailEnd type="none" w="med" len="med"/>
-                    </a:lnL>
-                    <a:lnR w="12700" cap="flat" cmpd="sng" algn="ctr">
-                      <a:solidFill>
-                        <a:schemeClr val="tx1"/>
-                      </a:solidFill>
-                      <a:prstDash val="solid"/>
-                      <a:round/>
-                      <a:headEnd type="none" w="med" len="med"/>
-                      <a:tailEnd type="none" w="med" len="med"/>
-                    </a:lnR>
-                    <a:lnT w="12700" cap="flat" cmpd="sng" algn="ctr">
-                      <a:solidFill>
-                        <a:schemeClr val="tx1"/>
-                      </a:solidFill>
-                      <a:prstDash val="solid"/>
-                      <a:round/>
-                      <a:headEnd type="none" w="med" len="med"/>
-                      <a:tailEnd type="none" w="med" len="med"/>
-                    </a:lnT>
-                    <a:lnB w="12700" cap="flat" cmpd="sng" algn="ctr">
-                      <a:solidFill>
-                        <a:schemeClr val="tx1"/>
-                      </a:solidFill>
-                      <a:prstDash val="solid"/>
-                      <a:round/>
-                      <a:headEnd type="none" w="med" len="med"/>
-                      <a:tailEnd type="none" w="med" len="med"/>
-                    </a:lnB>
-                    <a:solidFill>
-                      <a:schemeClr val="lt1"/>
-                    </a:solidFill>
-                  </a:tcPr>
-                </a:tc>
-                <a:tc>
-                  <a:txBody>
-                    <a:bodyPr/>
-                    <a:lstStyle/>
-                    <a:p>
-                      <a:pPr algn="ctr" fontAlgn="b"/>
-                      <a:r>
-                        <a:rPr lang="en-US" sz="1000" b="0" i="0" u="none" strike="noStrike" cap="none" dirty="0">
-                          <a:solidFill>
-                            <a:schemeClr val="tx1"/>
-                          </a:solidFill>
-                          <a:highlight>
-                            <a:srgbClr val="FFFFFF"/>
-                          </a:highlight>
-                          <a:latin typeface="Open Sans"/>
-                          <a:ea typeface="Open Sans"/>
-                          <a:cs typeface="Open Sans"/>
-                          <a:sym typeface="Open Sans Light"/>
-                        </a:rPr>
-                        <a:t>Salary Change</a:t>
-                      </a:r>
-                    </a:p>
-                  </a:txBody>
-                  <a:tcPr marL="5394" marR="5394" marT="5394" marB="0" anchor="ctr">
-                    <a:lnL w="12700" cap="flat" cmpd="sng" algn="ctr">
-                      <a:solidFill>
-                        <a:schemeClr val="tx1"/>
-                      </a:solidFill>
-                      <a:prstDash val="solid"/>
-                      <a:round/>
-                      <a:headEnd type="none" w="med" len="med"/>
-                      <a:tailEnd type="none" w="med" len="med"/>
-                    </a:lnL>
-                    <a:lnR w="12700" cap="flat" cmpd="sng" algn="ctr">
-                      <a:solidFill>
-                        <a:schemeClr val="tx1"/>
-                      </a:solidFill>
-                      <a:prstDash val="solid"/>
-                      <a:round/>
-                      <a:headEnd type="none" w="med" len="med"/>
-                      <a:tailEnd type="none" w="med" len="med"/>
-                    </a:lnR>
-                    <a:lnT w="12700" cap="flat" cmpd="sng" algn="ctr">
-                      <a:solidFill>
-                        <a:schemeClr val="tx1"/>
-                      </a:solidFill>
-                      <a:prstDash val="solid"/>
-                      <a:round/>
-                      <a:headEnd type="none" w="med" len="med"/>
-                      <a:tailEnd type="none" w="med" len="med"/>
-                    </a:lnT>
-                    <a:lnB w="12700" cap="flat" cmpd="sng" algn="ctr">
-                      <a:solidFill>
-                        <a:schemeClr val="tx1"/>
-                      </a:solidFill>
-                      <a:prstDash val="solid"/>
-                      <a:round/>
-                      <a:headEnd type="none" w="med" len="med"/>
-                      <a:tailEnd type="none" w="med" len="med"/>
-                    </a:lnB>
-                    <a:solidFill>
-                      <a:schemeClr val="lt1"/>
-                    </a:solidFill>
-                  </a:tcPr>
-                </a:tc>
-                <a:tc>
-                  <a:txBody>
-                    <a:bodyPr/>
-                    <a:lstStyle/>
-                    <a:p>
-                      <a:pPr algn="ctr" fontAlgn="b"/>
-                      <a:r>
-                        <a:rPr lang="en-US" sz="1000" b="0" i="0" u="none" strike="noStrike" cap="none" dirty="0">
-                          <a:solidFill>
-                            <a:schemeClr val="tx1"/>
-                          </a:solidFill>
-                          <a:highlight>
-                            <a:srgbClr val="FFFFFF"/>
-                          </a:highlight>
-                          <a:latin typeface="Open Sans"/>
-                          <a:ea typeface="Open Sans"/>
-                          <a:cs typeface="Open Sans"/>
-                          <a:sym typeface="Open Sans Light"/>
-                        </a:rPr>
-                        <a:t>Yes</a:t>
-                      </a:r>
-                    </a:p>
-                  </a:txBody>
-                  <a:tcPr marL="5394" marR="5394" marT="5394" marB="0" anchor="ctr">
-                    <a:lnL w="12700" cap="flat" cmpd="sng" algn="ctr">
-                      <a:solidFill>
-                        <a:schemeClr val="tx1"/>
-                      </a:solidFill>
-                      <a:prstDash val="solid"/>
-                      <a:round/>
-                      <a:headEnd type="none" w="med" len="med"/>
-                      <a:tailEnd type="none" w="med" len="med"/>
-                    </a:lnL>
-                    <a:lnR w="12700" cap="flat" cmpd="sng" algn="ctr">
-                      <a:solidFill>
-                        <a:schemeClr val="tx1"/>
-                      </a:solidFill>
-                      <a:prstDash val="solid"/>
-                      <a:round/>
-                      <a:headEnd type="none" w="med" len="med"/>
-                      <a:tailEnd type="none" w="med" len="med"/>
-                    </a:lnR>
-                    <a:lnT w="12700" cap="flat" cmpd="sng" algn="ctr">
-                      <a:solidFill>
-                        <a:schemeClr val="tx1"/>
-                      </a:solidFill>
-                      <a:prstDash val="solid"/>
-                      <a:round/>
-                      <a:headEnd type="none" w="med" len="med"/>
-                      <a:tailEnd type="none" w="med" len="med"/>
-                    </a:lnT>
-                    <a:lnB w="12700" cap="flat" cmpd="sng" algn="ctr">
-                      <a:solidFill>
-                        <a:schemeClr val="tx1"/>
-                      </a:solidFill>
-                      <a:prstDash val="solid"/>
-                      <a:round/>
-                      <a:headEnd type="none" w="med" len="med"/>
-                      <a:tailEnd type="none" w="med" len="med"/>
-                    </a:lnB>
-                    <a:solidFill>
-                      <a:schemeClr val="lt1"/>
-                    </a:solidFill>
-                  </a:tcPr>
-                </a:tc>
-                <a:extLst>
-                  <a:ext uri="{0D108BD9-81ED-4DB2-BD59-A6C34878D82A}">
-                    <a16:rowId xmlns:a16="http://schemas.microsoft.com/office/drawing/2014/main" val="3483222379"/>
-                  </a:ext>
-                </a:extLst>
-              </a:tr>
-            </a:tbl>
-          </a:graphicData>
-        </a:graphic>
-      </p:graphicFrame>
     </p:spTree>
   </p:cSld>
   <p:clrMapOvr>
@@ -32259,10 +30369,10 @@
       </p:sp>
       <p:pic>
         <p:nvPicPr>
-          <p:cNvPr id="3074" name="Picture 2">
+          <p:cNvPr id="3082" name="Picture 10">
             <a:extLst>
               <a:ext uri="{FF2B5EF4-FFF2-40B4-BE49-F238E27FC236}">
-                <a16:creationId xmlns:a16="http://schemas.microsoft.com/office/drawing/2014/main" id="{CDCCA308-9DB0-4441-8908-4C7E16B4185E}"/>
+                <a16:creationId xmlns:a16="http://schemas.microsoft.com/office/drawing/2014/main" id="{B34559AD-9A5C-2E4B-884E-951935AC0048}"/>
               </a:ext>
             </a:extLst>
           </p:cNvPr>
@@ -32286,8 +30396,8 @@
         </p:blipFill>
         <p:spPr bwMode="auto">
           <a:xfrm>
-            <a:off x="196306" y="1931989"/>
-            <a:ext cx="7311239" cy="5268912"/>
+            <a:off x="123400" y="2326481"/>
+            <a:ext cx="7242600" cy="5405437"/>
           </a:xfrm>
           <a:prstGeom prst="rect">
             <a:avLst/>

</xml_diff>